<commit_message>
colour change to buttons on login page
</commit_message>
<xml_diff>
--- a/Documentation/10754289.pptx
+++ b/Documentation/10754289.pptx
@@ -6,6 +6,7 @@
   </p:sldMasterIdLst>
   <p:sldIdLst>
     <p:sldId id="256" r:id="rId2"/>
+    <p:sldId id="257" r:id="rId3"/>
   </p:sldIdLst>
   <p:sldSz cx="30275213" cy="21383625"/>
   <p:notesSz cx="6858000" cy="9144000"/>
@@ -104,6 +105,11 @@
       </a:defRPr>
     </a:lvl9pPr>
   </p:defaultTextStyle>
+  <p:extLst>
+    <p:ext uri="{EFAFB233-063F-42B5-8137-9DF3F51BA10A}">
+      <p15:sldGuideLst xmlns:p15="http://schemas.microsoft.com/office/powerpoint/2012/main"/>
+    </p:ext>
+  </p:extLst>
 </p:presentation>
 </file>
 
@@ -3742,10 +3748,2688 @@
           </a:extLst>
         </p:spPr>
       </p:pic>
+      <p:pic>
+        <p:nvPicPr>
+          <p:cNvPr id="9" name="Picture 8">
+            <a:extLst>
+              <a:ext uri="{FF2B5EF4-FFF2-40B4-BE49-F238E27FC236}">
+                <a16:creationId xmlns:a16="http://schemas.microsoft.com/office/drawing/2014/main" id="{45CF1B2D-3E93-A564-5CCF-B23AF49DCC11}"/>
+              </a:ext>
+            </a:extLst>
+          </p:cNvPr>
+          <p:cNvPicPr>
+            <a:picLocks noChangeAspect="1"/>
+          </p:cNvPicPr>
+          <p:nvPr/>
+        </p:nvPicPr>
+        <p:blipFill>
+          <a:blip r:embed="rId4"/>
+          <a:stretch>
+            <a:fillRect/>
+          </a:stretch>
+        </p:blipFill>
+        <p:spPr>
+          <a:xfrm>
+            <a:off x="17573951" y="1253520"/>
+            <a:ext cx="12589028" cy="6867637"/>
+          </a:xfrm>
+          <a:prstGeom prst="rect">
+            <a:avLst/>
+          </a:prstGeom>
+          <a:ln>
+            <a:solidFill>
+              <a:srgbClr val="046A88"/>
+            </a:solidFill>
+          </a:ln>
+        </p:spPr>
+      </p:pic>
+      <p:pic>
+        <p:nvPicPr>
+          <p:cNvPr id="13" name="Picture 12" descr="A blue circle with a letter f in it&#10;&#10;AI-generated content may be incorrect.">
+            <a:extLst>
+              <a:ext uri="{FF2B5EF4-FFF2-40B4-BE49-F238E27FC236}">
+                <a16:creationId xmlns:a16="http://schemas.microsoft.com/office/drawing/2014/main" id="{A5AAEC1A-2739-AF6B-16C6-C27CFF822ED1}"/>
+              </a:ext>
+            </a:extLst>
+          </p:cNvPr>
+          <p:cNvPicPr>
+            <a:picLocks noChangeAspect="1"/>
+          </p:cNvPicPr>
+          <p:nvPr/>
+        </p:nvPicPr>
+        <p:blipFill>
+          <a:blip r:embed="rId5">
+            <a:extLst>
+              <a:ext uri="{28A0092B-C50C-407E-A947-70E740481C1C}">
+                <a14:useLocalDpi xmlns:a14="http://schemas.microsoft.com/office/drawing/2010/main" val="0"/>
+              </a:ext>
+            </a:extLst>
+          </a:blip>
+          <a:stretch>
+            <a:fillRect/>
+          </a:stretch>
+        </p:blipFill>
+        <p:spPr>
+          <a:xfrm>
+            <a:off x="10566978" y="6276897"/>
+            <a:ext cx="2546157" cy="2546157"/>
+          </a:xfrm>
+          <a:prstGeom prst="rect">
+            <a:avLst/>
+          </a:prstGeom>
+        </p:spPr>
+      </p:pic>
+      <p:pic>
+        <p:nvPicPr>
+          <p:cNvPr id="17" name="Picture 16" descr="A white x in a black circle&#10;&#10;AI-generated content may be incorrect.">
+            <a:extLst>
+              <a:ext uri="{FF2B5EF4-FFF2-40B4-BE49-F238E27FC236}">
+                <a16:creationId xmlns:a16="http://schemas.microsoft.com/office/drawing/2014/main" id="{4B555382-E834-D17F-CB80-C58B262C4F2C}"/>
+              </a:ext>
+            </a:extLst>
+          </p:cNvPr>
+          <p:cNvPicPr>
+            <a:picLocks noChangeAspect="1"/>
+          </p:cNvPicPr>
+          <p:nvPr/>
+        </p:nvPicPr>
+        <p:blipFill>
+          <a:blip r:embed="rId6">
+            <a:extLst>
+              <a:ext uri="{28A0092B-C50C-407E-A947-70E740481C1C}">
+                <a14:useLocalDpi xmlns:a14="http://schemas.microsoft.com/office/drawing/2010/main" val="0"/>
+              </a:ext>
+            </a:extLst>
+          </a:blip>
+          <a:stretch>
+            <a:fillRect/>
+          </a:stretch>
+        </p:blipFill>
+        <p:spPr>
+          <a:xfrm>
+            <a:off x="14589460" y="5419282"/>
+            <a:ext cx="2237539" cy="2237539"/>
+          </a:xfrm>
+          <a:prstGeom prst="rect">
+            <a:avLst/>
+          </a:prstGeom>
+        </p:spPr>
+      </p:pic>
+      <p:pic>
+        <p:nvPicPr>
+          <p:cNvPr id="21" name="Picture 20" descr="A black and white logo&#10;&#10;AI-generated content may be incorrect.">
+            <a:extLst>
+              <a:ext uri="{FF2B5EF4-FFF2-40B4-BE49-F238E27FC236}">
+                <a16:creationId xmlns:a16="http://schemas.microsoft.com/office/drawing/2014/main" id="{277A2645-82DA-56C9-FCB2-DB84AA0225FB}"/>
+              </a:ext>
+            </a:extLst>
+          </p:cNvPr>
+          <p:cNvPicPr>
+            <a:picLocks noChangeAspect="1"/>
+          </p:cNvPicPr>
+          <p:nvPr/>
+        </p:nvPicPr>
+        <p:blipFill>
+          <a:blip r:embed="rId7">
+            <a:extLst>
+              <a:ext uri="{28A0092B-C50C-407E-A947-70E740481C1C}">
+                <a14:useLocalDpi xmlns:a14="http://schemas.microsoft.com/office/drawing/2010/main" val="0"/>
+              </a:ext>
+            </a:extLst>
+          </a:blip>
+          <a:stretch>
+            <a:fillRect/>
+          </a:stretch>
+        </p:blipFill>
+        <p:spPr>
+          <a:xfrm>
+            <a:off x="10389282" y="10010395"/>
+            <a:ext cx="1836486" cy="1530405"/>
+          </a:xfrm>
+          <a:prstGeom prst="rect">
+            <a:avLst/>
+          </a:prstGeom>
+        </p:spPr>
+      </p:pic>
+      <p:pic>
+        <p:nvPicPr>
+          <p:cNvPr id="24" name="Picture 23" descr="A black background with a black square&#10;&#10;AI-generated content may be incorrect.">
+            <a:extLst>
+              <a:ext uri="{FF2B5EF4-FFF2-40B4-BE49-F238E27FC236}">
+                <a16:creationId xmlns:a16="http://schemas.microsoft.com/office/drawing/2014/main" id="{954D1E56-E5BD-514B-D9A7-3A98A92822D5}"/>
+              </a:ext>
+            </a:extLst>
+          </p:cNvPr>
+          <p:cNvPicPr>
+            <a:picLocks noChangeAspect="1"/>
+          </p:cNvPicPr>
+          <p:nvPr/>
+        </p:nvPicPr>
+        <p:blipFill>
+          <a:blip r:embed="rId8">
+            <a:extLst>
+              <a:ext uri="{28A0092B-C50C-407E-A947-70E740481C1C}">
+                <a14:useLocalDpi xmlns:a14="http://schemas.microsoft.com/office/drawing/2010/main" val="0"/>
+              </a:ext>
+            </a:extLst>
+          </a:blip>
+          <a:stretch>
+            <a:fillRect/>
+          </a:stretch>
+        </p:blipFill>
+        <p:spPr>
+          <a:xfrm>
+            <a:off x="17924022" y="9178987"/>
+            <a:ext cx="1916906" cy="1916906"/>
+          </a:xfrm>
+          <a:prstGeom prst="rect">
+            <a:avLst/>
+          </a:prstGeom>
+        </p:spPr>
+      </p:pic>
+      <p:pic>
+        <p:nvPicPr>
+          <p:cNvPr id="26" name="Picture 25" descr="A colorful letter g&#10;&#10;AI-generated content may be incorrect.">
+            <a:extLst>
+              <a:ext uri="{FF2B5EF4-FFF2-40B4-BE49-F238E27FC236}">
+                <a16:creationId xmlns:a16="http://schemas.microsoft.com/office/drawing/2014/main" id="{2F1DA55B-A555-CD90-4288-0540CEF18E7B}"/>
+              </a:ext>
+            </a:extLst>
+          </p:cNvPr>
+          <p:cNvPicPr>
+            <a:picLocks noChangeAspect="1"/>
+          </p:cNvPicPr>
+          <p:nvPr/>
+        </p:nvPicPr>
+        <p:blipFill>
+          <a:blip r:embed="rId9">
+            <a:extLst>
+              <a:ext uri="{28A0092B-C50C-407E-A947-70E740481C1C}">
+                <a14:useLocalDpi xmlns:a14="http://schemas.microsoft.com/office/drawing/2010/main" val="0"/>
+              </a:ext>
+            </a:extLst>
+          </a:blip>
+          <a:stretch>
+            <a:fillRect/>
+          </a:stretch>
+        </p:blipFill>
+        <p:spPr>
+          <a:xfrm>
+            <a:off x="13393851" y="13726803"/>
+            <a:ext cx="1724440" cy="1724440"/>
+          </a:xfrm>
+          <a:prstGeom prst="rect">
+            <a:avLst/>
+          </a:prstGeom>
+        </p:spPr>
+      </p:pic>
+      <p:pic>
+        <p:nvPicPr>
+          <p:cNvPr id="28" name="Picture 27" descr="A black circle with a letter in it&#10;&#10;AI-generated content may be incorrect.">
+            <a:extLst>
+              <a:ext uri="{FF2B5EF4-FFF2-40B4-BE49-F238E27FC236}">
+                <a16:creationId xmlns:a16="http://schemas.microsoft.com/office/drawing/2014/main" id="{A2298DE4-129D-1975-8556-B95376CA7982}"/>
+              </a:ext>
+            </a:extLst>
+          </p:cNvPr>
+          <p:cNvPicPr>
+            <a:picLocks noChangeAspect="1"/>
+          </p:cNvPicPr>
+          <p:nvPr/>
+        </p:nvPicPr>
+        <p:blipFill>
+          <a:blip r:embed="rId10">
+            <a:extLst>
+              <a:ext uri="{28A0092B-C50C-407E-A947-70E740481C1C}">
+                <a14:useLocalDpi xmlns:a14="http://schemas.microsoft.com/office/drawing/2010/main" val="0"/>
+              </a:ext>
+            </a:extLst>
+          </a:blip>
+          <a:stretch>
+            <a:fillRect/>
+          </a:stretch>
+        </p:blipFill>
+        <p:spPr>
+          <a:xfrm>
+            <a:off x="16265288" y="13799941"/>
+            <a:ext cx="1538003" cy="1538003"/>
+          </a:xfrm>
+          <a:prstGeom prst="rect">
+            <a:avLst/>
+          </a:prstGeom>
+        </p:spPr>
+      </p:pic>
+      <p:pic>
+        <p:nvPicPr>
+          <p:cNvPr id="30" name="Picture 29" descr="A blue circle with a newspaper&#10;&#10;AI-generated content may be incorrect.">
+            <a:extLst>
+              <a:ext uri="{FF2B5EF4-FFF2-40B4-BE49-F238E27FC236}">
+                <a16:creationId xmlns:a16="http://schemas.microsoft.com/office/drawing/2014/main" id="{3D49120A-3433-5C6E-5821-BB8D935E19D8}"/>
+              </a:ext>
+            </a:extLst>
+          </p:cNvPr>
+          <p:cNvPicPr>
+            <a:picLocks noChangeAspect="1"/>
+          </p:cNvPicPr>
+          <p:nvPr/>
+        </p:nvPicPr>
+        <p:blipFill>
+          <a:blip r:embed="rId11">
+            <a:extLst>
+              <a:ext uri="{28A0092B-C50C-407E-A947-70E740481C1C}">
+                <a14:useLocalDpi xmlns:a14="http://schemas.microsoft.com/office/drawing/2010/main" val="0"/>
+              </a:ext>
+            </a:extLst>
+          </a:blip>
+          <a:stretch>
+            <a:fillRect/>
+          </a:stretch>
+        </p:blipFill>
+        <p:spPr>
+          <a:xfrm>
+            <a:off x="17889386" y="12441418"/>
+            <a:ext cx="1400459" cy="1400459"/>
+          </a:xfrm>
+          <a:prstGeom prst="rect">
+            <a:avLst/>
+          </a:prstGeom>
+        </p:spPr>
+      </p:pic>
+      <p:pic>
+        <p:nvPicPr>
+          <p:cNvPr id="32" name="Picture 31" descr="A logo of a robot&#10;&#10;AI-generated content may be incorrect.">
+            <a:extLst>
+              <a:ext uri="{FF2B5EF4-FFF2-40B4-BE49-F238E27FC236}">
+                <a16:creationId xmlns:a16="http://schemas.microsoft.com/office/drawing/2014/main" id="{CC2698DF-05A5-2656-2BBC-F54DA88BF65B}"/>
+              </a:ext>
+            </a:extLst>
+          </p:cNvPr>
+          <p:cNvPicPr>
+            <a:picLocks noChangeAspect="1"/>
+          </p:cNvPicPr>
+          <p:nvPr/>
+        </p:nvPicPr>
+        <p:blipFill>
+          <a:blip r:embed="rId12">
+            <a:extLst>
+              <a:ext uri="{28A0092B-C50C-407E-A947-70E740481C1C}">
+                <a14:useLocalDpi xmlns:a14="http://schemas.microsoft.com/office/drawing/2010/main" val="0"/>
+              </a:ext>
+            </a:extLst>
+          </a:blip>
+          <a:stretch>
+            <a:fillRect/>
+          </a:stretch>
+        </p:blipFill>
+        <p:spPr>
+          <a:xfrm>
+            <a:off x="11139827" y="12594228"/>
+            <a:ext cx="1400460" cy="1400460"/>
+          </a:xfrm>
+          <a:prstGeom prst="rect">
+            <a:avLst/>
+          </a:prstGeom>
+        </p:spPr>
+      </p:pic>
+      <p:pic>
+        <p:nvPicPr>
+          <p:cNvPr id="36" name="Picture 35" descr="A blue and yellow snake logo&#10;&#10;AI-generated content may be incorrect.">
+            <a:extLst>
+              <a:ext uri="{FF2B5EF4-FFF2-40B4-BE49-F238E27FC236}">
+                <a16:creationId xmlns:a16="http://schemas.microsoft.com/office/drawing/2014/main" id="{1831029A-5197-D793-E7B3-B63D0E8F8502}"/>
+              </a:ext>
+            </a:extLst>
+          </p:cNvPr>
+          <p:cNvPicPr>
+            <a:picLocks noChangeAspect="1"/>
+          </p:cNvPicPr>
+          <p:nvPr/>
+        </p:nvPicPr>
+        <p:blipFill>
+          <a:blip r:embed="rId13">
+            <a:extLst>
+              <a:ext uri="{28A0092B-C50C-407E-A947-70E740481C1C}">
+                <a14:useLocalDpi xmlns:a14="http://schemas.microsoft.com/office/drawing/2010/main" val="0"/>
+              </a:ext>
+            </a:extLst>
+          </a:blip>
+          <a:stretch>
+            <a:fillRect/>
+          </a:stretch>
+        </p:blipFill>
+        <p:spPr>
+          <a:xfrm>
+            <a:off x="16629332" y="19735993"/>
+            <a:ext cx="1645816" cy="1645816"/>
+          </a:xfrm>
+          <a:prstGeom prst="rect">
+            <a:avLst/>
+          </a:prstGeom>
+        </p:spPr>
+      </p:pic>
+      <p:pic>
+        <p:nvPicPr>
+          <p:cNvPr id="1026" name="Picture 2" descr="Reasons why Django is the best web framework - DEV Community">
+            <a:extLst>
+              <a:ext uri="{FF2B5EF4-FFF2-40B4-BE49-F238E27FC236}">
+                <a16:creationId xmlns:a16="http://schemas.microsoft.com/office/drawing/2014/main" id="{9A130D3E-20FC-6E6D-7CBA-75A5C0F4A4C9}"/>
+              </a:ext>
+            </a:extLst>
+          </p:cNvPr>
+          <p:cNvPicPr>
+            <a:picLocks noChangeAspect="1" noChangeArrowheads="1"/>
+          </p:cNvPicPr>
+          <p:nvPr/>
+        </p:nvPicPr>
+        <p:blipFill>
+          <a:blip r:embed="rId14">
+            <a:extLst>
+              <a:ext uri="{28A0092B-C50C-407E-A947-70E740481C1C}">
+                <a14:useLocalDpi xmlns:a14="http://schemas.microsoft.com/office/drawing/2010/main" val="0"/>
+              </a:ext>
+            </a:extLst>
+          </a:blip>
+          <a:srcRect/>
+          <a:stretch>
+            <a:fillRect/>
+          </a:stretch>
+        </p:blipFill>
+        <p:spPr bwMode="auto">
+          <a:xfrm>
+            <a:off x="13922374" y="20157834"/>
+            <a:ext cx="2430463" cy="1020794"/>
+          </a:xfrm>
+          <a:prstGeom prst="rect">
+            <a:avLst/>
+          </a:prstGeom>
+          <a:noFill/>
+          <a:extLst>
+            <a:ext uri="{909E8E84-426E-40DD-AFC4-6F175D3DCCD1}">
+              <a14:hiddenFill xmlns:a14="http://schemas.microsoft.com/office/drawing/2010/main">
+                <a:solidFill>
+                  <a:srgbClr val="FFFFFF"/>
+                </a:solidFill>
+              </a14:hiddenFill>
+            </a:ext>
+          </a:extLst>
+        </p:spPr>
+      </p:pic>
+      <p:pic>
+        <p:nvPicPr>
+          <p:cNvPr id="37" name="Picture 4">
+            <a:extLst>
+              <a:ext uri="{FF2B5EF4-FFF2-40B4-BE49-F238E27FC236}">
+                <a16:creationId xmlns:a16="http://schemas.microsoft.com/office/drawing/2014/main" id="{98759CC4-1FD1-17F7-50EB-6C946BE4F966}"/>
+              </a:ext>
+            </a:extLst>
+          </p:cNvPr>
+          <p:cNvPicPr>
+            <a:picLocks noChangeAspect="1" noChangeArrowheads="1"/>
+          </p:cNvPicPr>
+          <p:nvPr/>
+        </p:nvPicPr>
+        <p:blipFill>
+          <a:blip r:embed="rId15">
+            <a:extLst>
+              <a:ext uri="{28A0092B-C50C-407E-A947-70E740481C1C}">
+                <a14:useLocalDpi xmlns:a14="http://schemas.microsoft.com/office/drawing/2010/main" val="0"/>
+              </a:ext>
+            </a:extLst>
+          </a:blip>
+          <a:srcRect/>
+          <a:stretch>
+            <a:fillRect/>
+          </a:stretch>
+        </p:blipFill>
+        <p:spPr bwMode="auto">
+          <a:xfrm>
+            <a:off x="11900590" y="19849018"/>
+            <a:ext cx="1554162" cy="1554162"/>
+          </a:xfrm>
+          <a:prstGeom prst="rect">
+            <a:avLst/>
+          </a:prstGeom>
+          <a:noFill/>
+          <a:extLst>
+            <a:ext uri="{909E8E84-426E-40DD-AFC4-6F175D3DCCD1}">
+              <a14:hiddenFill xmlns:a14="http://schemas.microsoft.com/office/drawing/2010/main">
+                <a:solidFill>
+                  <a:srgbClr val="FFFFFF"/>
+                </a:solidFill>
+              </a14:hiddenFill>
+            </a:ext>
+          </a:extLst>
+        </p:spPr>
+      </p:pic>
+      <p:pic>
+        <p:nvPicPr>
+          <p:cNvPr id="39" name="Picture 38" descr="A blue and orange logo&#10;&#10;AI-generated content may be incorrect.">
+            <a:extLst>
+              <a:ext uri="{FF2B5EF4-FFF2-40B4-BE49-F238E27FC236}">
+                <a16:creationId xmlns:a16="http://schemas.microsoft.com/office/drawing/2014/main" id="{9538E881-9CB7-5403-1A67-1CA611CA0D95}"/>
+              </a:ext>
+            </a:extLst>
+          </p:cNvPr>
+          <p:cNvPicPr>
+            <a:picLocks noChangeAspect="1"/>
+          </p:cNvPicPr>
+          <p:nvPr/>
+        </p:nvPicPr>
+        <p:blipFill>
+          <a:blip r:embed="rId16">
+            <a:extLst>
+              <a:ext uri="{28A0092B-C50C-407E-A947-70E740481C1C}">
+                <a14:useLocalDpi xmlns:a14="http://schemas.microsoft.com/office/drawing/2010/main" val="0"/>
+              </a:ext>
+            </a:extLst>
+          </a:blip>
+          <a:stretch>
+            <a:fillRect/>
+          </a:stretch>
+        </p:blipFill>
+        <p:spPr>
+          <a:xfrm>
+            <a:off x="8801757" y="19083148"/>
+            <a:ext cx="2951507" cy="2951507"/>
+          </a:xfrm>
+          <a:prstGeom prst="rect">
+            <a:avLst/>
+          </a:prstGeom>
+        </p:spPr>
+      </p:pic>
+      <p:pic>
+        <p:nvPicPr>
+          <p:cNvPr id="1034" name="Picture 10" descr="The new version of SQLite 3.32 is here and these are its news">
+            <a:extLst>
+              <a:ext uri="{FF2B5EF4-FFF2-40B4-BE49-F238E27FC236}">
+                <a16:creationId xmlns:a16="http://schemas.microsoft.com/office/drawing/2014/main" id="{8EF55F58-CEBF-9915-903F-AEB25C7DD369}"/>
+              </a:ext>
+            </a:extLst>
+          </p:cNvPr>
+          <p:cNvPicPr>
+            <a:picLocks noChangeAspect="1" noChangeArrowheads="1"/>
+          </p:cNvPicPr>
+          <p:nvPr/>
+        </p:nvPicPr>
+        <p:blipFill rotWithShape="1">
+          <a:blip r:embed="rId17">
+            <a:extLst>
+              <a:ext uri="{28A0092B-C50C-407E-A947-70E740481C1C}">
+                <a14:useLocalDpi xmlns:a14="http://schemas.microsoft.com/office/drawing/2010/main" val="0"/>
+              </a:ext>
+            </a:extLst>
+          </a:blip>
+          <a:srcRect l="15172" t="19057" r="15161" b="16797"/>
+          <a:stretch/>
+        </p:blipFill>
+        <p:spPr bwMode="auto">
+          <a:xfrm>
+            <a:off x="18551643" y="20015858"/>
+            <a:ext cx="2951508" cy="1177636"/>
+          </a:xfrm>
+          <a:prstGeom prst="rect">
+            <a:avLst/>
+          </a:prstGeom>
+          <a:noFill/>
+          <a:extLst>
+            <a:ext uri="{909E8E84-426E-40DD-AFC4-6F175D3DCCD1}">
+              <a14:hiddenFill xmlns:a14="http://schemas.microsoft.com/office/drawing/2010/main">
+                <a:solidFill>
+                  <a:srgbClr val="FFFFFF"/>
+                </a:solidFill>
+              </a14:hiddenFill>
+            </a:ext>
+          </a:extLst>
+        </p:spPr>
+      </p:pic>
+      <p:sp>
+        <p:nvSpPr>
+          <p:cNvPr id="41" name="TextBox 40">
+            <a:extLst>
+              <a:ext uri="{FF2B5EF4-FFF2-40B4-BE49-F238E27FC236}">
+                <a16:creationId xmlns:a16="http://schemas.microsoft.com/office/drawing/2014/main" id="{863A7025-9BD2-FE75-C6A3-2E7113210BC1}"/>
+              </a:ext>
+            </a:extLst>
+          </p:cNvPr>
+          <p:cNvSpPr txBox="1"/>
+          <p:nvPr/>
+        </p:nvSpPr>
+        <p:spPr>
+          <a:xfrm>
+            <a:off x="2486506" y="1414433"/>
+            <a:ext cx="9353550" cy="4597003"/>
+          </a:xfrm>
+          <a:prstGeom prst="roundRect">
+            <a:avLst>
+              <a:gd name="adj" fmla="val 11280"/>
+            </a:avLst>
+          </a:prstGeom>
+          <a:effectLst>
+            <a:outerShdw blurRad="50800" dist="38100" dir="2700000" algn="tl" rotWithShape="0">
+              <a:prstClr val="black">
+                <a:alpha val="40000"/>
+              </a:prstClr>
+            </a:outerShdw>
+          </a:effectLst>
+        </p:spPr>
+        <p:style>
+          <a:lnRef idx="2">
+            <a:schemeClr val="accent1"/>
+          </a:lnRef>
+          <a:fillRef idx="1">
+            <a:schemeClr val="lt1"/>
+          </a:fillRef>
+          <a:effectRef idx="0">
+            <a:schemeClr val="accent1"/>
+          </a:effectRef>
+          <a:fontRef idx="minor">
+            <a:schemeClr val="dk1"/>
+          </a:fontRef>
+        </p:style>
+        <p:txBody>
+          <a:bodyPr wrap="square" rtlCol="0">
+            <a:spAutoFit/>
+          </a:bodyPr>
+          <a:lstStyle/>
+          <a:p>
+            <a:pPr algn="ctr"/>
+            <a:r>
+              <a:rPr lang="en-GB" sz="4000"/>
+              <a:t>The Problem</a:t>
+            </a:r>
+            <a:endParaRPr lang="en-GB" sz="4000" dirty="0"/>
+          </a:p>
+          <a:p>
+            <a:pPr algn="ctr"/>
+            <a:r>
+              <a:rPr lang="en-GB" sz="3200" dirty="0"/>
+              <a:t>The digital age can be difficult to navigate, especially when it comes to your digital footprint. Complicated methods and mean non-technical individuals have increased risks of personal information about them being available freely online, leading to dangerous outcomes such as identity theft, fraud and impersonation. </a:t>
+            </a:r>
+          </a:p>
+        </p:txBody>
+      </p:sp>
+      <p:sp>
+        <p:nvSpPr>
+          <p:cNvPr id="42" name="TextBox 41">
+            <a:extLst>
+              <a:ext uri="{FF2B5EF4-FFF2-40B4-BE49-F238E27FC236}">
+                <a16:creationId xmlns:a16="http://schemas.microsoft.com/office/drawing/2014/main" id="{3889D5C3-7946-6B88-3237-E6793FB68EB3}"/>
+              </a:ext>
+            </a:extLst>
+          </p:cNvPr>
+          <p:cNvSpPr txBox="1"/>
+          <p:nvPr/>
+        </p:nvSpPr>
+        <p:spPr>
+          <a:xfrm>
+            <a:off x="20820617" y="8838782"/>
+            <a:ext cx="9353550" cy="7130772"/>
+          </a:xfrm>
+          <a:prstGeom prst="roundRect">
+            <a:avLst>
+              <a:gd name="adj" fmla="val 9127"/>
+            </a:avLst>
+          </a:prstGeom>
+          <a:effectLst>
+            <a:outerShdw blurRad="50800" dist="38100" dir="2700000" algn="tl" rotWithShape="0">
+              <a:prstClr val="black">
+                <a:alpha val="40000"/>
+              </a:prstClr>
+            </a:outerShdw>
+          </a:effectLst>
+        </p:spPr>
+        <p:style>
+          <a:lnRef idx="2">
+            <a:schemeClr val="accent1"/>
+          </a:lnRef>
+          <a:fillRef idx="1">
+            <a:schemeClr val="lt1"/>
+          </a:fillRef>
+          <a:effectRef idx="0">
+            <a:schemeClr val="accent1"/>
+          </a:effectRef>
+          <a:fontRef idx="minor">
+            <a:schemeClr val="dk1"/>
+          </a:fontRef>
+        </p:style>
+        <p:txBody>
+          <a:bodyPr wrap="square" rtlCol="0">
+            <a:spAutoFit/>
+          </a:bodyPr>
+          <a:lstStyle/>
+          <a:p>
+            <a:pPr algn="ctr"/>
+            <a:r>
+              <a:rPr lang="en-GB" sz="4000" dirty="0"/>
+              <a:t>Features</a:t>
+            </a:r>
+          </a:p>
+          <a:p>
+            <a:pPr marL="571500" indent="-571500">
+              <a:buFont typeface="Arial" panose="020B0604020202020204" pitchFamily="34" charset="0"/>
+              <a:buChar char="•"/>
+            </a:pPr>
+            <a:r>
+              <a:rPr lang="en-GB" sz="3600" dirty="0"/>
+              <a:t>Secure accounts system for multiple users</a:t>
+            </a:r>
+          </a:p>
+          <a:p>
+            <a:pPr marL="571500" indent="-571500">
+              <a:buFont typeface="Arial" panose="020B0604020202020204" pitchFamily="34" charset="0"/>
+              <a:buChar char="•"/>
+            </a:pPr>
+            <a:r>
+              <a:rPr lang="en-GB" sz="3600" dirty="0"/>
+              <a:t>API connections for data collection</a:t>
+            </a:r>
+          </a:p>
+          <a:p>
+            <a:pPr marL="571500" indent="-571500">
+              <a:buFont typeface="Arial" panose="020B0604020202020204" pitchFamily="34" charset="0"/>
+              <a:buChar char="•"/>
+            </a:pPr>
+            <a:r>
+              <a:rPr lang="en-GB" sz="3600" dirty="0"/>
+              <a:t>Easy-to-use UI</a:t>
+            </a:r>
+          </a:p>
+          <a:p>
+            <a:pPr marL="571500" indent="-571500">
+              <a:buFont typeface="Arial" panose="020B0604020202020204" pitchFamily="34" charset="0"/>
+              <a:buChar char="•"/>
+            </a:pPr>
+            <a:r>
+              <a:rPr lang="en-GB" sz="3600" dirty="0"/>
+              <a:t>Option to confirm relevant links to handle false positives</a:t>
+            </a:r>
+          </a:p>
+          <a:p>
+            <a:pPr marL="571500" indent="-571500">
+              <a:buFont typeface="Arial" panose="020B0604020202020204" pitchFamily="34" charset="0"/>
+              <a:buChar char="•"/>
+            </a:pPr>
+            <a:r>
+              <a:rPr lang="en-GB" sz="3600" dirty="0"/>
+              <a:t>Dynamic scoring system for users to track progress over multiple uses</a:t>
+            </a:r>
+          </a:p>
+          <a:p>
+            <a:pPr marL="571500" indent="-571500">
+              <a:buFont typeface="Arial" panose="020B0604020202020204" pitchFamily="34" charset="0"/>
+              <a:buChar char="•"/>
+            </a:pPr>
+            <a:r>
+              <a:rPr lang="en-GB" sz="3600" dirty="0"/>
+              <a:t>Relevant links presented to users with helpful tips on how to improve their digital footprint</a:t>
+            </a:r>
+          </a:p>
+        </p:txBody>
+      </p:sp>
+      <p:sp>
+        <p:nvSpPr>
+          <p:cNvPr id="43" name="TextBox 42">
+            <a:extLst>
+              <a:ext uri="{FF2B5EF4-FFF2-40B4-BE49-F238E27FC236}">
+                <a16:creationId xmlns:a16="http://schemas.microsoft.com/office/drawing/2014/main" id="{F72D9634-40E8-2732-1C75-12FFACBDBCB2}"/>
+              </a:ext>
+            </a:extLst>
+          </p:cNvPr>
+          <p:cNvSpPr txBox="1"/>
+          <p:nvPr/>
+        </p:nvSpPr>
+        <p:spPr>
+          <a:xfrm>
+            <a:off x="517866" y="12936794"/>
+            <a:ext cx="9353550" cy="6480155"/>
+          </a:xfrm>
+          <a:prstGeom prst="roundRect">
+            <a:avLst>
+              <a:gd name="adj" fmla="val 10684"/>
+            </a:avLst>
+          </a:prstGeom>
+          <a:ln/>
+          <a:effectLst>
+            <a:outerShdw blurRad="50800" dist="38100" dir="2700000" algn="tl" rotWithShape="0">
+              <a:prstClr val="black">
+                <a:alpha val="40000"/>
+              </a:prstClr>
+            </a:outerShdw>
+          </a:effectLst>
+        </p:spPr>
+        <p:style>
+          <a:lnRef idx="2">
+            <a:schemeClr val="accent1"/>
+          </a:lnRef>
+          <a:fillRef idx="1">
+            <a:schemeClr val="lt1"/>
+          </a:fillRef>
+          <a:effectRef idx="0">
+            <a:schemeClr val="accent1"/>
+          </a:effectRef>
+          <a:fontRef idx="minor">
+            <a:schemeClr val="dk1"/>
+          </a:fontRef>
+        </p:style>
+        <p:txBody>
+          <a:bodyPr wrap="square" rtlCol="0">
+            <a:spAutoFit/>
+          </a:bodyPr>
+          <a:lstStyle/>
+          <a:p>
+            <a:pPr algn="ctr"/>
+            <a:r>
+              <a:rPr lang="en-GB" sz="4000" dirty="0"/>
+              <a:t>The Solution</a:t>
+            </a:r>
+          </a:p>
+          <a:p>
+            <a:r>
+              <a:rPr lang="en-GB" sz="3200" dirty="0"/>
+              <a:t>DigitalWaves is a web app that can be ran locally. It allows the user to input and edit their information via a simple form and scan for matches.</a:t>
+            </a:r>
+          </a:p>
+          <a:p>
+            <a:r>
+              <a:rPr lang="en-GB" sz="3200" dirty="0"/>
+              <a:t>The process is made simple, by automating requests to APIs from popular information sources and presenting this in a user-friendly fashion. The user can select relevant links and review these along with a score and helpful tips on how to reduce their digital footprint.</a:t>
+            </a:r>
+          </a:p>
+          <a:p>
+            <a:pPr algn="ctr"/>
+            <a:endParaRPr lang="en-GB" sz="3200" dirty="0"/>
+          </a:p>
+        </p:txBody>
+      </p:sp>
+      <p:sp>
+        <p:nvSpPr>
+          <p:cNvPr id="44" name="TextBox 43">
+            <a:extLst>
+              <a:ext uri="{FF2B5EF4-FFF2-40B4-BE49-F238E27FC236}">
+                <a16:creationId xmlns:a16="http://schemas.microsoft.com/office/drawing/2014/main" id="{CC91D78D-1CA9-C9C6-2511-2689B7412F68}"/>
+              </a:ext>
+            </a:extLst>
+          </p:cNvPr>
+          <p:cNvSpPr txBox="1"/>
+          <p:nvPr/>
+        </p:nvSpPr>
+        <p:spPr>
+          <a:xfrm>
+            <a:off x="10277510" y="15338053"/>
+            <a:ext cx="10317892" cy="4226838"/>
+          </a:xfrm>
+          <a:prstGeom prst="roundRect">
+            <a:avLst>
+              <a:gd name="adj" fmla="val 8292"/>
+            </a:avLst>
+          </a:prstGeom>
+          <a:ln/>
+          <a:effectLst>
+            <a:outerShdw blurRad="50800" dist="38100" dir="2700000" algn="tl" rotWithShape="0">
+              <a:prstClr val="black">
+                <a:alpha val="40000"/>
+              </a:prstClr>
+            </a:outerShdw>
+          </a:effectLst>
+        </p:spPr>
+        <p:style>
+          <a:lnRef idx="2">
+            <a:schemeClr val="accent1"/>
+          </a:lnRef>
+          <a:fillRef idx="1">
+            <a:schemeClr val="lt1"/>
+          </a:fillRef>
+          <a:effectRef idx="0">
+            <a:schemeClr val="accent1"/>
+          </a:effectRef>
+          <a:fontRef idx="minor">
+            <a:schemeClr val="dk1"/>
+          </a:fontRef>
+        </p:style>
+        <p:txBody>
+          <a:bodyPr wrap="square" rtlCol="0">
+            <a:spAutoFit/>
+          </a:bodyPr>
+          <a:lstStyle/>
+          <a:p>
+            <a:pPr algn="ctr"/>
+            <a:r>
+              <a:rPr lang="en-GB" sz="4000" dirty="0"/>
+              <a:t>Next Steps</a:t>
+            </a:r>
+          </a:p>
+          <a:p>
+            <a:pPr marL="571500" indent="-571500">
+              <a:buFont typeface="Arial" panose="020B0604020202020204" pitchFamily="34" charset="0"/>
+              <a:buChar char="•"/>
+            </a:pPr>
+            <a:r>
+              <a:rPr lang="en-GB" sz="3600" dirty="0"/>
+              <a:t>Incorporate LLMs into advice system</a:t>
+            </a:r>
+          </a:p>
+          <a:p>
+            <a:pPr marL="571500" indent="-571500">
+              <a:buFont typeface="Arial" panose="020B0604020202020204" pitchFamily="34" charset="0"/>
+              <a:buChar char="•"/>
+            </a:pPr>
+            <a:r>
+              <a:rPr lang="en-GB" sz="3600" dirty="0"/>
+              <a:t>Possibility to deploy on public-facing web server</a:t>
+            </a:r>
+          </a:p>
+          <a:p>
+            <a:pPr marL="571500" indent="-571500">
+              <a:buFont typeface="Arial" panose="020B0604020202020204" pitchFamily="34" charset="0"/>
+              <a:buChar char="•"/>
+            </a:pPr>
+            <a:r>
+              <a:rPr lang="en-GB" sz="3600" dirty="0"/>
+              <a:t>Option for users to add additional APIs</a:t>
+            </a:r>
+          </a:p>
+          <a:p>
+            <a:pPr marL="571500" indent="-571500">
+              <a:buFont typeface="Arial" panose="020B0604020202020204" pitchFamily="34" charset="0"/>
+              <a:buChar char="•"/>
+            </a:pPr>
+            <a:r>
+              <a:rPr lang="en-GB" sz="3600" dirty="0"/>
+              <a:t>Incorporate more data sources and Custom Search Engines</a:t>
+            </a:r>
+          </a:p>
+        </p:txBody>
+      </p:sp>
+      <p:pic>
+        <p:nvPicPr>
+          <p:cNvPr id="46" name="Graphic 45" descr="Server with solid fill">
+            <a:extLst>
+              <a:ext uri="{FF2B5EF4-FFF2-40B4-BE49-F238E27FC236}">
+                <a16:creationId xmlns:a16="http://schemas.microsoft.com/office/drawing/2014/main" id="{7C34E9C0-3EE5-41A7-19B7-B0750B35DCB6}"/>
+              </a:ext>
+            </a:extLst>
+          </p:cNvPr>
+          <p:cNvPicPr>
+            <a:picLocks noChangeAspect="1"/>
+          </p:cNvPicPr>
+          <p:nvPr/>
+        </p:nvPicPr>
+        <p:blipFill>
+          <a:blip r:embed="rId18">
+            <a:extLst>
+              <a:ext uri="{96DAC541-7B7A-43D3-8B79-37D633B846F1}">
+                <asvg:svgBlip xmlns:asvg="http://schemas.microsoft.com/office/drawing/2016/SVG/main" r:embed="rId19"/>
+              </a:ext>
+            </a:extLst>
+          </a:blip>
+          <a:stretch>
+            <a:fillRect/>
+          </a:stretch>
+        </p:blipFill>
+        <p:spPr>
+          <a:xfrm>
+            <a:off x="5978117" y="9000411"/>
+            <a:ext cx="914400" cy="914400"/>
+          </a:xfrm>
+          <a:prstGeom prst="rect">
+            <a:avLst/>
+          </a:prstGeom>
+        </p:spPr>
+      </p:pic>
+      <p:pic>
+        <p:nvPicPr>
+          <p:cNvPr id="47" name="Graphic 46" descr="Male profile with solid fill">
+            <a:extLst>
+              <a:ext uri="{FF2B5EF4-FFF2-40B4-BE49-F238E27FC236}">
+                <a16:creationId xmlns:a16="http://schemas.microsoft.com/office/drawing/2014/main" id="{1A2B5869-C2F5-0967-EBF9-A02DE36250B8}"/>
+              </a:ext>
+            </a:extLst>
+          </p:cNvPr>
+          <p:cNvPicPr>
+            <a:picLocks noChangeAspect="1"/>
+          </p:cNvPicPr>
+          <p:nvPr/>
+        </p:nvPicPr>
+        <p:blipFill>
+          <a:blip r:embed="rId20">
+            <a:extLst>
+              <a:ext uri="{96DAC541-7B7A-43D3-8B79-37D633B846F1}">
+                <asvg:svgBlip xmlns:asvg="http://schemas.microsoft.com/office/drawing/2016/SVG/main" r:embed="rId21"/>
+              </a:ext>
+            </a:extLst>
+          </a:blip>
+          <a:stretch>
+            <a:fillRect/>
+          </a:stretch>
+        </p:blipFill>
+        <p:spPr>
+          <a:xfrm>
+            <a:off x="1964207" y="9000411"/>
+            <a:ext cx="914400" cy="914400"/>
+          </a:xfrm>
+          <a:prstGeom prst="rect">
+            <a:avLst/>
+          </a:prstGeom>
+        </p:spPr>
+      </p:pic>
+      <p:pic>
+        <p:nvPicPr>
+          <p:cNvPr id="48" name="Graphic 47" descr="Monitor with solid fill">
+            <a:extLst>
+              <a:ext uri="{FF2B5EF4-FFF2-40B4-BE49-F238E27FC236}">
+                <a16:creationId xmlns:a16="http://schemas.microsoft.com/office/drawing/2014/main" id="{5500CCAE-8DD6-43DB-50DE-8DDF67BB18DA}"/>
+              </a:ext>
+            </a:extLst>
+          </p:cNvPr>
+          <p:cNvPicPr>
+            <a:picLocks noChangeAspect="1"/>
+          </p:cNvPicPr>
+          <p:nvPr/>
+        </p:nvPicPr>
+        <p:blipFill>
+          <a:blip r:embed="rId22">
+            <a:extLst>
+              <a:ext uri="{96DAC541-7B7A-43D3-8B79-37D633B846F1}">
+                <asvg:svgBlip xmlns:asvg="http://schemas.microsoft.com/office/drawing/2016/SVG/main" r:embed="rId23"/>
+              </a:ext>
+            </a:extLst>
+          </a:blip>
+          <a:stretch>
+            <a:fillRect/>
+          </a:stretch>
+        </p:blipFill>
+        <p:spPr>
+          <a:xfrm>
+            <a:off x="3929121" y="9005332"/>
+            <a:ext cx="914400" cy="914400"/>
+          </a:xfrm>
+          <a:prstGeom prst="rect">
+            <a:avLst/>
+          </a:prstGeom>
+        </p:spPr>
+      </p:pic>
+      <p:pic>
+        <p:nvPicPr>
+          <p:cNvPr id="49" name="Graphic 48" descr="Database with solid fill">
+            <a:extLst>
+              <a:ext uri="{FF2B5EF4-FFF2-40B4-BE49-F238E27FC236}">
+                <a16:creationId xmlns:a16="http://schemas.microsoft.com/office/drawing/2014/main" id="{BFA81AA1-7414-267F-FBED-ABD300E8EFA0}"/>
+              </a:ext>
+            </a:extLst>
+          </p:cNvPr>
+          <p:cNvPicPr>
+            <a:picLocks noChangeAspect="1"/>
+          </p:cNvPicPr>
+          <p:nvPr/>
+        </p:nvPicPr>
+        <p:blipFill>
+          <a:blip r:embed="rId24">
+            <a:extLst>
+              <a:ext uri="{96DAC541-7B7A-43D3-8B79-37D633B846F1}">
+                <asvg:svgBlip xmlns:asvg="http://schemas.microsoft.com/office/drawing/2016/SVG/main" r:embed="rId25"/>
+              </a:ext>
+            </a:extLst>
+          </a:blip>
+          <a:stretch>
+            <a:fillRect/>
+          </a:stretch>
+        </p:blipFill>
+        <p:spPr>
+          <a:xfrm>
+            <a:off x="7831295" y="9000411"/>
+            <a:ext cx="914400" cy="914400"/>
+          </a:xfrm>
+          <a:prstGeom prst="rect">
+            <a:avLst/>
+          </a:prstGeom>
+        </p:spPr>
+      </p:pic>
+      <p:pic>
+        <p:nvPicPr>
+          <p:cNvPr id="50" name="Graphic 49" descr="Disk with solid fill">
+            <a:extLst>
+              <a:ext uri="{FF2B5EF4-FFF2-40B4-BE49-F238E27FC236}">
+                <a16:creationId xmlns:a16="http://schemas.microsoft.com/office/drawing/2014/main" id="{E1D9F614-0457-4E82-C82D-338CCF7BE497}"/>
+              </a:ext>
+            </a:extLst>
+          </p:cNvPr>
+          <p:cNvPicPr>
+            <a:picLocks noChangeAspect="1"/>
+          </p:cNvPicPr>
+          <p:nvPr/>
+        </p:nvPicPr>
+        <p:blipFill>
+          <a:blip r:embed="rId26">
+            <a:extLst>
+              <a:ext uri="{96DAC541-7B7A-43D3-8B79-37D633B846F1}">
+                <asvg:svgBlip xmlns:asvg="http://schemas.microsoft.com/office/drawing/2016/SVG/main" r:embed="rId27"/>
+              </a:ext>
+            </a:extLst>
+          </a:blip>
+          <a:stretch>
+            <a:fillRect/>
+          </a:stretch>
+        </p:blipFill>
+        <p:spPr>
+          <a:xfrm>
+            <a:off x="4576246" y="9914811"/>
+            <a:ext cx="910903" cy="910903"/>
+          </a:xfrm>
+          <a:prstGeom prst="rect">
+            <a:avLst/>
+          </a:prstGeom>
+        </p:spPr>
+      </p:pic>
+      <p:pic>
+        <p:nvPicPr>
+          <p:cNvPr id="51" name="Graphic 50" descr="Statistics with solid fill">
+            <a:extLst>
+              <a:ext uri="{FF2B5EF4-FFF2-40B4-BE49-F238E27FC236}">
+                <a16:creationId xmlns:a16="http://schemas.microsoft.com/office/drawing/2014/main" id="{9330931A-0336-D47A-9AEF-AA32F1061C59}"/>
+              </a:ext>
+            </a:extLst>
+          </p:cNvPr>
+          <p:cNvPicPr>
+            <a:picLocks noChangeAspect="1"/>
+          </p:cNvPicPr>
+          <p:nvPr/>
+        </p:nvPicPr>
+        <p:blipFill>
+          <a:blip r:embed="rId28">
+            <a:extLst>
+              <a:ext uri="{96DAC541-7B7A-43D3-8B79-37D633B846F1}">
+                <asvg:svgBlip xmlns:asvg="http://schemas.microsoft.com/office/drawing/2016/SVG/main" r:embed="rId29"/>
+              </a:ext>
+            </a:extLst>
+          </a:blip>
+          <a:stretch>
+            <a:fillRect/>
+          </a:stretch>
+        </p:blipFill>
+        <p:spPr>
+          <a:xfrm>
+            <a:off x="4794749" y="7470878"/>
+            <a:ext cx="910903" cy="910903"/>
+          </a:xfrm>
+          <a:prstGeom prst="rect">
+            <a:avLst/>
+          </a:prstGeom>
+        </p:spPr>
+      </p:pic>
+      <p:pic>
+        <p:nvPicPr>
+          <p:cNvPr id="52" name="Graphic 51" descr="Research with solid fill">
+            <a:extLst>
+              <a:ext uri="{FF2B5EF4-FFF2-40B4-BE49-F238E27FC236}">
+                <a16:creationId xmlns:a16="http://schemas.microsoft.com/office/drawing/2014/main" id="{4B9D6F8B-B2BD-3674-0891-798D4CDA372F}"/>
+              </a:ext>
+            </a:extLst>
+          </p:cNvPr>
+          <p:cNvPicPr>
+            <a:picLocks noChangeAspect="1"/>
+          </p:cNvPicPr>
+          <p:nvPr/>
+        </p:nvPicPr>
+        <p:blipFill>
+          <a:blip r:embed="rId30">
+            <a:extLst>
+              <a:ext uri="{96DAC541-7B7A-43D3-8B79-37D633B846F1}">
+                <asvg:svgBlip xmlns:asvg="http://schemas.microsoft.com/office/drawing/2016/SVG/main" r:embed="rId31"/>
+              </a:ext>
+            </a:extLst>
+          </a:blip>
+          <a:stretch>
+            <a:fillRect/>
+          </a:stretch>
+        </p:blipFill>
+        <p:spPr>
+          <a:xfrm>
+            <a:off x="7616197" y="10096180"/>
+            <a:ext cx="910903" cy="910903"/>
+          </a:xfrm>
+          <a:prstGeom prst="rect">
+            <a:avLst/>
+          </a:prstGeom>
+        </p:spPr>
+      </p:pic>
+      <p:pic>
+        <p:nvPicPr>
+          <p:cNvPr id="53" name="Graphic 52" descr="Cloud with solid fill">
+            <a:extLst>
+              <a:ext uri="{FF2B5EF4-FFF2-40B4-BE49-F238E27FC236}">
+                <a16:creationId xmlns:a16="http://schemas.microsoft.com/office/drawing/2014/main" id="{FCB1CC9C-9052-0043-625E-D5ED2A08D260}"/>
+              </a:ext>
+            </a:extLst>
+          </p:cNvPr>
+          <p:cNvPicPr>
+            <a:picLocks noChangeAspect="1"/>
+          </p:cNvPicPr>
+          <p:nvPr/>
+        </p:nvPicPr>
+        <p:blipFill>
+          <a:blip r:embed="rId32">
+            <a:extLst>
+              <a:ext uri="{96DAC541-7B7A-43D3-8B79-37D633B846F1}">
+                <asvg:svgBlip xmlns:asvg="http://schemas.microsoft.com/office/drawing/2016/SVG/main" r:embed="rId33"/>
+              </a:ext>
+            </a:extLst>
+          </a:blip>
+          <a:stretch>
+            <a:fillRect/>
+          </a:stretch>
+        </p:blipFill>
+        <p:spPr>
+          <a:xfrm>
+            <a:off x="4976238" y="10632590"/>
+            <a:ext cx="910903" cy="910903"/>
+          </a:xfrm>
+          <a:prstGeom prst="rect">
+            <a:avLst/>
+          </a:prstGeom>
+        </p:spPr>
+      </p:pic>
+      <p:pic>
+        <p:nvPicPr>
+          <p:cNvPr id="54" name="Graphic 53" descr="Usb Stick with solid fill">
+            <a:extLst>
+              <a:ext uri="{FF2B5EF4-FFF2-40B4-BE49-F238E27FC236}">
+                <a16:creationId xmlns:a16="http://schemas.microsoft.com/office/drawing/2014/main" id="{9A8F6C3D-F28A-6704-2209-4DE498A94E7D}"/>
+              </a:ext>
+            </a:extLst>
+          </p:cNvPr>
+          <p:cNvPicPr>
+            <a:picLocks noChangeAspect="1"/>
+          </p:cNvPicPr>
+          <p:nvPr/>
+        </p:nvPicPr>
+        <p:blipFill>
+          <a:blip r:embed="rId34">
+            <a:extLst>
+              <a:ext uri="{96DAC541-7B7A-43D3-8B79-37D633B846F1}">
+                <asvg:svgBlip xmlns:asvg="http://schemas.microsoft.com/office/drawing/2016/SVG/main" r:embed="rId35"/>
+              </a:ext>
+            </a:extLst>
+          </a:blip>
+          <a:stretch>
+            <a:fillRect/>
+          </a:stretch>
+        </p:blipFill>
+        <p:spPr>
+          <a:xfrm>
+            <a:off x="6890612" y="10739807"/>
+            <a:ext cx="910903" cy="910903"/>
+          </a:xfrm>
+          <a:prstGeom prst="rect">
+            <a:avLst/>
+          </a:prstGeom>
+        </p:spPr>
+      </p:pic>
+      <p:pic>
+        <p:nvPicPr>
+          <p:cNvPr id="55" name="Graphic 54" descr="Bar chart with solid fill">
+            <a:extLst>
+              <a:ext uri="{FF2B5EF4-FFF2-40B4-BE49-F238E27FC236}">
+                <a16:creationId xmlns:a16="http://schemas.microsoft.com/office/drawing/2014/main" id="{DDF56B9C-1FF0-EE93-5662-05B44440A69F}"/>
+              </a:ext>
+            </a:extLst>
+          </p:cNvPr>
+          <p:cNvPicPr>
+            <a:picLocks noChangeAspect="1"/>
+          </p:cNvPicPr>
+          <p:nvPr/>
+        </p:nvPicPr>
+        <p:blipFill>
+          <a:blip r:embed="rId36">
+            <a:extLst>
+              <a:ext uri="{96DAC541-7B7A-43D3-8B79-37D633B846F1}">
+                <asvg:svgBlip xmlns:asvg="http://schemas.microsoft.com/office/drawing/2016/SVG/main" r:embed="rId37"/>
+              </a:ext>
+            </a:extLst>
+          </a:blip>
+          <a:stretch>
+            <a:fillRect/>
+          </a:stretch>
+        </p:blipFill>
+        <p:spPr>
+          <a:xfrm>
+            <a:off x="6048651" y="10940943"/>
+            <a:ext cx="910903" cy="910903"/>
+          </a:xfrm>
+          <a:prstGeom prst="rect">
+            <a:avLst/>
+          </a:prstGeom>
+        </p:spPr>
+      </p:pic>
+      <p:pic>
+        <p:nvPicPr>
+          <p:cNvPr id="56" name="Graphic 55" descr="Pie chart with solid fill">
+            <a:extLst>
+              <a:ext uri="{FF2B5EF4-FFF2-40B4-BE49-F238E27FC236}">
+                <a16:creationId xmlns:a16="http://schemas.microsoft.com/office/drawing/2014/main" id="{042DF211-061E-3534-8E26-755B0FC72E54}"/>
+              </a:ext>
+            </a:extLst>
+          </p:cNvPr>
+          <p:cNvPicPr>
+            <a:picLocks noChangeAspect="1"/>
+          </p:cNvPicPr>
+          <p:nvPr/>
+        </p:nvPicPr>
+        <p:blipFill>
+          <a:blip r:embed="rId38">
+            <a:extLst>
+              <a:ext uri="{96DAC541-7B7A-43D3-8B79-37D633B846F1}">
+                <asvg:svgBlip xmlns:asvg="http://schemas.microsoft.com/office/drawing/2016/SVG/main" r:embed="rId39"/>
+              </a:ext>
+            </a:extLst>
+          </a:blip>
+          <a:stretch>
+            <a:fillRect/>
+          </a:stretch>
+        </p:blipFill>
+        <p:spPr>
+          <a:xfrm>
+            <a:off x="6199299" y="7096384"/>
+            <a:ext cx="910903" cy="910903"/>
+          </a:xfrm>
+          <a:prstGeom prst="rect">
+            <a:avLst/>
+          </a:prstGeom>
+        </p:spPr>
+      </p:pic>
+      <p:pic>
+        <p:nvPicPr>
+          <p:cNvPr id="57" name="Graphic 56" descr="Document with solid fill">
+            <a:extLst>
+              <a:ext uri="{FF2B5EF4-FFF2-40B4-BE49-F238E27FC236}">
+                <a16:creationId xmlns:a16="http://schemas.microsoft.com/office/drawing/2014/main" id="{E8FE4F72-3ACB-321B-C402-3A65A9107B22}"/>
+              </a:ext>
+            </a:extLst>
+          </p:cNvPr>
+          <p:cNvPicPr>
+            <a:picLocks noChangeAspect="1"/>
+          </p:cNvPicPr>
+          <p:nvPr/>
+        </p:nvPicPr>
+        <p:blipFill>
+          <a:blip r:embed="rId40">
+            <a:extLst>
+              <a:ext uri="{96DAC541-7B7A-43D3-8B79-37D633B846F1}">
+                <asvg:svgBlip xmlns:asvg="http://schemas.microsoft.com/office/drawing/2016/SVG/main" r:embed="rId41"/>
+              </a:ext>
+            </a:extLst>
+          </a:blip>
+          <a:stretch>
+            <a:fillRect/>
+          </a:stretch>
+        </p:blipFill>
+        <p:spPr>
+          <a:xfrm>
+            <a:off x="7248783" y="7806340"/>
+            <a:ext cx="910903" cy="910903"/>
+          </a:xfrm>
+          <a:prstGeom prst="rect">
+            <a:avLst/>
+          </a:prstGeom>
+        </p:spPr>
+      </p:pic>
+      <p:pic>
+        <p:nvPicPr>
+          <p:cNvPr id="58" name="Graphic 57" descr="Transfer outline">
+            <a:extLst>
+              <a:ext uri="{FF2B5EF4-FFF2-40B4-BE49-F238E27FC236}">
+                <a16:creationId xmlns:a16="http://schemas.microsoft.com/office/drawing/2014/main" id="{86F3DA6C-3CD7-0203-D7CC-6899DF099570}"/>
+              </a:ext>
+            </a:extLst>
+          </p:cNvPr>
+          <p:cNvPicPr>
+            <a:picLocks noChangeAspect="1"/>
+          </p:cNvPicPr>
+          <p:nvPr/>
+        </p:nvPicPr>
+        <p:blipFill>
+          <a:blip r:embed="rId42">
+            <a:extLst>
+              <a:ext uri="{96DAC541-7B7A-43D3-8B79-37D633B846F1}">
+                <asvg:svgBlip xmlns:asvg="http://schemas.microsoft.com/office/drawing/2016/SVG/main" r:embed="rId43"/>
+              </a:ext>
+            </a:extLst>
+          </a:blip>
+          <a:stretch>
+            <a:fillRect/>
+          </a:stretch>
+        </p:blipFill>
+        <p:spPr>
+          <a:xfrm>
+            <a:off x="6893509" y="9050160"/>
+            <a:ext cx="914400" cy="914400"/>
+          </a:xfrm>
+          <a:prstGeom prst="rect">
+            <a:avLst/>
+          </a:prstGeom>
+        </p:spPr>
+      </p:pic>
+      <p:pic>
+        <p:nvPicPr>
+          <p:cNvPr id="59" name="Graphic 58" descr="Transfer outline">
+            <a:extLst>
+              <a:ext uri="{FF2B5EF4-FFF2-40B4-BE49-F238E27FC236}">
+                <a16:creationId xmlns:a16="http://schemas.microsoft.com/office/drawing/2014/main" id="{83D0834B-E096-87AB-5587-0DADC3937587}"/>
+              </a:ext>
+            </a:extLst>
+          </p:cNvPr>
+          <p:cNvPicPr>
+            <a:picLocks noChangeAspect="1"/>
+          </p:cNvPicPr>
+          <p:nvPr/>
+        </p:nvPicPr>
+        <p:blipFill>
+          <a:blip r:embed="rId42">
+            <a:extLst>
+              <a:ext uri="{96DAC541-7B7A-43D3-8B79-37D633B846F1}">
+                <asvg:svgBlip xmlns:asvg="http://schemas.microsoft.com/office/drawing/2016/SVG/main" r:embed="rId43"/>
+              </a:ext>
+            </a:extLst>
+          </a:blip>
+          <a:stretch>
+            <a:fillRect/>
+          </a:stretch>
+        </p:blipFill>
+        <p:spPr>
+          <a:xfrm>
+            <a:off x="4933002" y="8992826"/>
+            <a:ext cx="914400" cy="914400"/>
+          </a:xfrm>
+          <a:prstGeom prst="rect">
+            <a:avLst/>
+          </a:prstGeom>
+        </p:spPr>
+      </p:pic>
+      <p:pic>
+        <p:nvPicPr>
+          <p:cNvPr id="60" name="Graphic 59" descr="Arrow Right with solid fill">
+            <a:extLst>
+              <a:ext uri="{FF2B5EF4-FFF2-40B4-BE49-F238E27FC236}">
+                <a16:creationId xmlns:a16="http://schemas.microsoft.com/office/drawing/2014/main" id="{876D21F7-3231-3C8B-F490-E76E74A8D10D}"/>
+              </a:ext>
+            </a:extLst>
+          </p:cNvPr>
+          <p:cNvPicPr>
+            <a:picLocks noChangeAspect="1"/>
+          </p:cNvPicPr>
+          <p:nvPr/>
+        </p:nvPicPr>
+        <p:blipFill>
+          <a:blip r:embed="rId44">
+            <a:extLst>
+              <a:ext uri="{96DAC541-7B7A-43D3-8B79-37D633B846F1}">
+                <asvg:svgBlip xmlns:asvg="http://schemas.microsoft.com/office/drawing/2016/SVG/main" r:embed="rId45"/>
+              </a:ext>
+            </a:extLst>
+          </a:blip>
+          <a:stretch>
+            <a:fillRect/>
+          </a:stretch>
+        </p:blipFill>
+        <p:spPr>
+          <a:xfrm rot="13039938">
+            <a:off x="5646828" y="8284763"/>
+            <a:ext cx="914400" cy="914400"/>
+          </a:xfrm>
+          <a:prstGeom prst="rect">
+            <a:avLst/>
+          </a:prstGeom>
+        </p:spPr>
+      </p:pic>
+      <p:pic>
+        <p:nvPicPr>
+          <p:cNvPr id="61" name="Graphic 60" descr="Arrow Right with solid fill">
+            <a:extLst>
+              <a:ext uri="{FF2B5EF4-FFF2-40B4-BE49-F238E27FC236}">
+                <a16:creationId xmlns:a16="http://schemas.microsoft.com/office/drawing/2014/main" id="{E83C3A90-9030-A429-AA8D-3FB84E0C1607}"/>
+              </a:ext>
+            </a:extLst>
+          </p:cNvPr>
+          <p:cNvPicPr>
+            <a:picLocks noChangeAspect="1"/>
+          </p:cNvPicPr>
+          <p:nvPr/>
+        </p:nvPicPr>
+        <p:blipFill>
+          <a:blip r:embed="rId44">
+            <a:extLst>
+              <a:ext uri="{96DAC541-7B7A-43D3-8B79-37D633B846F1}">
+                <asvg:svgBlip xmlns:asvg="http://schemas.microsoft.com/office/drawing/2016/SVG/main" r:embed="rId45"/>
+              </a:ext>
+            </a:extLst>
+          </a:blip>
+          <a:stretch>
+            <a:fillRect/>
+          </a:stretch>
+        </p:blipFill>
+        <p:spPr>
+          <a:xfrm rot="16467366">
+            <a:off x="6011015" y="8130713"/>
+            <a:ext cx="914400" cy="914400"/>
+          </a:xfrm>
+          <a:prstGeom prst="rect">
+            <a:avLst/>
+          </a:prstGeom>
+        </p:spPr>
+      </p:pic>
+      <p:pic>
+        <p:nvPicPr>
+          <p:cNvPr id="62" name="Graphic 61" descr="Arrow Right with solid fill">
+            <a:extLst>
+              <a:ext uri="{FF2B5EF4-FFF2-40B4-BE49-F238E27FC236}">
+                <a16:creationId xmlns:a16="http://schemas.microsoft.com/office/drawing/2014/main" id="{74580E44-CDDA-DA23-3560-789CD4A78A9D}"/>
+              </a:ext>
+            </a:extLst>
+          </p:cNvPr>
+          <p:cNvPicPr>
+            <a:picLocks noChangeAspect="1"/>
+          </p:cNvPicPr>
+          <p:nvPr/>
+        </p:nvPicPr>
+        <p:blipFill>
+          <a:blip r:embed="rId44">
+            <a:extLst>
+              <a:ext uri="{96DAC541-7B7A-43D3-8B79-37D633B846F1}">
+                <asvg:svgBlip xmlns:asvg="http://schemas.microsoft.com/office/drawing/2016/SVG/main" r:embed="rId45"/>
+              </a:ext>
+            </a:extLst>
+          </a:blip>
+          <a:stretch>
+            <a:fillRect/>
+          </a:stretch>
+        </p:blipFill>
+        <p:spPr>
+          <a:xfrm rot="19253648">
+            <a:off x="6276785" y="8261338"/>
+            <a:ext cx="914400" cy="914400"/>
+          </a:xfrm>
+          <a:prstGeom prst="rect">
+            <a:avLst/>
+          </a:prstGeom>
+        </p:spPr>
+      </p:pic>
+      <p:pic>
+        <p:nvPicPr>
+          <p:cNvPr id="63" name="Graphic 62" descr="Arrow Right with solid fill">
+            <a:extLst>
+              <a:ext uri="{FF2B5EF4-FFF2-40B4-BE49-F238E27FC236}">
+                <a16:creationId xmlns:a16="http://schemas.microsoft.com/office/drawing/2014/main" id="{FDF42755-7521-8C75-4E2E-815714CF130E}"/>
+              </a:ext>
+            </a:extLst>
+          </p:cNvPr>
+          <p:cNvPicPr>
+            <a:picLocks noChangeAspect="1"/>
+          </p:cNvPicPr>
+          <p:nvPr/>
+        </p:nvPicPr>
+        <p:blipFill>
+          <a:blip r:embed="rId44">
+            <a:extLst>
+              <a:ext uri="{96DAC541-7B7A-43D3-8B79-37D633B846F1}">
+                <asvg:svgBlip xmlns:asvg="http://schemas.microsoft.com/office/drawing/2016/SVG/main" r:embed="rId45"/>
+              </a:ext>
+            </a:extLst>
+          </a:blip>
+          <a:stretch>
+            <a:fillRect/>
+          </a:stretch>
+        </p:blipFill>
+        <p:spPr>
+          <a:xfrm rot="9397180">
+            <a:off x="5581109" y="9651076"/>
+            <a:ext cx="914400" cy="914400"/>
+          </a:xfrm>
+          <a:prstGeom prst="rect">
+            <a:avLst/>
+          </a:prstGeom>
+        </p:spPr>
+      </p:pic>
+      <p:pic>
+        <p:nvPicPr>
+          <p:cNvPr id="1024" name="Graphic 1023" descr="Arrow Right with solid fill">
+            <a:extLst>
+              <a:ext uri="{FF2B5EF4-FFF2-40B4-BE49-F238E27FC236}">
+                <a16:creationId xmlns:a16="http://schemas.microsoft.com/office/drawing/2014/main" id="{B74B2F83-41A3-0C71-9349-73E4DDB0F062}"/>
+              </a:ext>
+            </a:extLst>
+          </p:cNvPr>
+          <p:cNvPicPr>
+            <a:picLocks noChangeAspect="1"/>
+          </p:cNvPicPr>
+          <p:nvPr/>
+        </p:nvPicPr>
+        <p:blipFill>
+          <a:blip r:embed="rId44">
+            <a:extLst>
+              <a:ext uri="{96DAC541-7B7A-43D3-8B79-37D633B846F1}">
+                <asvg:svgBlip xmlns:asvg="http://schemas.microsoft.com/office/drawing/2016/SVG/main" r:embed="rId45"/>
+              </a:ext>
+            </a:extLst>
+          </a:blip>
+          <a:stretch>
+            <a:fillRect/>
+          </a:stretch>
+        </p:blipFill>
+        <p:spPr>
+          <a:xfrm rot="7248496">
+            <a:off x="5742098" y="9853318"/>
+            <a:ext cx="914400" cy="914400"/>
+          </a:xfrm>
+          <a:prstGeom prst="rect">
+            <a:avLst/>
+          </a:prstGeom>
+        </p:spPr>
+      </p:pic>
+      <p:pic>
+        <p:nvPicPr>
+          <p:cNvPr id="1025" name="Graphic 1024" descr="Arrow Right with solid fill">
+            <a:extLst>
+              <a:ext uri="{FF2B5EF4-FFF2-40B4-BE49-F238E27FC236}">
+                <a16:creationId xmlns:a16="http://schemas.microsoft.com/office/drawing/2014/main" id="{55F34A16-8A41-886A-F008-23AB7BA55436}"/>
+              </a:ext>
+            </a:extLst>
+          </p:cNvPr>
+          <p:cNvPicPr>
+            <a:picLocks noChangeAspect="1"/>
+          </p:cNvPicPr>
+          <p:nvPr/>
+        </p:nvPicPr>
+        <p:blipFill>
+          <a:blip r:embed="rId44">
+            <a:extLst>
+              <a:ext uri="{96DAC541-7B7A-43D3-8B79-37D633B846F1}">
+                <asvg:svgBlip xmlns:asvg="http://schemas.microsoft.com/office/drawing/2016/SVG/main" r:embed="rId45"/>
+              </a:ext>
+            </a:extLst>
+          </a:blip>
+          <a:stretch>
+            <a:fillRect/>
+          </a:stretch>
+        </p:blipFill>
+        <p:spPr>
+          <a:xfrm rot="5400000">
+            <a:off x="5961656" y="9883037"/>
+            <a:ext cx="914400" cy="914400"/>
+          </a:xfrm>
+          <a:prstGeom prst="rect">
+            <a:avLst/>
+          </a:prstGeom>
+        </p:spPr>
+      </p:pic>
+      <p:pic>
+        <p:nvPicPr>
+          <p:cNvPr id="1027" name="Graphic 1026" descr="Arrow Right with solid fill">
+            <a:extLst>
+              <a:ext uri="{FF2B5EF4-FFF2-40B4-BE49-F238E27FC236}">
+                <a16:creationId xmlns:a16="http://schemas.microsoft.com/office/drawing/2014/main" id="{723DC9FF-36B1-0F84-1B27-F32AEA556623}"/>
+              </a:ext>
+            </a:extLst>
+          </p:cNvPr>
+          <p:cNvPicPr>
+            <a:picLocks noChangeAspect="1"/>
+          </p:cNvPicPr>
+          <p:nvPr/>
+        </p:nvPicPr>
+        <p:blipFill>
+          <a:blip r:embed="rId44">
+            <a:extLst>
+              <a:ext uri="{96DAC541-7B7A-43D3-8B79-37D633B846F1}">
+                <asvg:svgBlip xmlns:asvg="http://schemas.microsoft.com/office/drawing/2016/SVG/main" r:embed="rId45"/>
+              </a:ext>
+            </a:extLst>
+          </a:blip>
+          <a:stretch>
+            <a:fillRect/>
+          </a:stretch>
+        </p:blipFill>
+        <p:spPr>
+          <a:xfrm rot="2880042">
+            <a:off x="6209257" y="9821625"/>
+            <a:ext cx="1046910" cy="914400"/>
+          </a:xfrm>
+          <a:prstGeom prst="rect">
+            <a:avLst/>
+          </a:prstGeom>
+        </p:spPr>
+      </p:pic>
+      <p:pic>
+        <p:nvPicPr>
+          <p:cNvPr id="1029" name="Graphic 1028" descr="Arrow Right with solid fill">
+            <a:extLst>
+              <a:ext uri="{FF2B5EF4-FFF2-40B4-BE49-F238E27FC236}">
+                <a16:creationId xmlns:a16="http://schemas.microsoft.com/office/drawing/2014/main" id="{AD4CF525-5624-1879-0E12-2C9C96118205}"/>
+              </a:ext>
+            </a:extLst>
+          </p:cNvPr>
+          <p:cNvPicPr>
+            <a:picLocks noChangeAspect="1"/>
+          </p:cNvPicPr>
+          <p:nvPr/>
+        </p:nvPicPr>
+        <p:blipFill>
+          <a:blip r:embed="rId44">
+            <a:extLst>
+              <a:ext uri="{96DAC541-7B7A-43D3-8B79-37D633B846F1}">
+                <asvg:svgBlip xmlns:asvg="http://schemas.microsoft.com/office/drawing/2016/SVG/main" r:embed="rId45"/>
+              </a:ext>
+            </a:extLst>
+          </a:blip>
+          <a:stretch>
+            <a:fillRect/>
+          </a:stretch>
+        </p:blipFill>
+        <p:spPr>
+          <a:xfrm rot="951398">
+            <a:off x="6374260" y="9615103"/>
+            <a:ext cx="1028332" cy="914400"/>
+          </a:xfrm>
+          <a:prstGeom prst="rect">
+            <a:avLst/>
+          </a:prstGeom>
+        </p:spPr>
+      </p:pic>
+      <p:pic>
+        <p:nvPicPr>
+          <p:cNvPr id="1031" name="Graphic 1030" descr="Transfer outline">
+            <a:extLst>
+              <a:ext uri="{FF2B5EF4-FFF2-40B4-BE49-F238E27FC236}">
+                <a16:creationId xmlns:a16="http://schemas.microsoft.com/office/drawing/2014/main" id="{CC45DE35-D966-0112-C490-EA3446E59551}"/>
+              </a:ext>
+            </a:extLst>
+          </p:cNvPr>
+          <p:cNvPicPr>
+            <a:picLocks noChangeAspect="1"/>
+          </p:cNvPicPr>
+          <p:nvPr/>
+        </p:nvPicPr>
+        <p:blipFill>
+          <a:blip r:embed="rId42">
+            <a:extLst>
+              <a:ext uri="{96DAC541-7B7A-43D3-8B79-37D633B846F1}">
+                <asvg:svgBlip xmlns:asvg="http://schemas.microsoft.com/office/drawing/2016/SVG/main" r:embed="rId43"/>
+              </a:ext>
+            </a:extLst>
+          </a:blip>
+          <a:stretch>
+            <a:fillRect/>
+          </a:stretch>
+        </p:blipFill>
+        <p:spPr>
+          <a:xfrm>
+            <a:off x="2878607" y="9000411"/>
+            <a:ext cx="914400" cy="914400"/>
+          </a:xfrm>
+          <a:prstGeom prst="rect">
+            <a:avLst/>
+          </a:prstGeom>
+        </p:spPr>
+      </p:pic>
+      <p:pic>
+        <p:nvPicPr>
+          <p:cNvPr id="1033" name="Picture 1032">
+            <a:extLst>
+              <a:ext uri="{FF2B5EF4-FFF2-40B4-BE49-F238E27FC236}">
+                <a16:creationId xmlns:a16="http://schemas.microsoft.com/office/drawing/2014/main" id="{B9B2F113-4B3C-363B-D71A-FDDAA24DFB8B}"/>
+              </a:ext>
+            </a:extLst>
+          </p:cNvPr>
+          <p:cNvPicPr>
+            <a:picLocks noChangeAspect="1"/>
+          </p:cNvPicPr>
+          <p:nvPr/>
+        </p:nvPicPr>
+        <p:blipFill>
+          <a:blip r:embed="rId4"/>
+          <a:stretch>
+            <a:fillRect/>
+          </a:stretch>
+        </p:blipFill>
+        <p:spPr>
+          <a:xfrm>
+            <a:off x="4053933" y="9195514"/>
+            <a:ext cx="664339" cy="419454"/>
+          </a:xfrm>
+          <a:prstGeom prst="rect">
+            <a:avLst/>
+          </a:prstGeom>
+          <a:ln>
+            <a:solidFill>
+              <a:srgbClr val="046A88"/>
+            </a:solidFill>
+          </a:ln>
+        </p:spPr>
+      </p:pic>
+      <p:pic>
+        <p:nvPicPr>
+          <p:cNvPr id="1036" name="Picture 1035">
+            <a:extLst>
+              <a:ext uri="{FF2B5EF4-FFF2-40B4-BE49-F238E27FC236}">
+                <a16:creationId xmlns:a16="http://schemas.microsoft.com/office/drawing/2014/main" id="{C0B3E529-67C8-F926-D066-873EEF160CD3}"/>
+              </a:ext>
+            </a:extLst>
+          </p:cNvPr>
+          <p:cNvPicPr>
+            <a:picLocks noChangeAspect="1"/>
+          </p:cNvPicPr>
+          <p:nvPr/>
+        </p:nvPicPr>
+        <p:blipFill>
+          <a:blip r:embed="rId46"/>
+          <a:stretch>
+            <a:fillRect/>
+          </a:stretch>
+        </p:blipFill>
+        <p:spPr>
+          <a:xfrm>
+            <a:off x="24432140" y="16054968"/>
+            <a:ext cx="3574698" cy="3531629"/>
+          </a:xfrm>
+          <a:prstGeom prst="rect">
+            <a:avLst/>
+          </a:prstGeom>
+        </p:spPr>
+      </p:pic>
     </p:spTree>
     <p:extLst>
       <p:ext uri="{BB962C8B-B14F-4D97-AF65-F5344CB8AC3E}">
         <p14:creationId xmlns:p14="http://schemas.microsoft.com/office/powerpoint/2010/main" val="3474119542"/>
+      </p:ext>
+    </p:extLst>
+  </p:cSld>
+  <p:clrMapOvr>
+    <a:masterClrMapping/>
+  </p:clrMapOvr>
+</p:sld>
+</file>
+
+<file path=ppt/slides/slide2.xml><?xml version="1.0" encoding="utf-8"?>
+<p:sld xmlns:a="http://schemas.openxmlformats.org/drawingml/2006/main" xmlns:r="http://schemas.openxmlformats.org/officeDocument/2006/relationships" xmlns:p="http://schemas.openxmlformats.org/presentationml/2006/main">
+  <p:cSld>
+    <p:spTree>
+      <p:nvGrpSpPr>
+        <p:cNvPr id="1" name=""/>
+        <p:cNvGrpSpPr/>
+        <p:nvPr/>
+      </p:nvGrpSpPr>
+      <p:grpSpPr>
+        <a:xfrm>
+          <a:off x="0" y="0"/>
+          <a:ext cx="0" cy="0"/>
+          <a:chOff x="0" y="0"/>
+          <a:chExt cx="0" cy="0"/>
+        </a:xfrm>
+      </p:grpSpPr>
+      <p:pic>
+        <p:nvPicPr>
+          <p:cNvPr id="5" name="Graphic 4" descr="Server with solid fill">
+            <a:extLst>
+              <a:ext uri="{FF2B5EF4-FFF2-40B4-BE49-F238E27FC236}">
+                <a16:creationId xmlns:a16="http://schemas.microsoft.com/office/drawing/2014/main" id="{A3EF0AD8-D7AB-9B54-540B-6D97EC23FFAB}"/>
+              </a:ext>
+            </a:extLst>
+          </p:cNvPr>
+          <p:cNvPicPr>
+            <a:picLocks noChangeAspect="1"/>
+          </p:cNvPicPr>
+          <p:nvPr/>
+        </p:nvPicPr>
+        <p:blipFill>
+          <a:blip r:embed="rId2">
+            <a:extLst>
+              <a:ext uri="{96DAC541-7B7A-43D3-8B79-37D633B846F1}">
+                <asvg:svgBlip xmlns:asvg="http://schemas.microsoft.com/office/drawing/2016/SVG/main" r:embed="rId3"/>
+              </a:ext>
+            </a:extLst>
+          </a:blip>
+          <a:stretch>
+            <a:fillRect/>
+          </a:stretch>
+        </p:blipFill>
+        <p:spPr>
+          <a:xfrm>
+            <a:off x="9671265" y="8767568"/>
+            <a:ext cx="914400" cy="914400"/>
+          </a:xfrm>
+          <a:prstGeom prst="rect">
+            <a:avLst/>
+          </a:prstGeom>
+        </p:spPr>
+      </p:pic>
+      <p:pic>
+        <p:nvPicPr>
+          <p:cNvPr id="7" name="Graphic 6" descr="Male profile with solid fill">
+            <a:extLst>
+              <a:ext uri="{FF2B5EF4-FFF2-40B4-BE49-F238E27FC236}">
+                <a16:creationId xmlns:a16="http://schemas.microsoft.com/office/drawing/2014/main" id="{6DF93C4B-BEE2-3645-7E15-20E0CF031F74}"/>
+              </a:ext>
+            </a:extLst>
+          </p:cNvPr>
+          <p:cNvPicPr>
+            <a:picLocks noChangeAspect="1"/>
+          </p:cNvPicPr>
+          <p:nvPr/>
+        </p:nvPicPr>
+        <p:blipFill>
+          <a:blip r:embed="rId4">
+            <a:extLst>
+              <a:ext uri="{96DAC541-7B7A-43D3-8B79-37D633B846F1}">
+                <asvg:svgBlip xmlns:asvg="http://schemas.microsoft.com/office/drawing/2016/SVG/main" r:embed="rId5"/>
+              </a:ext>
+            </a:extLst>
+          </a:blip>
+          <a:stretch>
+            <a:fillRect/>
+          </a:stretch>
+        </p:blipFill>
+        <p:spPr>
+          <a:xfrm>
+            <a:off x="5657355" y="8767568"/>
+            <a:ext cx="914400" cy="914400"/>
+          </a:xfrm>
+          <a:prstGeom prst="rect">
+            <a:avLst/>
+          </a:prstGeom>
+        </p:spPr>
+      </p:pic>
+      <p:pic>
+        <p:nvPicPr>
+          <p:cNvPr id="9" name="Graphic 8" descr="Monitor with solid fill">
+            <a:extLst>
+              <a:ext uri="{FF2B5EF4-FFF2-40B4-BE49-F238E27FC236}">
+                <a16:creationId xmlns:a16="http://schemas.microsoft.com/office/drawing/2014/main" id="{FAF503C8-8A95-C9B5-6B24-B918544105AC}"/>
+              </a:ext>
+            </a:extLst>
+          </p:cNvPr>
+          <p:cNvPicPr>
+            <a:picLocks noChangeAspect="1"/>
+          </p:cNvPicPr>
+          <p:nvPr/>
+        </p:nvPicPr>
+        <p:blipFill>
+          <a:blip r:embed="rId6">
+            <a:extLst>
+              <a:ext uri="{96DAC541-7B7A-43D3-8B79-37D633B846F1}">
+                <asvg:svgBlip xmlns:asvg="http://schemas.microsoft.com/office/drawing/2016/SVG/main" r:embed="rId7"/>
+              </a:ext>
+            </a:extLst>
+          </a:blip>
+          <a:stretch>
+            <a:fillRect/>
+          </a:stretch>
+        </p:blipFill>
+        <p:spPr>
+          <a:xfrm>
+            <a:off x="7622269" y="8772489"/>
+            <a:ext cx="914400" cy="914400"/>
+          </a:xfrm>
+          <a:prstGeom prst="rect">
+            <a:avLst/>
+          </a:prstGeom>
+        </p:spPr>
+      </p:pic>
+      <p:pic>
+        <p:nvPicPr>
+          <p:cNvPr id="13" name="Graphic 12" descr="Database with solid fill">
+            <a:extLst>
+              <a:ext uri="{FF2B5EF4-FFF2-40B4-BE49-F238E27FC236}">
+                <a16:creationId xmlns:a16="http://schemas.microsoft.com/office/drawing/2014/main" id="{34BD7C66-57C2-2C0B-077C-F0E64F727DA8}"/>
+              </a:ext>
+            </a:extLst>
+          </p:cNvPr>
+          <p:cNvPicPr>
+            <a:picLocks noChangeAspect="1"/>
+          </p:cNvPicPr>
+          <p:nvPr/>
+        </p:nvPicPr>
+        <p:blipFill>
+          <a:blip r:embed="rId8">
+            <a:extLst>
+              <a:ext uri="{96DAC541-7B7A-43D3-8B79-37D633B846F1}">
+                <asvg:svgBlip xmlns:asvg="http://schemas.microsoft.com/office/drawing/2016/SVG/main" r:embed="rId9"/>
+              </a:ext>
+            </a:extLst>
+          </a:blip>
+          <a:stretch>
+            <a:fillRect/>
+          </a:stretch>
+        </p:blipFill>
+        <p:spPr>
+          <a:xfrm>
+            <a:off x="11524443" y="8767568"/>
+            <a:ext cx="914400" cy="914400"/>
+          </a:xfrm>
+          <a:prstGeom prst="rect">
+            <a:avLst/>
+          </a:prstGeom>
+        </p:spPr>
+      </p:pic>
+      <p:pic>
+        <p:nvPicPr>
+          <p:cNvPr id="15" name="Graphic 14" descr="Disk with solid fill">
+            <a:extLst>
+              <a:ext uri="{FF2B5EF4-FFF2-40B4-BE49-F238E27FC236}">
+                <a16:creationId xmlns:a16="http://schemas.microsoft.com/office/drawing/2014/main" id="{8D72FAB1-6B22-3E1A-A3F1-7AAFCC144289}"/>
+              </a:ext>
+            </a:extLst>
+          </p:cNvPr>
+          <p:cNvPicPr>
+            <a:picLocks noChangeAspect="1"/>
+          </p:cNvPicPr>
+          <p:nvPr/>
+        </p:nvPicPr>
+        <p:blipFill>
+          <a:blip r:embed="rId10">
+            <a:extLst>
+              <a:ext uri="{96DAC541-7B7A-43D3-8B79-37D633B846F1}">
+                <asvg:svgBlip xmlns:asvg="http://schemas.microsoft.com/office/drawing/2016/SVG/main" r:embed="rId11"/>
+              </a:ext>
+            </a:extLst>
+          </a:blip>
+          <a:stretch>
+            <a:fillRect/>
+          </a:stretch>
+        </p:blipFill>
+        <p:spPr>
+          <a:xfrm>
+            <a:off x="8269394" y="9681968"/>
+            <a:ext cx="910903" cy="910903"/>
+          </a:xfrm>
+          <a:prstGeom prst="rect">
+            <a:avLst/>
+          </a:prstGeom>
+        </p:spPr>
+      </p:pic>
+      <p:pic>
+        <p:nvPicPr>
+          <p:cNvPr id="17" name="Graphic 16" descr="Statistics with solid fill">
+            <a:extLst>
+              <a:ext uri="{FF2B5EF4-FFF2-40B4-BE49-F238E27FC236}">
+                <a16:creationId xmlns:a16="http://schemas.microsoft.com/office/drawing/2014/main" id="{849CAE9B-F2AE-B171-556C-728562C2D527}"/>
+              </a:ext>
+            </a:extLst>
+          </p:cNvPr>
+          <p:cNvPicPr>
+            <a:picLocks noChangeAspect="1"/>
+          </p:cNvPicPr>
+          <p:nvPr/>
+        </p:nvPicPr>
+        <p:blipFill>
+          <a:blip r:embed="rId12">
+            <a:extLst>
+              <a:ext uri="{96DAC541-7B7A-43D3-8B79-37D633B846F1}">
+                <asvg:svgBlip xmlns:asvg="http://schemas.microsoft.com/office/drawing/2016/SVG/main" r:embed="rId13"/>
+              </a:ext>
+            </a:extLst>
+          </a:blip>
+          <a:stretch>
+            <a:fillRect/>
+          </a:stretch>
+        </p:blipFill>
+        <p:spPr>
+          <a:xfrm>
+            <a:off x="8487897" y="7238035"/>
+            <a:ext cx="910903" cy="910903"/>
+          </a:xfrm>
+          <a:prstGeom prst="rect">
+            <a:avLst/>
+          </a:prstGeom>
+        </p:spPr>
+      </p:pic>
+      <p:pic>
+        <p:nvPicPr>
+          <p:cNvPr id="19" name="Graphic 18" descr="Research with solid fill">
+            <a:extLst>
+              <a:ext uri="{FF2B5EF4-FFF2-40B4-BE49-F238E27FC236}">
+                <a16:creationId xmlns:a16="http://schemas.microsoft.com/office/drawing/2014/main" id="{729665B4-B799-6A04-B23B-726EB902BDB8}"/>
+              </a:ext>
+            </a:extLst>
+          </p:cNvPr>
+          <p:cNvPicPr>
+            <a:picLocks noChangeAspect="1"/>
+          </p:cNvPicPr>
+          <p:nvPr/>
+        </p:nvPicPr>
+        <p:blipFill>
+          <a:blip r:embed="rId14">
+            <a:extLst>
+              <a:ext uri="{96DAC541-7B7A-43D3-8B79-37D633B846F1}">
+                <asvg:svgBlip xmlns:asvg="http://schemas.microsoft.com/office/drawing/2016/SVG/main" r:embed="rId15"/>
+              </a:ext>
+            </a:extLst>
+          </a:blip>
+          <a:stretch>
+            <a:fillRect/>
+          </a:stretch>
+        </p:blipFill>
+        <p:spPr>
+          <a:xfrm>
+            <a:off x="11309345" y="9863337"/>
+            <a:ext cx="910903" cy="910903"/>
+          </a:xfrm>
+          <a:prstGeom prst="rect">
+            <a:avLst/>
+          </a:prstGeom>
+        </p:spPr>
+      </p:pic>
+      <p:pic>
+        <p:nvPicPr>
+          <p:cNvPr id="21" name="Graphic 20" descr="Cloud with solid fill">
+            <a:extLst>
+              <a:ext uri="{FF2B5EF4-FFF2-40B4-BE49-F238E27FC236}">
+                <a16:creationId xmlns:a16="http://schemas.microsoft.com/office/drawing/2014/main" id="{53CE6867-B79D-3555-C034-2836B34D4CED}"/>
+              </a:ext>
+            </a:extLst>
+          </p:cNvPr>
+          <p:cNvPicPr>
+            <a:picLocks noChangeAspect="1"/>
+          </p:cNvPicPr>
+          <p:nvPr/>
+        </p:nvPicPr>
+        <p:blipFill>
+          <a:blip r:embed="rId16">
+            <a:extLst>
+              <a:ext uri="{96DAC541-7B7A-43D3-8B79-37D633B846F1}">
+                <asvg:svgBlip xmlns:asvg="http://schemas.microsoft.com/office/drawing/2016/SVG/main" r:embed="rId17"/>
+              </a:ext>
+            </a:extLst>
+          </a:blip>
+          <a:stretch>
+            <a:fillRect/>
+          </a:stretch>
+        </p:blipFill>
+        <p:spPr>
+          <a:xfrm>
+            <a:off x="8669386" y="10399747"/>
+            <a:ext cx="910903" cy="910903"/>
+          </a:xfrm>
+          <a:prstGeom prst="rect">
+            <a:avLst/>
+          </a:prstGeom>
+        </p:spPr>
+      </p:pic>
+      <p:pic>
+        <p:nvPicPr>
+          <p:cNvPr id="23" name="Graphic 22" descr="Usb Stick with solid fill">
+            <a:extLst>
+              <a:ext uri="{FF2B5EF4-FFF2-40B4-BE49-F238E27FC236}">
+                <a16:creationId xmlns:a16="http://schemas.microsoft.com/office/drawing/2014/main" id="{F575EC35-F723-F23E-B70D-E46C9AD8A07D}"/>
+              </a:ext>
+            </a:extLst>
+          </p:cNvPr>
+          <p:cNvPicPr>
+            <a:picLocks noChangeAspect="1"/>
+          </p:cNvPicPr>
+          <p:nvPr/>
+        </p:nvPicPr>
+        <p:blipFill>
+          <a:blip r:embed="rId18">
+            <a:extLst>
+              <a:ext uri="{96DAC541-7B7A-43D3-8B79-37D633B846F1}">
+                <asvg:svgBlip xmlns:asvg="http://schemas.microsoft.com/office/drawing/2016/SVG/main" r:embed="rId19"/>
+              </a:ext>
+            </a:extLst>
+          </a:blip>
+          <a:stretch>
+            <a:fillRect/>
+          </a:stretch>
+        </p:blipFill>
+        <p:spPr>
+          <a:xfrm>
+            <a:off x="10583760" y="10506964"/>
+            <a:ext cx="910903" cy="910903"/>
+          </a:xfrm>
+          <a:prstGeom prst="rect">
+            <a:avLst/>
+          </a:prstGeom>
+        </p:spPr>
+      </p:pic>
+      <p:pic>
+        <p:nvPicPr>
+          <p:cNvPr id="25" name="Graphic 24" descr="Bar chart with solid fill">
+            <a:extLst>
+              <a:ext uri="{FF2B5EF4-FFF2-40B4-BE49-F238E27FC236}">
+                <a16:creationId xmlns:a16="http://schemas.microsoft.com/office/drawing/2014/main" id="{794098BD-2634-81B8-6098-34E741A79BFF}"/>
+              </a:ext>
+            </a:extLst>
+          </p:cNvPr>
+          <p:cNvPicPr>
+            <a:picLocks noChangeAspect="1"/>
+          </p:cNvPicPr>
+          <p:nvPr/>
+        </p:nvPicPr>
+        <p:blipFill>
+          <a:blip r:embed="rId20">
+            <a:extLst>
+              <a:ext uri="{96DAC541-7B7A-43D3-8B79-37D633B846F1}">
+                <asvg:svgBlip xmlns:asvg="http://schemas.microsoft.com/office/drawing/2016/SVG/main" r:embed="rId21"/>
+              </a:ext>
+            </a:extLst>
+          </a:blip>
+          <a:stretch>
+            <a:fillRect/>
+          </a:stretch>
+        </p:blipFill>
+        <p:spPr>
+          <a:xfrm>
+            <a:off x="9741799" y="10708100"/>
+            <a:ext cx="910903" cy="910903"/>
+          </a:xfrm>
+          <a:prstGeom prst="rect">
+            <a:avLst/>
+          </a:prstGeom>
+        </p:spPr>
+      </p:pic>
+      <p:pic>
+        <p:nvPicPr>
+          <p:cNvPr id="27" name="Graphic 26" descr="Pie chart with solid fill">
+            <a:extLst>
+              <a:ext uri="{FF2B5EF4-FFF2-40B4-BE49-F238E27FC236}">
+                <a16:creationId xmlns:a16="http://schemas.microsoft.com/office/drawing/2014/main" id="{C79DF7AF-2CDF-0AC6-AF6B-48D2509CE5C8}"/>
+              </a:ext>
+            </a:extLst>
+          </p:cNvPr>
+          <p:cNvPicPr>
+            <a:picLocks noChangeAspect="1"/>
+          </p:cNvPicPr>
+          <p:nvPr/>
+        </p:nvPicPr>
+        <p:blipFill>
+          <a:blip r:embed="rId22">
+            <a:extLst>
+              <a:ext uri="{96DAC541-7B7A-43D3-8B79-37D633B846F1}">
+                <asvg:svgBlip xmlns:asvg="http://schemas.microsoft.com/office/drawing/2016/SVG/main" r:embed="rId23"/>
+              </a:ext>
+            </a:extLst>
+          </a:blip>
+          <a:stretch>
+            <a:fillRect/>
+          </a:stretch>
+        </p:blipFill>
+        <p:spPr>
+          <a:xfrm>
+            <a:off x="9892447" y="6863541"/>
+            <a:ext cx="910903" cy="910903"/>
+          </a:xfrm>
+          <a:prstGeom prst="rect">
+            <a:avLst/>
+          </a:prstGeom>
+        </p:spPr>
+      </p:pic>
+      <p:pic>
+        <p:nvPicPr>
+          <p:cNvPr id="29" name="Graphic 28" descr="Document with solid fill">
+            <a:extLst>
+              <a:ext uri="{FF2B5EF4-FFF2-40B4-BE49-F238E27FC236}">
+                <a16:creationId xmlns:a16="http://schemas.microsoft.com/office/drawing/2014/main" id="{9F82E088-FC37-7335-533A-56A6C0CF3CEA}"/>
+              </a:ext>
+            </a:extLst>
+          </p:cNvPr>
+          <p:cNvPicPr>
+            <a:picLocks noChangeAspect="1"/>
+          </p:cNvPicPr>
+          <p:nvPr/>
+        </p:nvPicPr>
+        <p:blipFill>
+          <a:blip r:embed="rId24">
+            <a:extLst>
+              <a:ext uri="{96DAC541-7B7A-43D3-8B79-37D633B846F1}">
+                <asvg:svgBlip xmlns:asvg="http://schemas.microsoft.com/office/drawing/2016/SVG/main" r:embed="rId25"/>
+              </a:ext>
+            </a:extLst>
+          </a:blip>
+          <a:stretch>
+            <a:fillRect/>
+          </a:stretch>
+        </p:blipFill>
+        <p:spPr>
+          <a:xfrm>
+            <a:off x="10941931" y="7573497"/>
+            <a:ext cx="910903" cy="910903"/>
+          </a:xfrm>
+          <a:prstGeom prst="rect">
+            <a:avLst/>
+          </a:prstGeom>
+        </p:spPr>
+      </p:pic>
+      <p:pic>
+        <p:nvPicPr>
+          <p:cNvPr id="33" name="Graphic 32" descr="Transfer outline">
+            <a:extLst>
+              <a:ext uri="{FF2B5EF4-FFF2-40B4-BE49-F238E27FC236}">
+                <a16:creationId xmlns:a16="http://schemas.microsoft.com/office/drawing/2014/main" id="{F253A57C-6727-89BB-582B-17499B031B0A}"/>
+              </a:ext>
+            </a:extLst>
+          </p:cNvPr>
+          <p:cNvPicPr>
+            <a:picLocks noChangeAspect="1"/>
+          </p:cNvPicPr>
+          <p:nvPr/>
+        </p:nvPicPr>
+        <p:blipFill>
+          <a:blip r:embed="rId26">
+            <a:extLst>
+              <a:ext uri="{96DAC541-7B7A-43D3-8B79-37D633B846F1}">
+                <asvg:svgBlip xmlns:asvg="http://schemas.microsoft.com/office/drawing/2016/SVG/main" r:embed="rId27"/>
+              </a:ext>
+            </a:extLst>
+          </a:blip>
+          <a:stretch>
+            <a:fillRect/>
+          </a:stretch>
+        </p:blipFill>
+        <p:spPr>
+          <a:xfrm>
+            <a:off x="10586657" y="8817317"/>
+            <a:ext cx="914400" cy="914400"/>
+          </a:xfrm>
+          <a:prstGeom prst="rect">
+            <a:avLst/>
+          </a:prstGeom>
+        </p:spPr>
+      </p:pic>
+      <p:pic>
+        <p:nvPicPr>
+          <p:cNvPr id="34" name="Graphic 33" descr="Transfer outline">
+            <a:extLst>
+              <a:ext uri="{FF2B5EF4-FFF2-40B4-BE49-F238E27FC236}">
+                <a16:creationId xmlns:a16="http://schemas.microsoft.com/office/drawing/2014/main" id="{C7F17D91-E21D-2035-6E8E-0E25EDE8F8BD}"/>
+              </a:ext>
+            </a:extLst>
+          </p:cNvPr>
+          <p:cNvPicPr>
+            <a:picLocks noChangeAspect="1"/>
+          </p:cNvPicPr>
+          <p:nvPr/>
+        </p:nvPicPr>
+        <p:blipFill>
+          <a:blip r:embed="rId26">
+            <a:extLst>
+              <a:ext uri="{96DAC541-7B7A-43D3-8B79-37D633B846F1}">
+                <asvg:svgBlip xmlns:asvg="http://schemas.microsoft.com/office/drawing/2016/SVG/main" r:embed="rId27"/>
+              </a:ext>
+            </a:extLst>
+          </a:blip>
+          <a:stretch>
+            <a:fillRect/>
+          </a:stretch>
+        </p:blipFill>
+        <p:spPr>
+          <a:xfrm>
+            <a:off x="8626150" y="8759983"/>
+            <a:ext cx="914400" cy="914400"/>
+          </a:xfrm>
+          <a:prstGeom prst="rect">
+            <a:avLst/>
+          </a:prstGeom>
+        </p:spPr>
+      </p:pic>
+      <p:pic>
+        <p:nvPicPr>
+          <p:cNvPr id="35" name="Graphic 34" descr="Arrow Right with solid fill">
+            <a:extLst>
+              <a:ext uri="{FF2B5EF4-FFF2-40B4-BE49-F238E27FC236}">
+                <a16:creationId xmlns:a16="http://schemas.microsoft.com/office/drawing/2014/main" id="{085A2870-3FE9-A564-A065-45EDDC2877FC}"/>
+              </a:ext>
+            </a:extLst>
+          </p:cNvPr>
+          <p:cNvPicPr>
+            <a:picLocks noChangeAspect="1"/>
+          </p:cNvPicPr>
+          <p:nvPr/>
+        </p:nvPicPr>
+        <p:blipFill>
+          <a:blip r:embed="rId28">
+            <a:extLst>
+              <a:ext uri="{96DAC541-7B7A-43D3-8B79-37D633B846F1}">
+                <asvg:svgBlip xmlns:asvg="http://schemas.microsoft.com/office/drawing/2016/SVG/main" r:embed="rId29"/>
+              </a:ext>
+            </a:extLst>
+          </a:blip>
+          <a:stretch>
+            <a:fillRect/>
+          </a:stretch>
+        </p:blipFill>
+        <p:spPr>
+          <a:xfrm rot="13039938">
+            <a:off x="9339976" y="8051920"/>
+            <a:ext cx="914400" cy="914400"/>
+          </a:xfrm>
+          <a:prstGeom prst="rect">
+            <a:avLst/>
+          </a:prstGeom>
+        </p:spPr>
+      </p:pic>
+      <p:pic>
+        <p:nvPicPr>
+          <p:cNvPr id="37" name="Graphic 36" descr="Arrow Right with solid fill">
+            <a:extLst>
+              <a:ext uri="{FF2B5EF4-FFF2-40B4-BE49-F238E27FC236}">
+                <a16:creationId xmlns:a16="http://schemas.microsoft.com/office/drawing/2014/main" id="{CFE70AD8-EADC-EA2A-E724-A191B7965D4D}"/>
+              </a:ext>
+            </a:extLst>
+          </p:cNvPr>
+          <p:cNvPicPr>
+            <a:picLocks noChangeAspect="1"/>
+          </p:cNvPicPr>
+          <p:nvPr/>
+        </p:nvPicPr>
+        <p:blipFill>
+          <a:blip r:embed="rId28">
+            <a:extLst>
+              <a:ext uri="{96DAC541-7B7A-43D3-8B79-37D633B846F1}">
+                <asvg:svgBlip xmlns:asvg="http://schemas.microsoft.com/office/drawing/2016/SVG/main" r:embed="rId29"/>
+              </a:ext>
+            </a:extLst>
+          </a:blip>
+          <a:stretch>
+            <a:fillRect/>
+          </a:stretch>
+        </p:blipFill>
+        <p:spPr>
+          <a:xfrm rot="16467366">
+            <a:off x="9704163" y="7897870"/>
+            <a:ext cx="914400" cy="914400"/>
+          </a:xfrm>
+          <a:prstGeom prst="rect">
+            <a:avLst/>
+          </a:prstGeom>
+        </p:spPr>
+      </p:pic>
+      <p:pic>
+        <p:nvPicPr>
+          <p:cNvPr id="38" name="Graphic 37" descr="Arrow Right with solid fill">
+            <a:extLst>
+              <a:ext uri="{FF2B5EF4-FFF2-40B4-BE49-F238E27FC236}">
+                <a16:creationId xmlns:a16="http://schemas.microsoft.com/office/drawing/2014/main" id="{F84FDB14-0833-3D25-6A8A-D83E2BEE7317}"/>
+              </a:ext>
+            </a:extLst>
+          </p:cNvPr>
+          <p:cNvPicPr>
+            <a:picLocks noChangeAspect="1"/>
+          </p:cNvPicPr>
+          <p:nvPr/>
+        </p:nvPicPr>
+        <p:blipFill>
+          <a:blip r:embed="rId28">
+            <a:extLst>
+              <a:ext uri="{96DAC541-7B7A-43D3-8B79-37D633B846F1}">
+                <asvg:svgBlip xmlns:asvg="http://schemas.microsoft.com/office/drawing/2016/SVG/main" r:embed="rId29"/>
+              </a:ext>
+            </a:extLst>
+          </a:blip>
+          <a:stretch>
+            <a:fillRect/>
+          </a:stretch>
+        </p:blipFill>
+        <p:spPr>
+          <a:xfrm rot="19253648">
+            <a:off x="9969933" y="8028495"/>
+            <a:ext cx="914400" cy="914400"/>
+          </a:xfrm>
+          <a:prstGeom prst="rect">
+            <a:avLst/>
+          </a:prstGeom>
+        </p:spPr>
+      </p:pic>
+      <p:pic>
+        <p:nvPicPr>
+          <p:cNvPr id="39" name="Graphic 38" descr="Arrow Right with solid fill">
+            <a:extLst>
+              <a:ext uri="{FF2B5EF4-FFF2-40B4-BE49-F238E27FC236}">
+                <a16:creationId xmlns:a16="http://schemas.microsoft.com/office/drawing/2014/main" id="{F0991858-F7FA-58F5-A87D-209A9672B49E}"/>
+              </a:ext>
+            </a:extLst>
+          </p:cNvPr>
+          <p:cNvPicPr>
+            <a:picLocks noChangeAspect="1"/>
+          </p:cNvPicPr>
+          <p:nvPr/>
+        </p:nvPicPr>
+        <p:blipFill>
+          <a:blip r:embed="rId28">
+            <a:extLst>
+              <a:ext uri="{96DAC541-7B7A-43D3-8B79-37D633B846F1}">
+                <asvg:svgBlip xmlns:asvg="http://schemas.microsoft.com/office/drawing/2016/SVG/main" r:embed="rId29"/>
+              </a:ext>
+            </a:extLst>
+          </a:blip>
+          <a:stretch>
+            <a:fillRect/>
+          </a:stretch>
+        </p:blipFill>
+        <p:spPr>
+          <a:xfrm rot="9397180">
+            <a:off x="9274257" y="9418233"/>
+            <a:ext cx="914400" cy="914400"/>
+          </a:xfrm>
+          <a:prstGeom prst="rect">
+            <a:avLst/>
+          </a:prstGeom>
+        </p:spPr>
+      </p:pic>
+      <p:pic>
+        <p:nvPicPr>
+          <p:cNvPr id="40" name="Graphic 39" descr="Arrow Right with solid fill">
+            <a:extLst>
+              <a:ext uri="{FF2B5EF4-FFF2-40B4-BE49-F238E27FC236}">
+                <a16:creationId xmlns:a16="http://schemas.microsoft.com/office/drawing/2014/main" id="{7C07485F-7E8E-7D7A-B3A4-226BA4E18D65}"/>
+              </a:ext>
+            </a:extLst>
+          </p:cNvPr>
+          <p:cNvPicPr>
+            <a:picLocks noChangeAspect="1"/>
+          </p:cNvPicPr>
+          <p:nvPr/>
+        </p:nvPicPr>
+        <p:blipFill>
+          <a:blip r:embed="rId28">
+            <a:extLst>
+              <a:ext uri="{96DAC541-7B7A-43D3-8B79-37D633B846F1}">
+                <asvg:svgBlip xmlns:asvg="http://schemas.microsoft.com/office/drawing/2016/SVG/main" r:embed="rId29"/>
+              </a:ext>
+            </a:extLst>
+          </a:blip>
+          <a:stretch>
+            <a:fillRect/>
+          </a:stretch>
+        </p:blipFill>
+        <p:spPr>
+          <a:xfrm rot="7248496">
+            <a:off x="9435246" y="9620475"/>
+            <a:ext cx="914400" cy="914400"/>
+          </a:xfrm>
+          <a:prstGeom prst="rect">
+            <a:avLst/>
+          </a:prstGeom>
+        </p:spPr>
+      </p:pic>
+      <p:pic>
+        <p:nvPicPr>
+          <p:cNvPr id="41" name="Graphic 40" descr="Arrow Right with solid fill">
+            <a:extLst>
+              <a:ext uri="{FF2B5EF4-FFF2-40B4-BE49-F238E27FC236}">
+                <a16:creationId xmlns:a16="http://schemas.microsoft.com/office/drawing/2014/main" id="{104B6587-F079-864B-D1AF-27DBE8D84949}"/>
+              </a:ext>
+            </a:extLst>
+          </p:cNvPr>
+          <p:cNvPicPr>
+            <a:picLocks noChangeAspect="1"/>
+          </p:cNvPicPr>
+          <p:nvPr/>
+        </p:nvPicPr>
+        <p:blipFill>
+          <a:blip r:embed="rId28">
+            <a:extLst>
+              <a:ext uri="{96DAC541-7B7A-43D3-8B79-37D633B846F1}">
+                <asvg:svgBlip xmlns:asvg="http://schemas.microsoft.com/office/drawing/2016/SVG/main" r:embed="rId29"/>
+              </a:ext>
+            </a:extLst>
+          </a:blip>
+          <a:stretch>
+            <a:fillRect/>
+          </a:stretch>
+        </p:blipFill>
+        <p:spPr>
+          <a:xfrm rot="5400000">
+            <a:off x="9654804" y="9650194"/>
+            <a:ext cx="914400" cy="914400"/>
+          </a:xfrm>
+          <a:prstGeom prst="rect">
+            <a:avLst/>
+          </a:prstGeom>
+        </p:spPr>
+      </p:pic>
+      <p:pic>
+        <p:nvPicPr>
+          <p:cNvPr id="42" name="Graphic 41" descr="Arrow Right with solid fill">
+            <a:extLst>
+              <a:ext uri="{FF2B5EF4-FFF2-40B4-BE49-F238E27FC236}">
+                <a16:creationId xmlns:a16="http://schemas.microsoft.com/office/drawing/2014/main" id="{598FA893-4C12-FCAC-85FB-9556BE42B4CB}"/>
+              </a:ext>
+            </a:extLst>
+          </p:cNvPr>
+          <p:cNvPicPr>
+            <a:picLocks noChangeAspect="1"/>
+          </p:cNvPicPr>
+          <p:nvPr/>
+        </p:nvPicPr>
+        <p:blipFill>
+          <a:blip r:embed="rId28">
+            <a:extLst>
+              <a:ext uri="{96DAC541-7B7A-43D3-8B79-37D633B846F1}">
+                <asvg:svgBlip xmlns:asvg="http://schemas.microsoft.com/office/drawing/2016/SVG/main" r:embed="rId29"/>
+              </a:ext>
+            </a:extLst>
+          </a:blip>
+          <a:stretch>
+            <a:fillRect/>
+          </a:stretch>
+        </p:blipFill>
+        <p:spPr>
+          <a:xfrm rot="2880042">
+            <a:off x="9902405" y="9588782"/>
+            <a:ext cx="1046910" cy="914400"/>
+          </a:xfrm>
+          <a:prstGeom prst="rect">
+            <a:avLst/>
+          </a:prstGeom>
+        </p:spPr>
+      </p:pic>
+      <p:pic>
+        <p:nvPicPr>
+          <p:cNvPr id="43" name="Graphic 42" descr="Arrow Right with solid fill">
+            <a:extLst>
+              <a:ext uri="{FF2B5EF4-FFF2-40B4-BE49-F238E27FC236}">
+                <a16:creationId xmlns:a16="http://schemas.microsoft.com/office/drawing/2014/main" id="{630B3DA9-53D8-7D96-C573-8420B763B425}"/>
+              </a:ext>
+            </a:extLst>
+          </p:cNvPr>
+          <p:cNvPicPr>
+            <a:picLocks noChangeAspect="1"/>
+          </p:cNvPicPr>
+          <p:nvPr/>
+        </p:nvPicPr>
+        <p:blipFill>
+          <a:blip r:embed="rId28">
+            <a:extLst>
+              <a:ext uri="{96DAC541-7B7A-43D3-8B79-37D633B846F1}">
+                <asvg:svgBlip xmlns:asvg="http://schemas.microsoft.com/office/drawing/2016/SVG/main" r:embed="rId29"/>
+              </a:ext>
+            </a:extLst>
+          </a:blip>
+          <a:stretch>
+            <a:fillRect/>
+          </a:stretch>
+        </p:blipFill>
+        <p:spPr>
+          <a:xfrm rot="951398">
+            <a:off x="10067408" y="9382260"/>
+            <a:ext cx="1028332" cy="914400"/>
+          </a:xfrm>
+          <a:prstGeom prst="rect">
+            <a:avLst/>
+          </a:prstGeom>
+        </p:spPr>
+      </p:pic>
+      <p:pic>
+        <p:nvPicPr>
+          <p:cNvPr id="44" name="Graphic 43" descr="Transfer outline">
+            <a:extLst>
+              <a:ext uri="{FF2B5EF4-FFF2-40B4-BE49-F238E27FC236}">
+                <a16:creationId xmlns:a16="http://schemas.microsoft.com/office/drawing/2014/main" id="{248F44FE-907B-9258-3833-F295D751952A}"/>
+              </a:ext>
+            </a:extLst>
+          </p:cNvPr>
+          <p:cNvPicPr>
+            <a:picLocks noChangeAspect="1"/>
+          </p:cNvPicPr>
+          <p:nvPr/>
+        </p:nvPicPr>
+        <p:blipFill>
+          <a:blip r:embed="rId26">
+            <a:extLst>
+              <a:ext uri="{96DAC541-7B7A-43D3-8B79-37D633B846F1}">
+                <asvg:svgBlip xmlns:asvg="http://schemas.microsoft.com/office/drawing/2016/SVG/main" r:embed="rId27"/>
+              </a:ext>
+            </a:extLst>
+          </a:blip>
+          <a:stretch>
+            <a:fillRect/>
+          </a:stretch>
+        </p:blipFill>
+        <p:spPr>
+          <a:xfrm>
+            <a:off x="6571755" y="8767568"/>
+            <a:ext cx="914400" cy="914400"/>
+          </a:xfrm>
+          <a:prstGeom prst="rect">
+            <a:avLst/>
+          </a:prstGeom>
+        </p:spPr>
+      </p:pic>
+      <p:pic>
+        <p:nvPicPr>
+          <p:cNvPr id="45" name="Picture 44">
+            <a:extLst>
+              <a:ext uri="{FF2B5EF4-FFF2-40B4-BE49-F238E27FC236}">
+                <a16:creationId xmlns:a16="http://schemas.microsoft.com/office/drawing/2014/main" id="{2E64828F-24A6-0D5C-F39F-02E7CB0A162E}"/>
+              </a:ext>
+            </a:extLst>
+          </p:cNvPr>
+          <p:cNvPicPr>
+            <a:picLocks noChangeAspect="1"/>
+          </p:cNvPicPr>
+          <p:nvPr/>
+        </p:nvPicPr>
+        <p:blipFill>
+          <a:blip r:embed="rId30"/>
+          <a:stretch>
+            <a:fillRect/>
+          </a:stretch>
+        </p:blipFill>
+        <p:spPr>
+          <a:xfrm>
+            <a:off x="7747081" y="8962671"/>
+            <a:ext cx="664339" cy="419454"/>
+          </a:xfrm>
+          <a:prstGeom prst="rect">
+            <a:avLst/>
+          </a:prstGeom>
+          <a:ln>
+            <a:solidFill>
+              <a:srgbClr val="046A88"/>
+            </a:solidFill>
+          </a:ln>
+        </p:spPr>
+      </p:pic>
+    </p:spTree>
+    <p:extLst>
+      <p:ext uri="{BB962C8B-B14F-4D97-AF65-F5344CB8AC3E}">
+        <p14:creationId xmlns:p14="http://schemas.microsoft.com/office/powerpoint/2010/main" val="2691727915"/>
       </p:ext>
     </p:extLst>
   </p:cSld>

</xml_diff>

<commit_message>
polishing changes - traffic light colours on scores. score weightings altered. User can compare with previous score to check improvement
</commit_message>
<xml_diff>
--- a/Documentation/10754289.pptx
+++ b/Documentation/10754289.pptx
@@ -6,7 +6,6 @@
   </p:sldMasterIdLst>
   <p:sldIdLst>
     <p:sldId id="256" r:id="rId2"/>
-    <p:sldId id="257" r:id="rId3"/>
   </p:sldIdLst>
   <p:sldSz cx="30275213" cy="21383625"/>
   <p:notesSz cx="6858000" cy="9144000"/>
@@ -5546,899 +5545,6 @@
 </p:sld>
 </file>
 
-<file path=ppt/slides/slide2.xml><?xml version="1.0" encoding="utf-8"?>
-<p:sld xmlns:a="http://schemas.openxmlformats.org/drawingml/2006/main" xmlns:r="http://schemas.openxmlformats.org/officeDocument/2006/relationships" xmlns:p="http://schemas.openxmlformats.org/presentationml/2006/main">
-  <p:cSld>
-    <p:spTree>
-      <p:nvGrpSpPr>
-        <p:cNvPr id="1" name=""/>
-        <p:cNvGrpSpPr/>
-        <p:nvPr/>
-      </p:nvGrpSpPr>
-      <p:grpSpPr>
-        <a:xfrm>
-          <a:off x="0" y="0"/>
-          <a:ext cx="0" cy="0"/>
-          <a:chOff x="0" y="0"/>
-          <a:chExt cx="0" cy="0"/>
-        </a:xfrm>
-      </p:grpSpPr>
-      <p:pic>
-        <p:nvPicPr>
-          <p:cNvPr id="5" name="Graphic 4" descr="Server with solid fill">
-            <a:extLst>
-              <a:ext uri="{FF2B5EF4-FFF2-40B4-BE49-F238E27FC236}">
-                <a16:creationId xmlns:a16="http://schemas.microsoft.com/office/drawing/2014/main" id="{A3EF0AD8-D7AB-9B54-540B-6D97EC23FFAB}"/>
-              </a:ext>
-            </a:extLst>
-          </p:cNvPr>
-          <p:cNvPicPr>
-            <a:picLocks noChangeAspect="1"/>
-          </p:cNvPicPr>
-          <p:nvPr/>
-        </p:nvPicPr>
-        <p:blipFill>
-          <a:blip r:embed="rId2">
-            <a:extLst>
-              <a:ext uri="{96DAC541-7B7A-43D3-8B79-37D633B846F1}">
-                <asvg:svgBlip xmlns:asvg="http://schemas.microsoft.com/office/drawing/2016/SVG/main" r:embed="rId3"/>
-              </a:ext>
-            </a:extLst>
-          </a:blip>
-          <a:stretch>
-            <a:fillRect/>
-          </a:stretch>
-        </p:blipFill>
-        <p:spPr>
-          <a:xfrm>
-            <a:off x="9671265" y="8767568"/>
-            <a:ext cx="914400" cy="914400"/>
-          </a:xfrm>
-          <a:prstGeom prst="rect">
-            <a:avLst/>
-          </a:prstGeom>
-        </p:spPr>
-      </p:pic>
-      <p:pic>
-        <p:nvPicPr>
-          <p:cNvPr id="7" name="Graphic 6" descr="Male profile with solid fill">
-            <a:extLst>
-              <a:ext uri="{FF2B5EF4-FFF2-40B4-BE49-F238E27FC236}">
-                <a16:creationId xmlns:a16="http://schemas.microsoft.com/office/drawing/2014/main" id="{6DF93C4B-BEE2-3645-7E15-20E0CF031F74}"/>
-              </a:ext>
-            </a:extLst>
-          </p:cNvPr>
-          <p:cNvPicPr>
-            <a:picLocks noChangeAspect="1"/>
-          </p:cNvPicPr>
-          <p:nvPr/>
-        </p:nvPicPr>
-        <p:blipFill>
-          <a:blip r:embed="rId4">
-            <a:extLst>
-              <a:ext uri="{96DAC541-7B7A-43D3-8B79-37D633B846F1}">
-                <asvg:svgBlip xmlns:asvg="http://schemas.microsoft.com/office/drawing/2016/SVG/main" r:embed="rId5"/>
-              </a:ext>
-            </a:extLst>
-          </a:blip>
-          <a:stretch>
-            <a:fillRect/>
-          </a:stretch>
-        </p:blipFill>
-        <p:spPr>
-          <a:xfrm>
-            <a:off x="5657355" y="8767568"/>
-            <a:ext cx="914400" cy="914400"/>
-          </a:xfrm>
-          <a:prstGeom prst="rect">
-            <a:avLst/>
-          </a:prstGeom>
-        </p:spPr>
-      </p:pic>
-      <p:pic>
-        <p:nvPicPr>
-          <p:cNvPr id="9" name="Graphic 8" descr="Monitor with solid fill">
-            <a:extLst>
-              <a:ext uri="{FF2B5EF4-FFF2-40B4-BE49-F238E27FC236}">
-                <a16:creationId xmlns:a16="http://schemas.microsoft.com/office/drawing/2014/main" id="{FAF503C8-8A95-C9B5-6B24-B918544105AC}"/>
-              </a:ext>
-            </a:extLst>
-          </p:cNvPr>
-          <p:cNvPicPr>
-            <a:picLocks noChangeAspect="1"/>
-          </p:cNvPicPr>
-          <p:nvPr/>
-        </p:nvPicPr>
-        <p:blipFill>
-          <a:blip r:embed="rId6">
-            <a:extLst>
-              <a:ext uri="{96DAC541-7B7A-43D3-8B79-37D633B846F1}">
-                <asvg:svgBlip xmlns:asvg="http://schemas.microsoft.com/office/drawing/2016/SVG/main" r:embed="rId7"/>
-              </a:ext>
-            </a:extLst>
-          </a:blip>
-          <a:stretch>
-            <a:fillRect/>
-          </a:stretch>
-        </p:blipFill>
-        <p:spPr>
-          <a:xfrm>
-            <a:off x="7622269" y="8772489"/>
-            <a:ext cx="914400" cy="914400"/>
-          </a:xfrm>
-          <a:prstGeom prst="rect">
-            <a:avLst/>
-          </a:prstGeom>
-        </p:spPr>
-      </p:pic>
-      <p:pic>
-        <p:nvPicPr>
-          <p:cNvPr id="13" name="Graphic 12" descr="Database with solid fill">
-            <a:extLst>
-              <a:ext uri="{FF2B5EF4-FFF2-40B4-BE49-F238E27FC236}">
-                <a16:creationId xmlns:a16="http://schemas.microsoft.com/office/drawing/2014/main" id="{34BD7C66-57C2-2C0B-077C-F0E64F727DA8}"/>
-              </a:ext>
-            </a:extLst>
-          </p:cNvPr>
-          <p:cNvPicPr>
-            <a:picLocks noChangeAspect="1"/>
-          </p:cNvPicPr>
-          <p:nvPr/>
-        </p:nvPicPr>
-        <p:blipFill>
-          <a:blip r:embed="rId8">
-            <a:extLst>
-              <a:ext uri="{96DAC541-7B7A-43D3-8B79-37D633B846F1}">
-                <asvg:svgBlip xmlns:asvg="http://schemas.microsoft.com/office/drawing/2016/SVG/main" r:embed="rId9"/>
-              </a:ext>
-            </a:extLst>
-          </a:blip>
-          <a:stretch>
-            <a:fillRect/>
-          </a:stretch>
-        </p:blipFill>
-        <p:spPr>
-          <a:xfrm>
-            <a:off x="11524443" y="8767568"/>
-            <a:ext cx="914400" cy="914400"/>
-          </a:xfrm>
-          <a:prstGeom prst="rect">
-            <a:avLst/>
-          </a:prstGeom>
-        </p:spPr>
-      </p:pic>
-      <p:pic>
-        <p:nvPicPr>
-          <p:cNvPr id="15" name="Graphic 14" descr="Disk with solid fill">
-            <a:extLst>
-              <a:ext uri="{FF2B5EF4-FFF2-40B4-BE49-F238E27FC236}">
-                <a16:creationId xmlns:a16="http://schemas.microsoft.com/office/drawing/2014/main" id="{8D72FAB1-6B22-3E1A-A3F1-7AAFCC144289}"/>
-              </a:ext>
-            </a:extLst>
-          </p:cNvPr>
-          <p:cNvPicPr>
-            <a:picLocks noChangeAspect="1"/>
-          </p:cNvPicPr>
-          <p:nvPr/>
-        </p:nvPicPr>
-        <p:blipFill>
-          <a:blip r:embed="rId10">
-            <a:extLst>
-              <a:ext uri="{96DAC541-7B7A-43D3-8B79-37D633B846F1}">
-                <asvg:svgBlip xmlns:asvg="http://schemas.microsoft.com/office/drawing/2016/SVG/main" r:embed="rId11"/>
-              </a:ext>
-            </a:extLst>
-          </a:blip>
-          <a:stretch>
-            <a:fillRect/>
-          </a:stretch>
-        </p:blipFill>
-        <p:spPr>
-          <a:xfrm>
-            <a:off x="8269394" y="9681968"/>
-            <a:ext cx="910903" cy="910903"/>
-          </a:xfrm>
-          <a:prstGeom prst="rect">
-            <a:avLst/>
-          </a:prstGeom>
-        </p:spPr>
-      </p:pic>
-      <p:pic>
-        <p:nvPicPr>
-          <p:cNvPr id="17" name="Graphic 16" descr="Statistics with solid fill">
-            <a:extLst>
-              <a:ext uri="{FF2B5EF4-FFF2-40B4-BE49-F238E27FC236}">
-                <a16:creationId xmlns:a16="http://schemas.microsoft.com/office/drawing/2014/main" id="{849CAE9B-F2AE-B171-556C-728562C2D527}"/>
-              </a:ext>
-            </a:extLst>
-          </p:cNvPr>
-          <p:cNvPicPr>
-            <a:picLocks noChangeAspect="1"/>
-          </p:cNvPicPr>
-          <p:nvPr/>
-        </p:nvPicPr>
-        <p:blipFill>
-          <a:blip r:embed="rId12">
-            <a:extLst>
-              <a:ext uri="{96DAC541-7B7A-43D3-8B79-37D633B846F1}">
-                <asvg:svgBlip xmlns:asvg="http://schemas.microsoft.com/office/drawing/2016/SVG/main" r:embed="rId13"/>
-              </a:ext>
-            </a:extLst>
-          </a:blip>
-          <a:stretch>
-            <a:fillRect/>
-          </a:stretch>
-        </p:blipFill>
-        <p:spPr>
-          <a:xfrm>
-            <a:off x="8487897" y="7238035"/>
-            <a:ext cx="910903" cy="910903"/>
-          </a:xfrm>
-          <a:prstGeom prst="rect">
-            <a:avLst/>
-          </a:prstGeom>
-        </p:spPr>
-      </p:pic>
-      <p:pic>
-        <p:nvPicPr>
-          <p:cNvPr id="19" name="Graphic 18" descr="Research with solid fill">
-            <a:extLst>
-              <a:ext uri="{FF2B5EF4-FFF2-40B4-BE49-F238E27FC236}">
-                <a16:creationId xmlns:a16="http://schemas.microsoft.com/office/drawing/2014/main" id="{729665B4-B799-6A04-B23B-726EB902BDB8}"/>
-              </a:ext>
-            </a:extLst>
-          </p:cNvPr>
-          <p:cNvPicPr>
-            <a:picLocks noChangeAspect="1"/>
-          </p:cNvPicPr>
-          <p:nvPr/>
-        </p:nvPicPr>
-        <p:blipFill>
-          <a:blip r:embed="rId14">
-            <a:extLst>
-              <a:ext uri="{96DAC541-7B7A-43D3-8B79-37D633B846F1}">
-                <asvg:svgBlip xmlns:asvg="http://schemas.microsoft.com/office/drawing/2016/SVG/main" r:embed="rId15"/>
-              </a:ext>
-            </a:extLst>
-          </a:blip>
-          <a:stretch>
-            <a:fillRect/>
-          </a:stretch>
-        </p:blipFill>
-        <p:spPr>
-          <a:xfrm>
-            <a:off x="11309345" y="9863337"/>
-            <a:ext cx="910903" cy="910903"/>
-          </a:xfrm>
-          <a:prstGeom prst="rect">
-            <a:avLst/>
-          </a:prstGeom>
-        </p:spPr>
-      </p:pic>
-      <p:pic>
-        <p:nvPicPr>
-          <p:cNvPr id="21" name="Graphic 20" descr="Cloud with solid fill">
-            <a:extLst>
-              <a:ext uri="{FF2B5EF4-FFF2-40B4-BE49-F238E27FC236}">
-                <a16:creationId xmlns:a16="http://schemas.microsoft.com/office/drawing/2014/main" id="{53CE6867-B79D-3555-C034-2836B34D4CED}"/>
-              </a:ext>
-            </a:extLst>
-          </p:cNvPr>
-          <p:cNvPicPr>
-            <a:picLocks noChangeAspect="1"/>
-          </p:cNvPicPr>
-          <p:nvPr/>
-        </p:nvPicPr>
-        <p:blipFill>
-          <a:blip r:embed="rId16">
-            <a:extLst>
-              <a:ext uri="{96DAC541-7B7A-43D3-8B79-37D633B846F1}">
-                <asvg:svgBlip xmlns:asvg="http://schemas.microsoft.com/office/drawing/2016/SVG/main" r:embed="rId17"/>
-              </a:ext>
-            </a:extLst>
-          </a:blip>
-          <a:stretch>
-            <a:fillRect/>
-          </a:stretch>
-        </p:blipFill>
-        <p:spPr>
-          <a:xfrm>
-            <a:off x="8669386" y="10399747"/>
-            <a:ext cx="910903" cy="910903"/>
-          </a:xfrm>
-          <a:prstGeom prst="rect">
-            <a:avLst/>
-          </a:prstGeom>
-        </p:spPr>
-      </p:pic>
-      <p:pic>
-        <p:nvPicPr>
-          <p:cNvPr id="23" name="Graphic 22" descr="Usb Stick with solid fill">
-            <a:extLst>
-              <a:ext uri="{FF2B5EF4-FFF2-40B4-BE49-F238E27FC236}">
-                <a16:creationId xmlns:a16="http://schemas.microsoft.com/office/drawing/2014/main" id="{F575EC35-F723-F23E-B70D-E46C9AD8A07D}"/>
-              </a:ext>
-            </a:extLst>
-          </p:cNvPr>
-          <p:cNvPicPr>
-            <a:picLocks noChangeAspect="1"/>
-          </p:cNvPicPr>
-          <p:nvPr/>
-        </p:nvPicPr>
-        <p:blipFill>
-          <a:blip r:embed="rId18">
-            <a:extLst>
-              <a:ext uri="{96DAC541-7B7A-43D3-8B79-37D633B846F1}">
-                <asvg:svgBlip xmlns:asvg="http://schemas.microsoft.com/office/drawing/2016/SVG/main" r:embed="rId19"/>
-              </a:ext>
-            </a:extLst>
-          </a:blip>
-          <a:stretch>
-            <a:fillRect/>
-          </a:stretch>
-        </p:blipFill>
-        <p:spPr>
-          <a:xfrm>
-            <a:off x="10583760" y="10506964"/>
-            <a:ext cx="910903" cy="910903"/>
-          </a:xfrm>
-          <a:prstGeom prst="rect">
-            <a:avLst/>
-          </a:prstGeom>
-        </p:spPr>
-      </p:pic>
-      <p:pic>
-        <p:nvPicPr>
-          <p:cNvPr id="25" name="Graphic 24" descr="Bar chart with solid fill">
-            <a:extLst>
-              <a:ext uri="{FF2B5EF4-FFF2-40B4-BE49-F238E27FC236}">
-                <a16:creationId xmlns:a16="http://schemas.microsoft.com/office/drawing/2014/main" id="{794098BD-2634-81B8-6098-34E741A79BFF}"/>
-              </a:ext>
-            </a:extLst>
-          </p:cNvPr>
-          <p:cNvPicPr>
-            <a:picLocks noChangeAspect="1"/>
-          </p:cNvPicPr>
-          <p:nvPr/>
-        </p:nvPicPr>
-        <p:blipFill>
-          <a:blip r:embed="rId20">
-            <a:extLst>
-              <a:ext uri="{96DAC541-7B7A-43D3-8B79-37D633B846F1}">
-                <asvg:svgBlip xmlns:asvg="http://schemas.microsoft.com/office/drawing/2016/SVG/main" r:embed="rId21"/>
-              </a:ext>
-            </a:extLst>
-          </a:blip>
-          <a:stretch>
-            <a:fillRect/>
-          </a:stretch>
-        </p:blipFill>
-        <p:spPr>
-          <a:xfrm>
-            <a:off x="9741799" y="10708100"/>
-            <a:ext cx="910903" cy="910903"/>
-          </a:xfrm>
-          <a:prstGeom prst="rect">
-            <a:avLst/>
-          </a:prstGeom>
-        </p:spPr>
-      </p:pic>
-      <p:pic>
-        <p:nvPicPr>
-          <p:cNvPr id="27" name="Graphic 26" descr="Pie chart with solid fill">
-            <a:extLst>
-              <a:ext uri="{FF2B5EF4-FFF2-40B4-BE49-F238E27FC236}">
-                <a16:creationId xmlns:a16="http://schemas.microsoft.com/office/drawing/2014/main" id="{C79DF7AF-2CDF-0AC6-AF6B-48D2509CE5C8}"/>
-              </a:ext>
-            </a:extLst>
-          </p:cNvPr>
-          <p:cNvPicPr>
-            <a:picLocks noChangeAspect="1"/>
-          </p:cNvPicPr>
-          <p:nvPr/>
-        </p:nvPicPr>
-        <p:blipFill>
-          <a:blip r:embed="rId22">
-            <a:extLst>
-              <a:ext uri="{96DAC541-7B7A-43D3-8B79-37D633B846F1}">
-                <asvg:svgBlip xmlns:asvg="http://schemas.microsoft.com/office/drawing/2016/SVG/main" r:embed="rId23"/>
-              </a:ext>
-            </a:extLst>
-          </a:blip>
-          <a:stretch>
-            <a:fillRect/>
-          </a:stretch>
-        </p:blipFill>
-        <p:spPr>
-          <a:xfrm>
-            <a:off x="9892447" y="6863541"/>
-            <a:ext cx="910903" cy="910903"/>
-          </a:xfrm>
-          <a:prstGeom prst="rect">
-            <a:avLst/>
-          </a:prstGeom>
-        </p:spPr>
-      </p:pic>
-      <p:pic>
-        <p:nvPicPr>
-          <p:cNvPr id="29" name="Graphic 28" descr="Document with solid fill">
-            <a:extLst>
-              <a:ext uri="{FF2B5EF4-FFF2-40B4-BE49-F238E27FC236}">
-                <a16:creationId xmlns:a16="http://schemas.microsoft.com/office/drawing/2014/main" id="{9F82E088-FC37-7335-533A-56A6C0CF3CEA}"/>
-              </a:ext>
-            </a:extLst>
-          </p:cNvPr>
-          <p:cNvPicPr>
-            <a:picLocks noChangeAspect="1"/>
-          </p:cNvPicPr>
-          <p:nvPr/>
-        </p:nvPicPr>
-        <p:blipFill>
-          <a:blip r:embed="rId24">
-            <a:extLst>
-              <a:ext uri="{96DAC541-7B7A-43D3-8B79-37D633B846F1}">
-                <asvg:svgBlip xmlns:asvg="http://schemas.microsoft.com/office/drawing/2016/SVG/main" r:embed="rId25"/>
-              </a:ext>
-            </a:extLst>
-          </a:blip>
-          <a:stretch>
-            <a:fillRect/>
-          </a:stretch>
-        </p:blipFill>
-        <p:spPr>
-          <a:xfrm>
-            <a:off x="10941931" y="7573497"/>
-            <a:ext cx="910903" cy="910903"/>
-          </a:xfrm>
-          <a:prstGeom prst="rect">
-            <a:avLst/>
-          </a:prstGeom>
-        </p:spPr>
-      </p:pic>
-      <p:pic>
-        <p:nvPicPr>
-          <p:cNvPr id="33" name="Graphic 32" descr="Transfer outline">
-            <a:extLst>
-              <a:ext uri="{FF2B5EF4-FFF2-40B4-BE49-F238E27FC236}">
-                <a16:creationId xmlns:a16="http://schemas.microsoft.com/office/drawing/2014/main" id="{F253A57C-6727-89BB-582B-17499B031B0A}"/>
-              </a:ext>
-            </a:extLst>
-          </p:cNvPr>
-          <p:cNvPicPr>
-            <a:picLocks noChangeAspect="1"/>
-          </p:cNvPicPr>
-          <p:nvPr/>
-        </p:nvPicPr>
-        <p:blipFill>
-          <a:blip r:embed="rId26">
-            <a:extLst>
-              <a:ext uri="{96DAC541-7B7A-43D3-8B79-37D633B846F1}">
-                <asvg:svgBlip xmlns:asvg="http://schemas.microsoft.com/office/drawing/2016/SVG/main" r:embed="rId27"/>
-              </a:ext>
-            </a:extLst>
-          </a:blip>
-          <a:stretch>
-            <a:fillRect/>
-          </a:stretch>
-        </p:blipFill>
-        <p:spPr>
-          <a:xfrm>
-            <a:off x="10586657" y="8817317"/>
-            <a:ext cx="914400" cy="914400"/>
-          </a:xfrm>
-          <a:prstGeom prst="rect">
-            <a:avLst/>
-          </a:prstGeom>
-        </p:spPr>
-      </p:pic>
-      <p:pic>
-        <p:nvPicPr>
-          <p:cNvPr id="34" name="Graphic 33" descr="Transfer outline">
-            <a:extLst>
-              <a:ext uri="{FF2B5EF4-FFF2-40B4-BE49-F238E27FC236}">
-                <a16:creationId xmlns:a16="http://schemas.microsoft.com/office/drawing/2014/main" id="{C7F17D91-E21D-2035-6E8E-0E25EDE8F8BD}"/>
-              </a:ext>
-            </a:extLst>
-          </p:cNvPr>
-          <p:cNvPicPr>
-            <a:picLocks noChangeAspect="1"/>
-          </p:cNvPicPr>
-          <p:nvPr/>
-        </p:nvPicPr>
-        <p:blipFill>
-          <a:blip r:embed="rId26">
-            <a:extLst>
-              <a:ext uri="{96DAC541-7B7A-43D3-8B79-37D633B846F1}">
-                <asvg:svgBlip xmlns:asvg="http://schemas.microsoft.com/office/drawing/2016/SVG/main" r:embed="rId27"/>
-              </a:ext>
-            </a:extLst>
-          </a:blip>
-          <a:stretch>
-            <a:fillRect/>
-          </a:stretch>
-        </p:blipFill>
-        <p:spPr>
-          <a:xfrm>
-            <a:off x="8626150" y="8759983"/>
-            <a:ext cx="914400" cy="914400"/>
-          </a:xfrm>
-          <a:prstGeom prst="rect">
-            <a:avLst/>
-          </a:prstGeom>
-        </p:spPr>
-      </p:pic>
-      <p:pic>
-        <p:nvPicPr>
-          <p:cNvPr id="35" name="Graphic 34" descr="Arrow Right with solid fill">
-            <a:extLst>
-              <a:ext uri="{FF2B5EF4-FFF2-40B4-BE49-F238E27FC236}">
-                <a16:creationId xmlns:a16="http://schemas.microsoft.com/office/drawing/2014/main" id="{085A2870-3FE9-A564-A065-45EDDC2877FC}"/>
-              </a:ext>
-            </a:extLst>
-          </p:cNvPr>
-          <p:cNvPicPr>
-            <a:picLocks noChangeAspect="1"/>
-          </p:cNvPicPr>
-          <p:nvPr/>
-        </p:nvPicPr>
-        <p:blipFill>
-          <a:blip r:embed="rId28">
-            <a:extLst>
-              <a:ext uri="{96DAC541-7B7A-43D3-8B79-37D633B846F1}">
-                <asvg:svgBlip xmlns:asvg="http://schemas.microsoft.com/office/drawing/2016/SVG/main" r:embed="rId29"/>
-              </a:ext>
-            </a:extLst>
-          </a:blip>
-          <a:stretch>
-            <a:fillRect/>
-          </a:stretch>
-        </p:blipFill>
-        <p:spPr>
-          <a:xfrm rot="13039938">
-            <a:off x="9339976" y="8051920"/>
-            <a:ext cx="914400" cy="914400"/>
-          </a:xfrm>
-          <a:prstGeom prst="rect">
-            <a:avLst/>
-          </a:prstGeom>
-        </p:spPr>
-      </p:pic>
-      <p:pic>
-        <p:nvPicPr>
-          <p:cNvPr id="37" name="Graphic 36" descr="Arrow Right with solid fill">
-            <a:extLst>
-              <a:ext uri="{FF2B5EF4-FFF2-40B4-BE49-F238E27FC236}">
-                <a16:creationId xmlns:a16="http://schemas.microsoft.com/office/drawing/2014/main" id="{CFE70AD8-EADC-EA2A-E724-A191B7965D4D}"/>
-              </a:ext>
-            </a:extLst>
-          </p:cNvPr>
-          <p:cNvPicPr>
-            <a:picLocks noChangeAspect="1"/>
-          </p:cNvPicPr>
-          <p:nvPr/>
-        </p:nvPicPr>
-        <p:blipFill>
-          <a:blip r:embed="rId28">
-            <a:extLst>
-              <a:ext uri="{96DAC541-7B7A-43D3-8B79-37D633B846F1}">
-                <asvg:svgBlip xmlns:asvg="http://schemas.microsoft.com/office/drawing/2016/SVG/main" r:embed="rId29"/>
-              </a:ext>
-            </a:extLst>
-          </a:blip>
-          <a:stretch>
-            <a:fillRect/>
-          </a:stretch>
-        </p:blipFill>
-        <p:spPr>
-          <a:xfrm rot="16467366">
-            <a:off x="9704163" y="7897870"/>
-            <a:ext cx="914400" cy="914400"/>
-          </a:xfrm>
-          <a:prstGeom prst="rect">
-            <a:avLst/>
-          </a:prstGeom>
-        </p:spPr>
-      </p:pic>
-      <p:pic>
-        <p:nvPicPr>
-          <p:cNvPr id="38" name="Graphic 37" descr="Arrow Right with solid fill">
-            <a:extLst>
-              <a:ext uri="{FF2B5EF4-FFF2-40B4-BE49-F238E27FC236}">
-                <a16:creationId xmlns:a16="http://schemas.microsoft.com/office/drawing/2014/main" id="{F84FDB14-0833-3D25-6A8A-D83E2BEE7317}"/>
-              </a:ext>
-            </a:extLst>
-          </p:cNvPr>
-          <p:cNvPicPr>
-            <a:picLocks noChangeAspect="1"/>
-          </p:cNvPicPr>
-          <p:nvPr/>
-        </p:nvPicPr>
-        <p:blipFill>
-          <a:blip r:embed="rId28">
-            <a:extLst>
-              <a:ext uri="{96DAC541-7B7A-43D3-8B79-37D633B846F1}">
-                <asvg:svgBlip xmlns:asvg="http://schemas.microsoft.com/office/drawing/2016/SVG/main" r:embed="rId29"/>
-              </a:ext>
-            </a:extLst>
-          </a:blip>
-          <a:stretch>
-            <a:fillRect/>
-          </a:stretch>
-        </p:blipFill>
-        <p:spPr>
-          <a:xfrm rot="19253648">
-            <a:off x="9969933" y="8028495"/>
-            <a:ext cx="914400" cy="914400"/>
-          </a:xfrm>
-          <a:prstGeom prst="rect">
-            <a:avLst/>
-          </a:prstGeom>
-        </p:spPr>
-      </p:pic>
-      <p:pic>
-        <p:nvPicPr>
-          <p:cNvPr id="39" name="Graphic 38" descr="Arrow Right with solid fill">
-            <a:extLst>
-              <a:ext uri="{FF2B5EF4-FFF2-40B4-BE49-F238E27FC236}">
-                <a16:creationId xmlns:a16="http://schemas.microsoft.com/office/drawing/2014/main" id="{F0991858-F7FA-58F5-A87D-209A9672B49E}"/>
-              </a:ext>
-            </a:extLst>
-          </p:cNvPr>
-          <p:cNvPicPr>
-            <a:picLocks noChangeAspect="1"/>
-          </p:cNvPicPr>
-          <p:nvPr/>
-        </p:nvPicPr>
-        <p:blipFill>
-          <a:blip r:embed="rId28">
-            <a:extLst>
-              <a:ext uri="{96DAC541-7B7A-43D3-8B79-37D633B846F1}">
-                <asvg:svgBlip xmlns:asvg="http://schemas.microsoft.com/office/drawing/2016/SVG/main" r:embed="rId29"/>
-              </a:ext>
-            </a:extLst>
-          </a:blip>
-          <a:stretch>
-            <a:fillRect/>
-          </a:stretch>
-        </p:blipFill>
-        <p:spPr>
-          <a:xfrm rot="9397180">
-            <a:off x="9274257" y="9418233"/>
-            <a:ext cx="914400" cy="914400"/>
-          </a:xfrm>
-          <a:prstGeom prst="rect">
-            <a:avLst/>
-          </a:prstGeom>
-        </p:spPr>
-      </p:pic>
-      <p:pic>
-        <p:nvPicPr>
-          <p:cNvPr id="40" name="Graphic 39" descr="Arrow Right with solid fill">
-            <a:extLst>
-              <a:ext uri="{FF2B5EF4-FFF2-40B4-BE49-F238E27FC236}">
-                <a16:creationId xmlns:a16="http://schemas.microsoft.com/office/drawing/2014/main" id="{7C07485F-7E8E-7D7A-B3A4-226BA4E18D65}"/>
-              </a:ext>
-            </a:extLst>
-          </p:cNvPr>
-          <p:cNvPicPr>
-            <a:picLocks noChangeAspect="1"/>
-          </p:cNvPicPr>
-          <p:nvPr/>
-        </p:nvPicPr>
-        <p:blipFill>
-          <a:blip r:embed="rId28">
-            <a:extLst>
-              <a:ext uri="{96DAC541-7B7A-43D3-8B79-37D633B846F1}">
-                <asvg:svgBlip xmlns:asvg="http://schemas.microsoft.com/office/drawing/2016/SVG/main" r:embed="rId29"/>
-              </a:ext>
-            </a:extLst>
-          </a:blip>
-          <a:stretch>
-            <a:fillRect/>
-          </a:stretch>
-        </p:blipFill>
-        <p:spPr>
-          <a:xfrm rot="7248496">
-            <a:off x="9435246" y="9620475"/>
-            <a:ext cx="914400" cy="914400"/>
-          </a:xfrm>
-          <a:prstGeom prst="rect">
-            <a:avLst/>
-          </a:prstGeom>
-        </p:spPr>
-      </p:pic>
-      <p:pic>
-        <p:nvPicPr>
-          <p:cNvPr id="41" name="Graphic 40" descr="Arrow Right with solid fill">
-            <a:extLst>
-              <a:ext uri="{FF2B5EF4-FFF2-40B4-BE49-F238E27FC236}">
-                <a16:creationId xmlns:a16="http://schemas.microsoft.com/office/drawing/2014/main" id="{104B6587-F079-864B-D1AF-27DBE8D84949}"/>
-              </a:ext>
-            </a:extLst>
-          </p:cNvPr>
-          <p:cNvPicPr>
-            <a:picLocks noChangeAspect="1"/>
-          </p:cNvPicPr>
-          <p:nvPr/>
-        </p:nvPicPr>
-        <p:blipFill>
-          <a:blip r:embed="rId28">
-            <a:extLst>
-              <a:ext uri="{96DAC541-7B7A-43D3-8B79-37D633B846F1}">
-                <asvg:svgBlip xmlns:asvg="http://schemas.microsoft.com/office/drawing/2016/SVG/main" r:embed="rId29"/>
-              </a:ext>
-            </a:extLst>
-          </a:blip>
-          <a:stretch>
-            <a:fillRect/>
-          </a:stretch>
-        </p:blipFill>
-        <p:spPr>
-          <a:xfrm rot="5400000">
-            <a:off x="9654804" y="9650194"/>
-            <a:ext cx="914400" cy="914400"/>
-          </a:xfrm>
-          <a:prstGeom prst="rect">
-            <a:avLst/>
-          </a:prstGeom>
-        </p:spPr>
-      </p:pic>
-      <p:pic>
-        <p:nvPicPr>
-          <p:cNvPr id="42" name="Graphic 41" descr="Arrow Right with solid fill">
-            <a:extLst>
-              <a:ext uri="{FF2B5EF4-FFF2-40B4-BE49-F238E27FC236}">
-                <a16:creationId xmlns:a16="http://schemas.microsoft.com/office/drawing/2014/main" id="{598FA893-4C12-FCAC-85FB-9556BE42B4CB}"/>
-              </a:ext>
-            </a:extLst>
-          </p:cNvPr>
-          <p:cNvPicPr>
-            <a:picLocks noChangeAspect="1"/>
-          </p:cNvPicPr>
-          <p:nvPr/>
-        </p:nvPicPr>
-        <p:blipFill>
-          <a:blip r:embed="rId28">
-            <a:extLst>
-              <a:ext uri="{96DAC541-7B7A-43D3-8B79-37D633B846F1}">
-                <asvg:svgBlip xmlns:asvg="http://schemas.microsoft.com/office/drawing/2016/SVG/main" r:embed="rId29"/>
-              </a:ext>
-            </a:extLst>
-          </a:blip>
-          <a:stretch>
-            <a:fillRect/>
-          </a:stretch>
-        </p:blipFill>
-        <p:spPr>
-          <a:xfrm rot="2880042">
-            <a:off x="9902405" y="9588782"/>
-            <a:ext cx="1046910" cy="914400"/>
-          </a:xfrm>
-          <a:prstGeom prst="rect">
-            <a:avLst/>
-          </a:prstGeom>
-        </p:spPr>
-      </p:pic>
-      <p:pic>
-        <p:nvPicPr>
-          <p:cNvPr id="43" name="Graphic 42" descr="Arrow Right with solid fill">
-            <a:extLst>
-              <a:ext uri="{FF2B5EF4-FFF2-40B4-BE49-F238E27FC236}">
-                <a16:creationId xmlns:a16="http://schemas.microsoft.com/office/drawing/2014/main" id="{630B3DA9-53D8-7D96-C573-8420B763B425}"/>
-              </a:ext>
-            </a:extLst>
-          </p:cNvPr>
-          <p:cNvPicPr>
-            <a:picLocks noChangeAspect="1"/>
-          </p:cNvPicPr>
-          <p:nvPr/>
-        </p:nvPicPr>
-        <p:blipFill>
-          <a:blip r:embed="rId28">
-            <a:extLst>
-              <a:ext uri="{96DAC541-7B7A-43D3-8B79-37D633B846F1}">
-                <asvg:svgBlip xmlns:asvg="http://schemas.microsoft.com/office/drawing/2016/SVG/main" r:embed="rId29"/>
-              </a:ext>
-            </a:extLst>
-          </a:blip>
-          <a:stretch>
-            <a:fillRect/>
-          </a:stretch>
-        </p:blipFill>
-        <p:spPr>
-          <a:xfrm rot="951398">
-            <a:off x="10067408" y="9382260"/>
-            <a:ext cx="1028332" cy="914400"/>
-          </a:xfrm>
-          <a:prstGeom prst="rect">
-            <a:avLst/>
-          </a:prstGeom>
-        </p:spPr>
-      </p:pic>
-      <p:pic>
-        <p:nvPicPr>
-          <p:cNvPr id="44" name="Graphic 43" descr="Transfer outline">
-            <a:extLst>
-              <a:ext uri="{FF2B5EF4-FFF2-40B4-BE49-F238E27FC236}">
-                <a16:creationId xmlns:a16="http://schemas.microsoft.com/office/drawing/2014/main" id="{248F44FE-907B-9258-3833-F295D751952A}"/>
-              </a:ext>
-            </a:extLst>
-          </p:cNvPr>
-          <p:cNvPicPr>
-            <a:picLocks noChangeAspect="1"/>
-          </p:cNvPicPr>
-          <p:nvPr/>
-        </p:nvPicPr>
-        <p:blipFill>
-          <a:blip r:embed="rId26">
-            <a:extLst>
-              <a:ext uri="{96DAC541-7B7A-43D3-8B79-37D633B846F1}">
-                <asvg:svgBlip xmlns:asvg="http://schemas.microsoft.com/office/drawing/2016/SVG/main" r:embed="rId27"/>
-              </a:ext>
-            </a:extLst>
-          </a:blip>
-          <a:stretch>
-            <a:fillRect/>
-          </a:stretch>
-        </p:blipFill>
-        <p:spPr>
-          <a:xfrm>
-            <a:off x="6571755" y="8767568"/>
-            <a:ext cx="914400" cy="914400"/>
-          </a:xfrm>
-          <a:prstGeom prst="rect">
-            <a:avLst/>
-          </a:prstGeom>
-        </p:spPr>
-      </p:pic>
-      <p:pic>
-        <p:nvPicPr>
-          <p:cNvPr id="45" name="Picture 44">
-            <a:extLst>
-              <a:ext uri="{FF2B5EF4-FFF2-40B4-BE49-F238E27FC236}">
-                <a16:creationId xmlns:a16="http://schemas.microsoft.com/office/drawing/2014/main" id="{2E64828F-24A6-0D5C-F39F-02E7CB0A162E}"/>
-              </a:ext>
-            </a:extLst>
-          </p:cNvPr>
-          <p:cNvPicPr>
-            <a:picLocks noChangeAspect="1"/>
-          </p:cNvPicPr>
-          <p:nvPr/>
-        </p:nvPicPr>
-        <p:blipFill>
-          <a:blip r:embed="rId30"/>
-          <a:stretch>
-            <a:fillRect/>
-          </a:stretch>
-        </p:blipFill>
-        <p:spPr>
-          <a:xfrm>
-            <a:off x="7747081" y="8962671"/>
-            <a:ext cx="664339" cy="419454"/>
-          </a:xfrm>
-          <a:prstGeom prst="rect">
-            <a:avLst/>
-          </a:prstGeom>
-          <a:ln>
-            <a:solidFill>
-              <a:srgbClr val="046A88"/>
-            </a:solidFill>
-          </a:ln>
-        </p:spPr>
-      </p:pic>
-    </p:spTree>
-    <p:extLst>
-      <p:ext uri="{BB962C8B-B14F-4D97-AF65-F5344CB8AC3E}">
-        <p14:creationId xmlns:p14="http://schemas.microsoft.com/office/powerpoint/2010/main" val="2691727915"/>
-      </p:ext>
-    </p:extLst>
-  </p:cSld>
-  <p:clrMapOvr>
-    <a:masterClrMapping/>
-  </p:clrMapOvr>
-</p:sld>
-</file>
-
 <file path=ppt/theme/theme1.xml><?xml version="1.0" encoding="utf-8"?>
 <a:theme xmlns:a="http://schemas.openxmlformats.org/drawingml/2006/main" name="Office Theme">
   <a:themeElements>

</xml_diff>

<commit_message>
Final commit, following Unit testing and UAT
</commit_message>
<xml_diff>
--- a/Documentation/10754289.pptx
+++ b/Documentation/10754289.pptx
@@ -243,7 +243,7 @@
           <a:p>
             <a:fld id="{63658808-8346-4240-85EF-58CABB889A10}" type="datetimeFigureOut">
               <a:rPr lang="en-GB" smtClean="0"/>
-              <a:t>18/03/2025</a:t>
+              <a:t>03/04/2025</a:t>
             </a:fld>
             <a:endParaRPr lang="en-GB"/>
           </a:p>
@@ -413,7 +413,7 @@
           <a:p>
             <a:fld id="{63658808-8346-4240-85EF-58CABB889A10}" type="datetimeFigureOut">
               <a:rPr lang="en-GB" smtClean="0"/>
-              <a:t>18/03/2025</a:t>
+              <a:t>03/04/2025</a:t>
             </a:fld>
             <a:endParaRPr lang="en-GB"/>
           </a:p>
@@ -593,7 +593,7 @@
           <a:p>
             <a:fld id="{63658808-8346-4240-85EF-58CABB889A10}" type="datetimeFigureOut">
               <a:rPr lang="en-GB" smtClean="0"/>
-              <a:t>18/03/2025</a:t>
+              <a:t>03/04/2025</a:t>
             </a:fld>
             <a:endParaRPr lang="en-GB"/>
           </a:p>
@@ -763,7 +763,7 @@
           <a:p>
             <a:fld id="{63658808-8346-4240-85EF-58CABB889A10}" type="datetimeFigureOut">
               <a:rPr lang="en-GB" smtClean="0"/>
-              <a:t>18/03/2025</a:t>
+              <a:t>03/04/2025</a:t>
             </a:fld>
             <a:endParaRPr lang="en-GB"/>
           </a:p>
@@ -1009,7 +1009,7 @@
           <a:p>
             <a:fld id="{63658808-8346-4240-85EF-58CABB889A10}" type="datetimeFigureOut">
               <a:rPr lang="en-GB" smtClean="0"/>
-              <a:t>18/03/2025</a:t>
+              <a:t>03/04/2025</a:t>
             </a:fld>
             <a:endParaRPr lang="en-GB"/>
           </a:p>
@@ -1241,7 +1241,7 @@
           <a:p>
             <a:fld id="{63658808-8346-4240-85EF-58CABB889A10}" type="datetimeFigureOut">
               <a:rPr lang="en-GB" smtClean="0"/>
-              <a:t>18/03/2025</a:t>
+              <a:t>03/04/2025</a:t>
             </a:fld>
             <a:endParaRPr lang="en-GB"/>
           </a:p>
@@ -1608,7 +1608,7 @@
           <a:p>
             <a:fld id="{63658808-8346-4240-85EF-58CABB889A10}" type="datetimeFigureOut">
               <a:rPr lang="en-GB" smtClean="0"/>
-              <a:t>18/03/2025</a:t>
+              <a:t>03/04/2025</a:t>
             </a:fld>
             <a:endParaRPr lang="en-GB"/>
           </a:p>
@@ -1726,7 +1726,7 @@
           <a:p>
             <a:fld id="{63658808-8346-4240-85EF-58CABB889A10}" type="datetimeFigureOut">
               <a:rPr lang="en-GB" smtClean="0"/>
-              <a:t>18/03/2025</a:t>
+              <a:t>03/04/2025</a:t>
             </a:fld>
             <a:endParaRPr lang="en-GB"/>
           </a:p>
@@ -1821,7 +1821,7 @@
           <a:p>
             <a:fld id="{63658808-8346-4240-85EF-58CABB889A10}" type="datetimeFigureOut">
               <a:rPr lang="en-GB" smtClean="0"/>
-              <a:t>18/03/2025</a:t>
+              <a:t>03/04/2025</a:t>
             </a:fld>
             <a:endParaRPr lang="en-GB"/>
           </a:p>
@@ -2098,7 +2098,7 @@
           <a:p>
             <a:fld id="{63658808-8346-4240-85EF-58CABB889A10}" type="datetimeFigureOut">
               <a:rPr lang="en-GB" smtClean="0"/>
-              <a:t>18/03/2025</a:t>
+              <a:t>03/04/2025</a:t>
             </a:fld>
             <a:endParaRPr lang="en-GB"/>
           </a:p>
@@ -2355,7 +2355,7 @@
           <a:p>
             <a:fld id="{63658808-8346-4240-85EF-58CABB889A10}" type="datetimeFigureOut">
               <a:rPr lang="en-GB" smtClean="0"/>
-              <a:t>18/03/2025</a:t>
+              <a:t>03/04/2025</a:t>
             </a:fld>
             <a:endParaRPr lang="en-GB"/>
           </a:p>
@@ -2568,7 +2568,7 @@
           <a:p>
             <a:fld id="{63658808-8346-4240-85EF-58CABB889A10}" type="datetimeFigureOut">
               <a:rPr lang="en-GB" smtClean="0"/>
-              <a:t>18/03/2025</a:t>
+              <a:t>03/04/2025</a:t>
             </a:fld>
             <a:endParaRPr lang="en-GB"/>
           </a:p>
@@ -3465,39 +3465,6 @@
           </a:p>
         </p:txBody>
       </p:sp>
-      <p:pic>
-        <p:nvPicPr>
-          <p:cNvPr id="5" name="Picture 4">
-            <a:extLst>
-              <a:ext uri="{FF2B5EF4-FFF2-40B4-BE49-F238E27FC236}">
-                <a16:creationId xmlns:a16="http://schemas.microsoft.com/office/drawing/2014/main" id="{B65D1B0C-E369-40C5-DAE1-757C0BD4D5E6}"/>
-              </a:ext>
-            </a:extLst>
-          </p:cNvPr>
-          <p:cNvPicPr>
-            <a:picLocks noChangeAspect="1"/>
-          </p:cNvPicPr>
-          <p:nvPr/>
-        </p:nvPicPr>
-        <p:blipFill>
-          <a:blip r:embed="rId2"/>
-          <a:stretch>
-            <a:fillRect/>
-          </a:stretch>
-        </p:blipFill>
-        <p:spPr>
-          <a:xfrm>
-            <a:off x="12538702" y="7812140"/>
-            <a:ext cx="5197808" cy="5759344"/>
-          </a:xfrm>
-          <a:prstGeom prst="rect">
-            <a:avLst/>
-          </a:prstGeom>
-          <a:ln>
-            <a:noFill/>
-          </a:ln>
-        </p:spPr>
-      </p:pic>
       <p:sp>
         <p:nvSpPr>
           <p:cNvPr id="22" name="Isosceles Triangle 21">
@@ -3715,7 +3682,7 @@
           <p:nvPr/>
         </p:nvPicPr>
         <p:blipFill>
-          <a:blip r:embed="rId3">
+          <a:blip r:embed="rId2">
             <a:extLst>
               <a:ext uri="{28A0092B-C50C-407E-A947-70E740481C1C}">
                 <a14:useLocalDpi xmlns:a14="http://schemas.microsoft.com/office/drawing/2010/main" val="0"/>
@@ -3747,329 +3714,347 @@
           </a:extLst>
         </p:spPr>
       </p:pic>
-      <p:pic>
-        <p:nvPicPr>
-          <p:cNvPr id="9" name="Picture 8">
+      <p:grpSp>
+        <p:nvGrpSpPr>
+          <p:cNvPr id="31" name="Group 30">
             <a:extLst>
               <a:ext uri="{FF2B5EF4-FFF2-40B4-BE49-F238E27FC236}">
-                <a16:creationId xmlns:a16="http://schemas.microsoft.com/office/drawing/2014/main" id="{45CF1B2D-3E93-A564-5CCF-B23AF49DCC11}"/>
+                <a16:creationId xmlns:a16="http://schemas.microsoft.com/office/drawing/2014/main" id="{35BE2A45-AF76-CE56-5F43-C1226260160A}"/>
               </a:ext>
             </a:extLst>
           </p:cNvPr>
-          <p:cNvPicPr>
-            <a:picLocks noChangeAspect="1"/>
-          </p:cNvPicPr>
+          <p:cNvGrpSpPr/>
           <p:nvPr/>
-        </p:nvPicPr>
-        <p:blipFill>
-          <a:blip r:embed="rId4"/>
-          <a:stretch>
-            <a:fillRect/>
-          </a:stretch>
-        </p:blipFill>
-        <p:spPr>
+        </p:nvGrpSpPr>
+        <p:grpSpPr>
           <a:xfrm>
-            <a:off x="17573951" y="1253520"/>
-            <a:ext cx="12589028" cy="6867637"/>
+            <a:off x="11508804" y="1056153"/>
+            <a:ext cx="6870675" cy="5710245"/>
+            <a:chOff x="11686517" y="1058978"/>
+            <a:chExt cx="6870675" cy="5710245"/>
           </a:xfrm>
-          <a:prstGeom prst="rect">
-            <a:avLst/>
-          </a:prstGeom>
-          <a:ln>
-            <a:solidFill>
-              <a:srgbClr val="046A88"/>
-            </a:solidFill>
-          </a:ln>
-        </p:spPr>
-      </p:pic>
-      <p:pic>
-        <p:nvPicPr>
-          <p:cNvPr id="13" name="Picture 12" descr="A blue circle with a letter f in it&#10;&#10;AI-generated content may be incorrect.">
-            <a:extLst>
-              <a:ext uri="{FF2B5EF4-FFF2-40B4-BE49-F238E27FC236}">
-                <a16:creationId xmlns:a16="http://schemas.microsoft.com/office/drawing/2014/main" id="{A5AAEC1A-2739-AF6B-16C6-C27CFF822ED1}"/>
-              </a:ext>
-            </a:extLst>
-          </p:cNvPr>
-          <p:cNvPicPr>
-            <a:picLocks noChangeAspect="1"/>
-          </p:cNvPicPr>
-          <p:nvPr/>
-        </p:nvPicPr>
-        <p:blipFill>
-          <a:blip r:embed="rId5">
-            <a:extLst>
-              <a:ext uri="{28A0092B-C50C-407E-A947-70E740481C1C}">
-                <a14:useLocalDpi xmlns:a14="http://schemas.microsoft.com/office/drawing/2010/main" val="0"/>
-              </a:ext>
-            </a:extLst>
-          </a:blip>
-          <a:stretch>
-            <a:fillRect/>
-          </a:stretch>
-        </p:blipFill>
-        <p:spPr>
-          <a:xfrm>
-            <a:off x="10566978" y="6276897"/>
-            <a:ext cx="2546157" cy="2546157"/>
-          </a:xfrm>
-          <a:prstGeom prst="rect">
-            <a:avLst/>
-          </a:prstGeom>
-        </p:spPr>
-      </p:pic>
-      <p:pic>
-        <p:nvPicPr>
-          <p:cNvPr id="17" name="Picture 16" descr="A white x in a black circle&#10;&#10;AI-generated content may be incorrect.">
-            <a:extLst>
-              <a:ext uri="{FF2B5EF4-FFF2-40B4-BE49-F238E27FC236}">
-                <a16:creationId xmlns:a16="http://schemas.microsoft.com/office/drawing/2014/main" id="{4B555382-E834-D17F-CB80-C58B262C4F2C}"/>
-              </a:ext>
-            </a:extLst>
-          </p:cNvPr>
-          <p:cNvPicPr>
-            <a:picLocks noChangeAspect="1"/>
-          </p:cNvPicPr>
-          <p:nvPr/>
-        </p:nvPicPr>
-        <p:blipFill>
-          <a:blip r:embed="rId6">
-            <a:extLst>
-              <a:ext uri="{28A0092B-C50C-407E-A947-70E740481C1C}">
-                <a14:useLocalDpi xmlns:a14="http://schemas.microsoft.com/office/drawing/2010/main" val="0"/>
-              </a:ext>
-            </a:extLst>
-          </a:blip>
-          <a:stretch>
-            <a:fillRect/>
-          </a:stretch>
-        </p:blipFill>
-        <p:spPr>
-          <a:xfrm>
-            <a:off x="14589460" y="5419282"/>
-            <a:ext cx="2237539" cy="2237539"/>
-          </a:xfrm>
-          <a:prstGeom prst="rect">
-            <a:avLst/>
-          </a:prstGeom>
-        </p:spPr>
-      </p:pic>
-      <p:pic>
-        <p:nvPicPr>
-          <p:cNvPr id="21" name="Picture 20" descr="A black and white logo&#10;&#10;AI-generated content may be incorrect.">
-            <a:extLst>
-              <a:ext uri="{FF2B5EF4-FFF2-40B4-BE49-F238E27FC236}">
-                <a16:creationId xmlns:a16="http://schemas.microsoft.com/office/drawing/2014/main" id="{277A2645-82DA-56C9-FCB2-DB84AA0225FB}"/>
-              </a:ext>
-            </a:extLst>
-          </p:cNvPr>
-          <p:cNvPicPr>
-            <a:picLocks noChangeAspect="1"/>
-          </p:cNvPicPr>
-          <p:nvPr/>
-        </p:nvPicPr>
-        <p:blipFill>
-          <a:blip r:embed="rId7">
-            <a:extLst>
-              <a:ext uri="{28A0092B-C50C-407E-A947-70E740481C1C}">
-                <a14:useLocalDpi xmlns:a14="http://schemas.microsoft.com/office/drawing/2010/main" val="0"/>
-              </a:ext>
-            </a:extLst>
-          </a:blip>
-          <a:stretch>
-            <a:fillRect/>
-          </a:stretch>
-        </p:blipFill>
-        <p:spPr>
-          <a:xfrm>
-            <a:off x="10389282" y="10010395"/>
-            <a:ext cx="1836486" cy="1530405"/>
-          </a:xfrm>
-          <a:prstGeom prst="rect">
-            <a:avLst/>
-          </a:prstGeom>
-        </p:spPr>
-      </p:pic>
-      <p:pic>
-        <p:nvPicPr>
-          <p:cNvPr id="24" name="Picture 23" descr="A black background with a black square&#10;&#10;AI-generated content may be incorrect.">
-            <a:extLst>
-              <a:ext uri="{FF2B5EF4-FFF2-40B4-BE49-F238E27FC236}">
-                <a16:creationId xmlns:a16="http://schemas.microsoft.com/office/drawing/2014/main" id="{954D1E56-E5BD-514B-D9A7-3A98A92822D5}"/>
-              </a:ext>
-            </a:extLst>
-          </p:cNvPr>
-          <p:cNvPicPr>
-            <a:picLocks noChangeAspect="1"/>
-          </p:cNvPicPr>
-          <p:nvPr/>
-        </p:nvPicPr>
-        <p:blipFill>
-          <a:blip r:embed="rId8">
-            <a:extLst>
-              <a:ext uri="{28A0092B-C50C-407E-A947-70E740481C1C}">
-                <a14:useLocalDpi xmlns:a14="http://schemas.microsoft.com/office/drawing/2010/main" val="0"/>
-              </a:ext>
-            </a:extLst>
-          </a:blip>
-          <a:stretch>
-            <a:fillRect/>
-          </a:stretch>
-        </p:blipFill>
-        <p:spPr>
-          <a:xfrm>
-            <a:off x="17924022" y="9178987"/>
-            <a:ext cx="1916906" cy="1916906"/>
-          </a:xfrm>
-          <a:prstGeom prst="rect">
-            <a:avLst/>
-          </a:prstGeom>
-        </p:spPr>
-      </p:pic>
-      <p:pic>
-        <p:nvPicPr>
-          <p:cNvPr id="26" name="Picture 25" descr="A colorful letter g&#10;&#10;AI-generated content may be incorrect.">
-            <a:extLst>
-              <a:ext uri="{FF2B5EF4-FFF2-40B4-BE49-F238E27FC236}">
-                <a16:creationId xmlns:a16="http://schemas.microsoft.com/office/drawing/2014/main" id="{2F1DA55B-A555-CD90-4288-0540CEF18E7B}"/>
-              </a:ext>
-            </a:extLst>
-          </p:cNvPr>
-          <p:cNvPicPr>
-            <a:picLocks noChangeAspect="1"/>
-          </p:cNvPicPr>
-          <p:nvPr/>
-        </p:nvPicPr>
-        <p:blipFill>
-          <a:blip r:embed="rId9">
-            <a:extLst>
-              <a:ext uri="{28A0092B-C50C-407E-A947-70E740481C1C}">
-                <a14:useLocalDpi xmlns:a14="http://schemas.microsoft.com/office/drawing/2010/main" val="0"/>
-              </a:ext>
-            </a:extLst>
-          </a:blip>
-          <a:stretch>
-            <a:fillRect/>
-          </a:stretch>
-        </p:blipFill>
-        <p:spPr>
-          <a:xfrm>
-            <a:off x="13393851" y="13726803"/>
-            <a:ext cx="1724440" cy="1724440"/>
-          </a:xfrm>
-          <a:prstGeom prst="rect">
-            <a:avLst/>
-          </a:prstGeom>
-        </p:spPr>
-      </p:pic>
-      <p:pic>
-        <p:nvPicPr>
-          <p:cNvPr id="28" name="Picture 27" descr="A black circle with a letter in it&#10;&#10;AI-generated content may be incorrect.">
-            <a:extLst>
-              <a:ext uri="{FF2B5EF4-FFF2-40B4-BE49-F238E27FC236}">
-                <a16:creationId xmlns:a16="http://schemas.microsoft.com/office/drawing/2014/main" id="{A2298DE4-129D-1975-8556-B95376CA7982}"/>
-              </a:ext>
-            </a:extLst>
-          </p:cNvPr>
-          <p:cNvPicPr>
-            <a:picLocks noChangeAspect="1"/>
-          </p:cNvPicPr>
-          <p:nvPr/>
-        </p:nvPicPr>
-        <p:blipFill>
-          <a:blip r:embed="rId10">
-            <a:extLst>
-              <a:ext uri="{28A0092B-C50C-407E-A947-70E740481C1C}">
-                <a14:useLocalDpi xmlns:a14="http://schemas.microsoft.com/office/drawing/2010/main" val="0"/>
-              </a:ext>
-            </a:extLst>
-          </a:blip>
-          <a:stretch>
-            <a:fillRect/>
-          </a:stretch>
-        </p:blipFill>
-        <p:spPr>
-          <a:xfrm>
-            <a:off x="16265288" y="13799941"/>
-            <a:ext cx="1538003" cy="1538003"/>
-          </a:xfrm>
-          <a:prstGeom prst="rect">
-            <a:avLst/>
-          </a:prstGeom>
-        </p:spPr>
-      </p:pic>
-      <p:pic>
-        <p:nvPicPr>
-          <p:cNvPr id="30" name="Picture 29" descr="A blue circle with a newspaper&#10;&#10;AI-generated content may be incorrect.">
-            <a:extLst>
-              <a:ext uri="{FF2B5EF4-FFF2-40B4-BE49-F238E27FC236}">
-                <a16:creationId xmlns:a16="http://schemas.microsoft.com/office/drawing/2014/main" id="{3D49120A-3433-5C6E-5821-BB8D935E19D8}"/>
-              </a:ext>
-            </a:extLst>
-          </p:cNvPr>
-          <p:cNvPicPr>
-            <a:picLocks noChangeAspect="1"/>
-          </p:cNvPicPr>
-          <p:nvPr/>
-        </p:nvPicPr>
-        <p:blipFill>
-          <a:blip r:embed="rId11">
-            <a:extLst>
-              <a:ext uri="{28A0092B-C50C-407E-A947-70E740481C1C}">
-                <a14:useLocalDpi xmlns:a14="http://schemas.microsoft.com/office/drawing/2010/main" val="0"/>
-              </a:ext>
-            </a:extLst>
-          </a:blip>
-          <a:stretch>
-            <a:fillRect/>
-          </a:stretch>
-        </p:blipFill>
-        <p:spPr>
-          <a:xfrm>
-            <a:off x="17889386" y="12441418"/>
-            <a:ext cx="1400459" cy="1400459"/>
-          </a:xfrm>
-          <a:prstGeom prst="rect">
-            <a:avLst/>
-          </a:prstGeom>
-        </p:spPr>
-      </p:pic>
-      <p:pic>
-        <p:nvPicPr>
-          <p:cNvPr id="32" name="Picture 31" descr="A logo of a robot&#10;&#10;AI-generated content may be incorrect.">
-            <a:extLst>
-              <a:ext uri="{FF2B5EF4-FFF2-40B4-BE49-F238E27FC236}">
-                <a16:creationId xmlns:a16="http://schemas.microsoft.com/office/drawing/2014/main" id="{CC2698DF-05A5-2656-2BBC-F54DA88BF65B}"/>
-              </a:ext>
-            </a:extLst>
-          </p:cNvPr>
-          <p:cNvPicPr>
-            <a:picLocks noChangeAspect="1"/>
-          </p:cNvPicPr>
-          <p:nvPr/>
-        </p:nvPicPr>
-        <p:blipFill>
-          <a:blip r:embed="rId12">
-            <a:extLst>
-              <a:ext uri="{28A0092B-C50C-407E-A947-70E740481C1C}">
-                <a14:useLocalDpi xmlns:a14="http://schemas.microsoft.com/office/drawing/2010/main" val="0"/>
-              </a:ext>
-            </a:extLst>
-          </a:blip>
-          <a:stretch>
-            <a:fillRect/>
-          </a:stretch>
-        </p:blipFill>
-        <p:spPr>
-          <a:xfrm>
-            <a:off x="11139827" y="12594228"/>
-            <a:ext cx="1400460" cy="1400460"/>
-          </a:xfrm>
-          <a:prstGeom prst="rect">
-            <a:avLst/>
-          </a:prstGeom>
-        </p:spPr>
-      </p:pic>
+        </p:grpSpPr>
+        <p:pic>
+          <p:nvPicPr>
+            <p:cNvPr id="5" name="Picture 4">
+              <a:extLst>
+                <a:ext uri="{FF2B5EF4-FFF2-40B4-BE49-F238E27FC236}">
+                  <a16:creationId xmlns:a16="http://schemas.microsoft.com/office/drawing/2014/main" id="{B65D1B0C-E369-40C5-DAE1-757C0BD4D5E6}"/>
+                </a:ext>
+              </a:extLst>
+            </p:cNvPr>
+            <p:cNvPicPr>
+              <a:picLocks noChangeAspect="1"/>
+            </p:cNvPicPr>
+            <p:nvPr/>
+          </p:nvPicPr>
+          <p:blipFill>
+            <a:blip r:embed="rId3"/>
+            <a:stretch>
+              <a:fillRect/>
+            </a:stretch>
+          </p:blipFill>
+          <p:spPr>
+            <a:xfrm>
+              <a:off x="13230244" y="1113498"/>
+              <a:ext cx="3814721" cy="4226838"/>
+            </a:xfrm>
+            <a:prstGeom prst="rect">
+              <a:avLst/>
+            </a:prstGeom>
+            <a:ln>
+              <a:noFill/>
+            </a:ln>
+          </p:spPr>
+        </p:pic>
+        <p:pic>
+          <p:nvPicPr>
+            <p:cNvPr id="13" name="Picture 12" descr="A blue circle with a letter f in it&#10;&#10;AI-generated content may be incorrect.">
+              <a:extLst>
+                <a:ext uri="{FF2B5EF4-FFF2-40B4-BE49-F238E27FC236}">
+                  <a16:creationId xmlns:a16="http://schemas.microsoft.com/office/drawing/2014/main" id="{A5AAEC1A-2739-AF6B-16C6-C27CFF822ED1}"/>
+                </a:ext>
+              </a:extLst>
+            </p:cNvPr>
+            <p:cNvPicPr>
+              <a:picLocks noChangeAspect="1"/>
+            </p:cNvPicPr>
+            <p:nvPr/>
+          </p:nvPicPr>
+          <p:blipFill>
+            <a:blip r:embed="rId4">
+              <a:extLst>
+                <a:ext uri="{28A0092B-C50C-407E-A947-70E740481C1C}">
+                  <a14:useLocalDpi xmlns:a14="http://schemas.microsoft.com/office/drawing/2010/main" val="0"/>
+                </a:ext>
+              </a:extLst>
+            </a:blip>
+            <a:stretch>
+              <a:fillRect/>
+            </a:stretch>
+          </p:blipFill>
+          <p:spPr>
+            <a:xfrm>
+              <a:off x="17250620" y="3902137"/>
+              <a:ext cx="1306572" cy="1306572"/>
+            </a:xfrm>
+            <a:prstGeom prst="rect">
+              <a:avLst/>
+            </a:prstGeom>
+          </p:spPr>
+        </p:pic>
+        <p:pic>
+          <p:nvPicPr>
+            <p:cNvPr id="17" name="Picture 16" descr="A white x in a black circle&#10;&#10;AI-generated content may be incorrect.">
+              <a:extLst>
+                <a:ext uri="{FF2B5EF4-FFF2-40B4-BE49-F238E27FC236}">
+                  <a16:creationId xmlns:a16="http://schemas.microsoft.com/office/drawing/2014/main" id="{4B555382-E834-D17F-CB80-C58B262C4F2C}"/>
+                </a:ext>
+              </a:extLst>
+            </p:cNvPr>
+            <p:cNvPicPr>
+              <a:picLocks noChangeAspect="1"/>
+            </p:cNvPicPr>
+            <p:nvPr/>
+          </p:nvPicPr>
+          <p:blipFill>
+            <a:blip r:embed="rId5">
+              <a:extLst>
+                <a:ext uri="{28A0092B-C50C-407E-A947-70E740481C1C}">
+                  <a14:useLocalDpi xmlns:a14="http://schemas.microsoft.com/office/drawing/2010/main" val="0"/>
+                </a:ext>
+              </a:extLst>
+            </a:blip>
+            <a:stretch>
+              <a:fillRect/>
+            </a:stretch>
+          </p:blipFill>
+          <p:spPr>
+            <a:xfrm>
+              <a:off x="15771328" y="5462651"/>
+              <a:ext cx="1306572" cy="1306572"/>
+            </a:xfrm>
+            <a:prstGeom prst="rect">
+              <a:avLst/>
+            </a:prstGeom>
+          </p:spPr>
+        </p:pic>
+        <p:pic>
+          <p:nvPicPr>
+            <p:cNvPr id="21" name="Picture 20" descr="A black and white logo&#10;&#10;AI-generated content may be incorrect.">
+              <a:extLst>
+                <a:ext uri="{FF2B5EF4-FFF2-40B4-BE49-F238E27FC236}">
+                  <a16:creationId xmlns:a16="http://schemas.microsoft.com/office/drawing/2014/main" id="{277A2645-82DA-56C9-FCB2-DB84AA0225FB}"/>
+                </a:ext>
+              </a:extLst>
+            </p:cNvPr>
+            <p:cNvPicPr>
+              <a:picLocks noChangeAspect="1"/>
+            </p:cNvPicPr>
+            <p:nvPr/>
+          </p:nvPicPr>
+          <p:blipFill>
+            <a:blip r:embed="rId6">
+              <a:extLst>
+                <a:ext uri="{28A0092B-C50C-407E-A947-70E740481C1C}">
+                  <a14:useLocalDpi xmlns:a14="http://schemas.microsoft.com/office/drawing/2010/main" val="0"/>
+                </a:ext>
+              </a:extLst>
+            </a:blip>
+            <a:stretch>
+              <a:fillRect/>
+            </a:stretch>
+          </p:blipFill>
+          <p:spPr>
+            <a:xfrm>
+              <a:off x="11686517" y="3964343"/>
+              <a:ext cx="1567886" cy="1306572"/>
+            </a:xfrm>
+            <a:prstGeom prst="rect">
+              <a:avLst/>
+            </a:prstGeom>
+          </p:spPr>
+        </p:pic>
+        <p:pic>
+          <p:nvPicPr>
+            <p:cNvPr id="24" name="Picture 23" descr="A black background with a black square&#10;&#10;AI-generated content may be incorrect.">
+              <a:extLst>
+                <a:ext uri="{FF2B5EF4-FFF2-40B4-BE49-F238E27FC236}">
+                  <a16:creationId xmlns:a16="http://schemas.microsoft.com/office/drawing/2014/main" id="{954D1E56-E5BD-514B-D9A7-3A98A92822D5}"/>
+                </a:ext>
+              </a:extLst>
+            </p:cNvPr>
+            <p:cNvPicPr>
+              <a:picLocks noChangeAspect="1"/>
+            </p:cNvPicPr>
+            <p:nvPr/>
+          </p:nvPicPr>
+          <p:blipFill>
+            <a:blip r:embed="rId7">
+              <a:extLst>
+                <a:ext uri="{28A0092B-C50C-407E-A947-70E740481C1C}">
+                  <a14:useLocalDpi xmlns:a14="http://schemas.microsoft.com/office/drawing/2010/main" val="0"/>
+                </a:ext>
+              </a:extLst>
+            </a:blip>
+            <a:stretch>
+              <a:fillRect/>
+            </a:stretch>
+          </p:blipFill>
+          <p:spPr>
+            <a:xfrm>
+              <a:off x="13254403" y="5438327"/>
+              <a:ext cx="1306572" cy="1306572"/>
+            </a:xfrm>
+            <a:prstGeom prst="rect">
+              <a:avLst/>
+            </a:prstGeom>
+          </p:spPr>
+        </p:pic>
+        <p:pic>
+          <p:nvPicPr>
+            <p:cNvPr id="26" name="Picture 25" descr="A colorful letter g&#10;&#10;AI-generated content may be incorrect.">
+              <a:extLst>
+                <a:ext uri="{FF2B5EF4-FFF2-40B4-BE49-F238E27FC236}">
+                  <a16:creationId xmlns:a16="http://schemas.microsoft.com/office/drawing/2014/main" id="{2F1DA55B-A555-CD90-4288-0540CEF18E7B}"/>
+                </a:ext>
+              </a:extLst>
+            </p:cNvPr>
+            <p:cNvPicPr>
+              <a:picLocks noChangeAspect="1"/>
+            </p:cNvPicPr>
+            <p:nvPr/>
+          </p:nvPicPr>
+          <p:blipFill>
+            <a:blip r:embed="rId8">
+              <a:extLst>
+                <a:ext uri="{28A0092B-C50C-407E-A947-70E740481C1C}">
+                  <a14:useLocalDpi xmlns:a14="http://schemas.microsoft.com/office/drawing/2010/main" val="0"/>
+                </a:ext>
+              </a:extLst>
+            </a:blip>
+            <a:srcRect l="16584" t="15136" r="18834" b="14824"/>
+            <a:stretch/>
+          </p:blipFill>
+          <p:spPr>
+            <a:xfrm>
+              <a:off x="17262890" y="1058978"/>
+              <a:ext cx="1204744" cy="1306573"/>
+            </a:xfrm>
+            <a:prstGeom prst="rect">
+              <a:avLst/>
+            </a:prstGeom>
+          </p:spPr>
+        </p:pic>
+        <p:pic>
+          <p:nvPicPr>
+            <p:cNvPr id="28" name="Picture 27" descr="A black circle with a letter in it&#10;&#10;AI-generated content may be incorrect.">
+              <a:extLst>
+                <a:ext uri="{FF2B5EF4-FFF2-40B4-BE49-F238E27FC236}">
+                  <a16:creationId xmlns:a16="http://schemas.microsoft.com/office/drawing/2014/main" id="{A2298DE4-129D-1975-8556-B95376CA7982}"/>
+                </a:ext>
+              </a:extLst>
+            </p:cNvPr>
+            <p:cNvPicPr>
+              <a:picLocks noChangeAspect="1"/>
+            </p:cNvPicPr>
+            <p:nvPr/>
+          </p:nvPicPr>
+          <p:blipFill>
+            <a:blip r:embed="rId9">
+              <a:extLst>
+                <a:ext uri="{28A0092B-C50C-407E-A947-70E740481C1C}">
+                  <a14:useLocalDpi xmlns:a14="http://schemas.microsoft.com/office/drawing/2010/main" val="0"/>
+                </a:ext>
+              </a:extLst>
+            </a:blip>
+            <a:stretch>
+              <a:fillRect/>
+            </a:stretch>
+          </p:blipFill>
+          <p:spPr>
+            <a:xfrm>
+              <a:off x="11814630" y="2468353"/>
+              <a:ext cx="1306572" cy="1306572"/>
+            </a:xfrm>
+            <a:prstGeom prst="rect">
+              <a:avLst/>
+            </a:prstGeom>
+          </p:spPr>
+        </p:pic>
+        <p:pic>
+          <p:nvPicPr>
+            <p:cNvPr id="30" name="Picture 29" descr="A blue circle with a newspaper&#10;&#10;AI-generated content may be incorrect.">
+              <a:extLst>
+                <a:ext uri="{FF2B5EF4-FFF2-40B4-BE49-F238E27FC236}">
+                  <a16:creationId xmlns:a16="http://schemas.microsoft.com/office/drawing/2014/main" id="{3D49120A-3433-5C6E-5821-BB8D935E19D8}"/>
+                </a:ext>
+              </a:extLst>
+            </p:cNvPr>
+            <p:cNvPicPr>
+              <a:picLocks noChangeAspect="1"/>
+            </p:cNvPicPr>
+            <p:nvPr/>
+          </p:nvPicPr>
+          <p:blipFill>
+            <a:blip r:embed="rId10">
+              <a:extLst>
+                <a:ext uri="{28A0092B-C50C-407E-A947-70E740481C1C}">
+                  <a14:useLocalDpi xmlns:a14="http://schemas.microsoft.com/office/drawing/2010/main" val="0"/>
+                </a:ext>
+              </a:extLst>
+            </a:blip>
+            <a:stretch>
+              <a:fillRect/>
+            </a:stretch>
+          </p:blipFill>
+          <p:spPr>
+            <a:xfrm>
+              <a:off x="17347916" y="2599095"/>
+              <a:ext cx="1111981" cy="1111981"/>
+            </a:xfrm>
+            <a:prstGeom prst="rect">
+              <a:avLst/>
+            </a:prstGeom>
+          </p:spPr>
+        </p:pic>
+        <p:pic>
+          <p:nvPicPr>
+            <p:cNvPr id="32" name="Picture 31" descr="A logo of a robot&#10;&#10;AI-generated content may be incorrect.">
+              <a:extLst>
+                <a:ext uri="{FF2B5EF4-FFF2-40B4-BE49-F238E27FC236}">
+                  <a16:creationId xmlns:a16="http://schemas.microsoft.com/office/drawing/2014/main" id="{CC2698DF-05A5-2656-2BBC-F54DA88BF65B}"/>
+                </a:ext>
+              </a:extLst>
+            </p:cNvPr>
+            <p:cNvPicPr>
+              <a:picLocks noChangeAspect="1"/>
+            </p:cNvPicPr>
+            <p:nvPr/>
+          </p:nvPicPr>
+          <p:blipFill>
+            <a:blip r:embed="rId11">
+              <a:extLst>
+                <a:ext uri="{28A0092B-C50C-407E-A947-70E740481C1C}">
+                  <a14:useLocalDpi xmlns:a14="http://schemas.microsoft.com/office/drawing/2010/main" val="0"/>
+                </a:ext>
+              </a:extLst>
+            </a:blip>
+            <a:stretch>
+              <a:fillRect/>
+            </a:stretch>
+          </p:blipFill>
+          <p:spPr>
+            <a:xfrm>
+              <a:off x="11885198" y="1113498"/>
+              <a:ext cx="1165437" cy="1165437"/>
+            </a:xfrm>
+            <a:prstGeom prst="rect">
+              <a:avLst/>
+            </a:prstGeom>
+          </p:spPr>
+        </p:pic>
+      </p:grpSp>
       <p:pic>
         <p:nvPicPr>
           <p:cNvPr id="36" name="Picture 35" descr="A blue and yellow snake logo&#10;&#10;AI-generated content may be incorrect.">
@@ -4085,7 +4070,7 @@
           <p:nvPr/>
         </p:nvPicPr>
         <p:blipFill>
-          <a:blip r:embed="rId13">
+          <a:blip r:embed="rId12">
             <a:extLst>
               <a:ext uri="{28A0092B-C50C-407E-A947-70E740481C1C}">
                 <a14:useLocalDpi xmlns:a14="http://schemas.microsoft.com/office/drawing/2010/main" val="0"/>
@@ -4121,7 +4106,7 @@
           <p:nvPr/>
         </p:nvPicPr>
         <p:blipFill>
-          <a:blip r:embed="rId14">
+          <a:blip r:embed="rId13">
             <a:extLst>
               <a:ext uri="{28A0092B-C50C-407E-A947-70E740481C1C}">
                 <a14:useLocalDpi xmlns:a14="http://schemas.microsoft.com/office/drawing/2010/main" val="0"/>
@@ -4168,7 +4153,7 @@
           <p:nvPr/>
         </p:nvPicPr>
         <p:blipFill>
-          <a:blip r:embed="rId15">
+          <a:blip r:embed="rId14">
             <a:extLst>
               <a:ext uri="{28A0092B-C50C-407E-A947-70E740481C1C}">
                 <a14:useLocalDpi xmlns:a14="http://schemas.microsoft.com/office/drawing/2010/main" val="0"/>
@@ -4215,7 +4200,7 @@
           <p:nvPr/>
         </p:nvPicPr>
         <p:blipFill>
-          <a:blip r:embed="rId16">
+          <a:blip r:embed="rId15">
             <a:extLst>
               <a:ext uri="{28A0092B-C50C-407E-A947-70E740481C1C}">
                 <a14:useLocalDpi xmlns:a14="http://schemas.microsoft.com/office/drawing/2010/main" val="0"/>
@@ -4251,7 +4236,7 @@
           <p:nvPr/>
         </p:nvPicPr>
         <p:blipFill rotWithShape="1">
-          <a:blip r:embed="rId17">
+          <a:blip r:embed="rId16">
             <a:extLst>
               <a:ext uri="{28A0092B-C50C-407E-A947-70E740481C1C}">
                 <a14:useLocalDpi xmlns:a14="http://schemas.microsoft.com/office/drawing/2010/main" val="0"/>
@@ -4295,8 +4280,8 @@
         </p:nvSpPr>
         <p:spPr>
           <a:xfrm>
-            <a:off x="2486506" y="1414433"/>
-            <a:ext cx="9353550" cy="4597003"/>
+            <a:off x="435094" y="1314055"/>
+            <a:ext cx="10317892" cy="4436269"/>
           </a:xfrm>
           <a:prstGeom prst="roundRect">
             <a:avLst>
@@ -4333,16 +4318,15 @@
           <a:p>
             <a:pPr algn="ctr"/>
             <a:r>
-              <a:rPr lang="en-GB" sz="4000"/>
+              <a:rPr lang="en-GB" sz="4000" dirty="0"/>
               <a:t>The Problem</a:t>
             </a:r>
-            <a:endParaRPr lang="en-GB" sz="4000" dirty="0"/>
           </a:p>
           <a:p>
             <a:pPr algn="ctr"/>
             <a:r>
               <a:rPr lang="en-GB" sz="3200" dirty="0"/>
-              <a:t>The digital age can be difficult to navigate, especially when it comes to your digital footprint. Complicated methods and mean non-technical individuals have increased risks of personal information about them being available freely online, leading to dangerous outcomes such as identity theft, fraud and impersonation. </a:t>
+              <a:t>With 1.7MB of data being generated every second by the average internet user, tracking your digital footprint can be frustrating. Complicated methods and mean non-technical individuals have increased risks of personal information about them being available freely online, leading to dangerous outcomes such as identity theft, fraud and impersonation. </a:t>
             </a:r>
           </a:p>
         </p:txBody>
@@ -4361,8 +4345,8 @@
         </p:nvSpPr>
         <p:spPr>
           <a:xfrm>
-            <a:off x="20820617" y="8838782"/>
-            <a:ext cx="9353550" cy="7130772"/>
+            <a:off x="19421117" y="13712171"/>
+            <a:ext cx="10266901" cy="5388412"/>
           </a:xfrm>
           <a:prstGeom prst="roundRect">
             <a:avLst>
@@ -4410,7 +4394,7 @@
             </a:pPr>
             <a:r>
               <a:rPr lang="en-GB" sz="3600" dirty="0"/>
-              <a:t>Secure accounts system for multiple users</a:t>
+              <a:t>Accounts system for multiple users</a:t>
             </a:r>
           </a:p>
           <a:p>
@@ -4421,16 +4405,6 @@
             <a:r>
               <a:rPr lang="en-GB" sz="3600" dirty="0"/>
               <a:t>API connections for data collection</a:t>
-            </a:r>
-          </a:p>
-          <a:p>
-            <a:pPr marL="571500" indent="-571500">
-              <a:buFont typeface="Arial" panose="020B0604020202020204" pitchFamily="34" charset="0"/>
-              <a:buChar char="•"/>
-            </a:pPr>
-            <a:r>
-              <a:rPr lang="en-GB" sz="3600" dirty="0"/>
-              <a:t>Easy-to-use UI</a:t>
             </a:r>
           </a:p>
           <a:p>
@@ -4479,8 +4453,8 @@
         </p:nvSpPr>
         <p:spPr>
           <a:xfrm>
-            <a:off x="517866" y="12936794"/>
-            <a:ext cx="9353550" cy="6480155"/>
+            <a:off x="435094" y="13681351"/>
+            <a:ext cx="10317892" cy="5438120"/>
           </a:xfrm>
           <a:prstGeom prst="roundRect">
             <a:avLst>
@@ -4525,18 +4499,17 @@
           <a:p>
             <a:r>
               <a:rPr lang="en-GB" sz="3200" dirty="0"/>
-              <a:t>DigitalWaves is a web app that can be ran locally. It allows the user to input and edit their information via a simple form and scan for matches.</a:t>
-            </a:r>
+              <a:t>DigitalWaves is a locally run web app. It allows the user to input and edit their information via a simple form and scan for matches.</a:t>
+            </a:r>
+          </a:p>
+          <a:p>
+            <a:endParaRPr lang="en-GB" sz="3200" dirty="0"/>
           </a:p>
           <a:p>
             <a:r>
               <a:rPr lang="en-GB" sz="3200" dirty="0"/>
               <a:t>The process is made simple, by automating requests to APIs from popular information sources and presenting this in a user-friendly fashion. The user can select relevant links and review these along with a score and helpful tips on how to reduce their digital footprint.</a:t>
             </a:r>
-          </a:p>
-          <a:p>
-            <a:pPr algn="ctr"/>
-            <a:endParaRPr lang="en-GB" sz="3200" dirty="0"/>
           </a:p>
         </p:txBody>
       </p:sp>
@@ -4554,7 +4527,7 @@
         </p:nvSpPr>
         <p:spPr>
           <a:xfrm>
-            <a:off x="10277510" y="15338053"/>
+            <a:off x="19273194" y="1379918"/>
             <a:ext cx="10317892" cy="4226838"/>
           </a:xfrm>
           <a:prstGeom prst="roundRect">
@@ -4639,872 +4612,893 @@
           </a:p>
         </p:txBody>
       </p:sp>
-      <p:pic>
-        <p:nvPicPr>
-          <p:cNvPr id="46" name="Graphic 45" descr="Server with solid fill">
+      <p:grpSp>
+        <p:nvGrpSpPr>
+          <p:cNvPr id="2" name="Group 1">
             <a:extLst>
               <a:ext uri="{FF2B5EF4-FFF2-40B4-BE49-F238E27FC236}">
-                <a16:creationId xmlns:a16="http://schemas.microsoft.com/office/drawing/2014/main" id="{7C34E9C0-3EE5-41A7-19B7-B0750B35DCB6}"/>
+                <a16:creationId xmlns:a16="http://schemas.microsoft.com/office/drawing/2014/main" id="{C3D917D4-3696-D0A7-E2AF-19EE868232A0}"/>
               </a:ext>
             </a:extLst>
           </p:cNvPr>
-          <p:cNvPicPr>
-            <a:picLocks noChangeAspect="1"/>
-          </p:cNvPicPr>
+          <p:cNvGrpSpPr/>
           <p:nvPr/>
-        </p:nvPicPr>
-        <p:blipFill>
-          <a:blip r:embed="rId18">
-            <a:extLst>
-              <a:ext uri="{96DAC541-7B7A-43D3-8B79-37D633B846F1}">
-                <asvg:svgBlip xmlns:asvg="http://schemas.microsoft.com/office/drawing/2016/SVG/main" r:embed="rId19"/>
-              </a:ext>
-            </a:extLst>
-          </a:blip>
-          <a:stretch>
-            <a:fillRect/>
-          </a:stretch>
-        </p:blipFill>
-        <p:spPr>
+        </p:nvGrpSpPr>
+        <p:grpSpPr>
           <a:xfrm>
-            <a:off x="5978117" y="9000411"/>
-            <a:ext cx="914400" cy="914400"/>
+            <a:off x="11437237" y="14163175"/>
+            <a:ext cx="6380785" cy="4474472"/>
+            <a:chOff x="1964207" y="7096384"/>
+            <a:chExt cx="6781488" cy="4755462"/>
           </a:xfrm>
-          <a:prstGeom prst="rect">
-            <a:avLst/>
-          </a:prstGeom>
-        </p:spPr>
-      </p:pic>
+        </p:grpSpPr>
+        <p:pic>
+          <p:nvPicPr>
+            <p:cNvPr id="46" name="Graphic 45" descr="Server with solid fill">
+              <a:extLst>
+                <a:ext uri="{FF2B5EF4-FFF2-40B4-BE49-F238E27FC236}">
+                  <a16:creationId xmlns:a16="http://schemas.microsoft.com/office/drawing/2014/main" id="{7C34E9C0-3EE5-41A7-19B7-B0750B35DCB6}"/>
+                </a:ext>
+              </a:extLst>
+            </p:cNvPr>
+            <p:cNvPicPr>
+              <a:picLocks noChangeAspect="1"/>
+            </p:cNvPicPr>
+            <p:nvPr/>
+          </p:nvPicPr>
+          <p:blipFill>
+            <a:blip r:embed="rId17">
+              <a:extLst>
+                <a:ext uri="{96DAC541-7B7A-43D3-8B79-37D633B846F1}">
+                  <asvg:svgBlip xmlns:asvg="http://schemas.microsoft.com/office/drawing/2016/SVG/main" r:embed="rId18"/>
+                </a:ext>
+              </a:extLst>
+            </a:blip>
+            <a:stretch>
+              <a:fillRect/>
+            </a:stretch>
+          </p:blipFill>
+          <p:spPr>
+            <a:xfrm>
+              <a:off x="5978117" y="9000411"/>
+              <a:ext cx="914400" cy="914400"/>
+            </a:xfrm>
+            <a:prstGeom prst="rect">
+              <a:avLst/>
+            </a:prstGeom>
+          </p:spPr>
+        </p:pic>
+        <p:pic>
+          <p:nvPicPr>
+            <p:cNvPr id="47" name="Graphic 46" descr="Male profile with solid fill">
+              <a:extLst>
+                <a:ext uri="{FF2B5EF4-FFF2-40B4-BE49-F238E27FC236}">
+                  <a16:creationId xmlns:a16="http://schemas.microsoft.com/office/drawing/2014/main" id="{1A2B5869-C2F5-0967-EBF9-A02DE36250B8}"/>
+                </a:ext>
+              </a:extLst>
+            </p:cNvPr>
+            <p:cNvPicPr>
+              <a:picLocks noChangeAspect="1"/>
+            </p:cNvPicPr>
+            <p:nvPr/>
+          </p:nvPicPr>
+          <p:blipFill>
+            <a:blip r:embed="rId19">
+              <a:extLst>
+                <a:ext uri="{96DAC541-7B7A-43D3-8B79-37D633B846F1}">
+                  <asvg:svgBlip xmlns:asvg="http://schemas.microsoft.com/office/drawing/2016/SVG/main" r:embed="rId20"/>
+                </a:ext>
+              </a:extLst>
+            </a:blip>
+            <a:stretch>
+              <a:fillRect/>
+            </a:stretch>
+          </p:blipFill>
+          <p:spPr>
+            <a:xfrm>
+              <a:off x="1964207" y="9000411"/>
+              <a:ext cx="914400" cy="914400"/>
+            </a:xfrm>
+            <a:prstGeom prst="rect">
+              <a:avLst/>
+            </a:prstGeom>
+          </p:spPr>
+        </p:pic>
+        <p:pic>
+          <p:nvPicPr>
+            <p:cNvPr id="48" name="Graphic 47" descr="Monitor with solid fill">
+              <a:extLst>
+                <a:ext uri="{FF2B5EF4-FFF2-40B4-BE49-F238E27FC236}">
+                  <a16:creationId xmlns:a16="http://schemas.microsoft.com/office/drawing/2014/main" id="{5500CCAE-8DD6-43DB-50DE-8DDF67BB18DA}"/>
+                </a:ext>
+              </a:extLst>
+            </p:cNvPr>
+            <p:cNvPicPr>
+              <a:picLocks noChangeAspect="1"/>
+            </p:cNvPicPr>
+            <p:nvPr/>
+          </p:nvPicPr>
+          <p:blipFill>
+            <a:blip r:embed="rId21">
+              <a:extLst>
+                <a:ext uri="{96DAC541-7B7A-43D3-8B79-37D633B846F1}">
+                  <asvg:svgBlip xmlns:asvg="http://schemas.microsoft.com/office/drawing/2016/SVG/main" r:embed="rId22"/>
+                </a:ext>
+              </a:extLst>
+            </a:blip>
+            <a:stretch>
+              <a:fillRect/>
+            </a:stretch>
+          </p:blipFill>
+          <p:spPr>
+            <a:xfrm>
+              <a:off x="3929121" y="9005332"/>
+              <a:ext cx="914400" cy="914400"/>
+            </a:xfrm>
+            <a:prstGeom prst="rect">
+              <a:avLst/>
+            </a:prstGeom>
+          </p:spPr>
+        </p:pic>
+        <p:pic>
+          <p:nvPicPr>
+            <p:cNvPr id="49" name="Graphic 48" descr="Database with solid fill">
+              <a:extLst>
+                <a:ext uri="{FF2B5EF4-FFF2-40B4-BE49-F238E27FC236}">
+                  <a16:creationId xmlns:a16="http://schemas.microsoft.com/office/drawing/2014/main" id="{BFA81AA1-7414-267F-FBED-ABD300E8EFA0}"/>
+                </a:ext>
+              </a:extLst>
+            </p:cNvPr>
+            <p:cNvPicPr>
+              <a:picLocks noChangeAspect="1"/>
+            </p:cNvPicPr>
+            <p:nvPr/>
+          </p:nvPicPr>
+          <p:blipFill>
+            <a:blip r:embed="rId23">
+              <a:extLst>
+                <a:ext uri="{96DAC541-7B7A-43D3-8B79-37D633B846F1}">
+                  <asvg:svgBlip xmlns:asvg="http://schemas.microsoft.com/office/drawing/2016/SVG/main" r:embed="rId24"/>
+                </a:ext>
+              </a:extLst>
+            </a:blip>
+            <a:stretch>
+              <a:fillRect/>
+            </a:stretch>
+          </p:blipFill>
+          <p:spPr>
+            <a:xfrm>
+              <a:off x="7831295" y="9000411"/>
+              <a:ext cx="914400" cy="914400"/>
+            </a:xfrm>
+            <a:prstGeom prst="rect">
+              <a:avLst/>
+            </a:prstGeom>
+          </p:spPr>
+        </p:pic>
+        <p:pic>
+          <p:nvPicPr>
+            <p:cNvPr id="50" name="Graphic 49" descr="Disk with solid fill">
+              <a:extLst>
+                <a:ext uri="{FF2B5EF4-FFF2-40B4-BE49-F238E27FC236}">
+                  <a16:creationId xmlns:a16="http://schemas.microsoft.com/office/drawing/2014/main" id="{E1D9F614-0457-4E82-C82D-338CCF7BE497}"/>
+                </a:ext>
+              </a:extLst>
+            </p:cNvPr>
+            <p:cNvPicPr>
+              <a:picLocks noChangeAspect="1"/>
+            </p:cNvPicPr>
+            <p:nvPr/>
+          </p:nvPicPr>
+          <p:blipFill>
+            <a:blip r:embed="rId25">
+              <a:extLst>
+                <a:ext uri="{96DAC541-7B7A-43D3-8B79-37D633B846F1}">
+                  <asvg:svgBlip xmlns:asvg="http://schemas.microsoft.com/office/drawing/2016/SVG/main" r:embed="rId26"/>
+                </a:ext>
+              </a:extLst>
+            </a:blip>
+            <a:stretch>
+              <a:fillRect/>
+            </a:stretch>
+          </p:blipFill>
+          <p:spPr>
+            <a:xfrm>
+              <a:off x="4576246" y="9914811"/>
+              <a:ext cx="910903" cy="910903"/>
+            </a:xfrm>
+            <a:prstGeom prst="rect">
+              <a:avLst/>
+            </a:prstGeom>
+          </p:spPr>
+        </p:pic>
+        <p:pic>
+          <p:nvPicPr>
+            <p:cNvPr id="51" name="Graphic 50" descr="Statistics with solid fill">
+              <a:extLst>
+                <a:ext uri="{FF2B5EF4-FFF2-40B4-BE49-F238E27FC236}">
+                  <a16:creationId xmlns:a16="http://schemas.microsoft.com/office/drawing/2014/main" id="{9330931A-0336-D47A-9AEF-AA32F1061C59}"/>
+                </a:ext>
+              </a:extLst>
+            </p:cNvPr>
+            <p:cNvPicPr>
+              <a:picLocks noChangeAspect="1"/>
+            </p:cNvPicPr>
+            <p:nvPr/>
+          </p:nvPicPr>
+          <p:blipFill>
+            <a:blip r:embed="rId27">
+              <a:extLst>
+                <a:ext uri="{96DAC541-7B7A-43D3-8B79-37D633B846F1}">
+                  <asvg:svgBlip xmlns:asvg="http://schemas.microsoft.com/office/drawing/2016/SVG/main" r:embed="rId28"/>
+                </a:ext>
+              </a:extLst>
+            </a:blip>
+            <a:stretch>
+              <a:fillRect/>
+            </a:stretch>
+          </p:blipFill>
+          <p:spPr>
+            <a:xfrm>
+              <a:off x="4794749" y="7470878"/>
+              <a:ext cx="910903" cy="910903"/>
+            </a:xfrm>
+            <a:prstGeom prst="rect">
+              <a:avLst/>
+            </a:prstGeom>
+          </p:spPr>
+        </p:pic>
+        <p:pic>
+          <p:nvPicPr>
+            <p:cNvPr id="52" name="Graphic 51" descr="Research with solid fill">
+              <a:extLst>
+                <a:ext uri="{FF2B5EF4-FFF2-40B4-BE49-F238E27FC236}">
+                  <a16:creationId xmlns:a16="http://schemas.microsoft.com/office/drawing/2014/main" id="{4B9D6F8B-B2BD-3674-0891-798D4CDA372F}"/>
+                </a:ext>
+              </a:extLst>
+            </p:cNvPr>
+            <p:cNvPicPr>
+              <a:picLocks noChangeAspect="1"/>
+            </p:cNvPicPr>
+            <p:nvPr/>
+          </p:nvPicPr>
+          <p:blipFill>
+            <a:blip r:embed="rId29">
+              <a:extLst>
+                <a:ext uri="{96DAC541-7B7A-43D3-8B79-37D633B846F1}">
+                  <asvg:svgBlip xmlns:asvg="http://schemas.microsoft.com/office/drawing/2016/SVG/main" r:embed="rId30"/>
+                </a:ext>
+              </a:extLst>
+            </a:blip>
+            <a:stretch>
+              <a:fillRect/>
+            </a:stretch>
+          </p:blipFill>
+          <p:spPr>
+            <a:xfrm>
+              <a:off x="7616197" y="10096180"/>
+              <a:ext cx="910903" cy="910903"/>
+            </a:xfrm>
+            <a:prstGeom prst="rect">
+              <a:avLst/>
+            </a:prstGeom>
+          </p:spPr>
+        </p:pic>
+        <p:pic>
+          <p:nvPicPr>
+            <p:cNvPr id="53" name="Graphic 52" descr="Cloud with solid fill">
+              <a:extLst>
+                <a:ext uri="{FF2B5EF4-FFF2-40B4-BE49-F238E27FC236}">
+                  <a16:creationId xmlns:a16="http://schemas.microsoft.com/office/drawing/2014/main" id="{FCB1CC9C-9052-0043-625E-D5ED2A08D260}"/>
+                </a:ext>
+              </a:extLst>
+            </p:cNvPr>
+            <p:cNvPicPr>
+              <a:picLocks noChangeAspect="1"/>
+            </p:cNvPicPr>
+            <p:nvPr/>
+          </p:nvPicPr>
+          <p:blipFill>
+            <a:blip r:embed="rId31">
+              <a:extLst>
+                <a:ext uri="{96DAC541-7B7A-43D3-8B79-37D633B846F1}">
+                  <asvg:svgBlip xmlns:asvg="http://schemas.microsoft.com/office/drawing/2016/SVG/main" r:embed="rId32"/>
+                </a:ext>
+              </a:extLst>
+            </a:blip>
+            <a:stretch>
+              <a:fillRect/>
+            </a:stretch>
+          </p:blipFill>
+          <p:spPr>
+            <a:xfrm>
+              <a:off x="4976238" y="10632590"/>
+              <a:ext cx="910903" cy="910903"/>
+            </a:xfrm>
+            <a:prstGeom prst="rect">
+              <a:avLst/>
+            </a:prstGeom>
+          </p:spPr>
+        </p:pic>
+        <p:pic>
+          <p:nvPicPr>
+            <p:cNvPr id="54" name="Graphic 53" descr="Usb Stick with solid fill">
+              <a:extLst>
+                <a:ext uri="{FF2B5EF4-FFF2-40B4-BE49-F238E27FC236}">
+                  <a16:creationId xmlns:a16="http://schemas.microsoft.com/office/drawing/2014/main" id="{9A8F6C3D-F28A-6704-2209-4DE498A94E7D}"/>
+                </a:ext>
+              </a:extLst>
+            </p:cNvPr>
+            <p:cNvPicPr>
+              <a:picLocks noChangeAspect="1"/>
+            </p:cNvPicPr>
+            <p:nvPr/>
+          </p:nvPicPr>
+          <p:blipFill>
+            <a:blip r:embed="rId33">
+              <a:extLst>
+                <a:ext uri="{96DAC541-7B7A-43D3-8B79-37D633B846F1}">
+                  <asvg:svgBlip xmlns:asvg="http://schemas.microsoft.com/office/drawing/2016/SVG/main" r:embed="rId34"/>
+                </a:ext>
+              </a:extLst>
+            </a:blip>
+            <a:stretch>
+              <a:fillRect/>
+            </a:stretch>
+          </p:blipFill>
+          <p:spPr>
+            <a:xfrm>
+              <a:off x="6890612" y="10739807"/>
+              <a:ext cx="910903" cy="910903"/>
+            </a:xfrm>
+            <a:prstGeom prst="rect">
+              <a:avLst/>
+            </a:prstGeom>
+          </p:spPr>
+        </p:pic>
+        <p:pic>
+          <p:nvPicPr>
+            <p:cNvPr id="55" name="Graphic 54" descr="Bar chart with solid fill">
+              <a:extLst>
+                <a:ext uri="{FF2B5EF4-FFF2-40B4-BE49-F238E27FC236}">
+                  <a16:creationId xmlns:a16="http://schemas.microsoft.com/office/drawing/2014/main" id="{DDF56B9C-1FF0-EE93-5662-05B44440A69F}"/>
+                </a:ext>
+              </a:extLst>
+            </p:cNvPr>
+            <p:cNvPicPr>
+              <a:picLocks noChangeAspect="1"/>
+            </p:cNvPicPr>
+            <p:nvPr/>
+          </p:nvPicPr>
+          <p:blipFill>
+            <a:blip r:embed="rId35">
+              <a:extLst>
+                <a:ext uri="{96DAC541-7B7A-43D3-8B79-37D633B846F1}">
+                  <asvg:svgBlip xmlns:asvg="http://schemas.microsoft.com/office/drawing/2016/SVG/main" r:embed="rId36"/>
+                </a:ext>
+              </a:extLst>
+            </a:blip>
+            <a:stretch>
+              <a:fillRect/>
+            </a:stretch>
+          </p:blipFill>
+          <p:spPr>
+            <a:xfrm>
+              <a:off x="6048651" y="10940943"/>
+              <a:ext cx="910903" cy="910903"/>
+            </a:xfrm>
+            <a:prstGeom prst="rect">
+              <a:avLst/>
+            </a:prstGeom>
+          </p:spPr>
+        </p:pic>
+        <p:pic>
+          <p:nvPicPr>
+            <p:cNvPr id="56" name="Graphic 55" descr="Pie chart with solid fill">
+              <a:extLst>
+                <a:ext uri="{FF2B5EF4-FFF2-40B4-BE49-F238E27FC236}">
+                  <a16:creationId xmlns:a16="http://schemas.microsoft.com/office/drawing/2014/main" id="{042DF211-061E-3534-8E26-755B0FC72E54}"/>
+                </a:ext>
+              </a:extLst>
+            </p:cNvPr>
+            <p:cNvPicPr>
+              <a:picLocks noChangeAspect="1"/>
+            </p:cNvPicPr>
+            <p:nvPr/>
+          </p:nvPicPr>
+          <p:blipFill>
+            <a:blip r:embed="rId37">
+              <a:extLst>
+                <a:ext uri="{96DAC541-7B7A-43D3-8B79-37D633B846F1}">
+                  <asvg:svgBlip xmlns:asvg="http://schemas.microsoft.com/office/drawing/2016/SVG/main" r:embed="rId38"/>
+                </a:ext>
+              </a:extLst>
+            </a:blip>
+            <a:stretch>
+              <a:fillRect/>
+            </a:stretch>
+          </p:blipFill>
+          <p:spPr>
+            <a:xfrm>
+              <a:off x="6199299" y="7096384"/>
+              <a:ext cx="910903" cy="910903"/>
+            </a:xfrm>
+            <a:prstGeom prst="rect">
+              <a:avLst/>
+            </a:prstGeom>
+          </p:spPr>
+        </p:pic>
+        <p:pic>
+          <p:nvPicPr>
+            <p:cNvPr id="57" name="Graphic 56" descr="Document with solid fill">
+              <a:extLst>
+                <a:ext uri="{FF2B5EF4-FFF2-40B4-BE49-F238E27FC236}">
+                  <a16:creationId xmlns:a16="http://schemas.microsoft.com/office/drawing/2014/main" id="{E8FE4F72-3ACB-321B-C402-3A65A9107B22}"/>
+                </a:ext>
+              </a:extLst>
+            </p:cNvPr>
+            <p:cNvPicPr>
+              <a:picLocks noChangeAspect="1"/>
+            </p:cNvPicPr>
+            <p:nvPr/>
+          </p:nvPicPr>
+          <p:blipFill>
+            <a:blip r:embed="rId39">
+              <a:extLst>
+                <a:ext uri="{96DAC541-7B7A-43D3-8B79-37D633B846F1}">
+                  <asvg:svgBlip xmlns:asvg="http://schemas.microsoft.com/office/drawing/2016/SVG/main" r:embed="rId40"/>
+                </a:ext>
+              </a:extLst>
+            </a:blip>
+            <a:stretch>
+              <a:fillRect/>
+            </a:stretch>
+          </p:blipFill>
+          <p:spPr>
+            <a:xfrm>
+              <a:off x="7248783" y="7806340"/>
+              <a:ext cx="910903" cy="910903"/>
+            </a:xfrm>
+            <a:prstGeom prst="rect">
+              <a:avLst/>
+            </a:prstGeom>
+          </p:spPr>
+        </p:pic>
+        <p:pic>
+          <p:nvPicPr>
+            <p:cNvPr id="58" name="Graphic 57" descr="Transfer outline">
+              <a:extLst>
+                <a:ext uri="{FF2B5EF4-FFF2-40B4-BE49-F238E27FC236}">
+                  <a16:creationId xmlns:a16="http://schemas.microsoft.com/office/drawing/2014/main" id="{86F3DA6C-3CD7-0203-D7CC-6899DF099570}"/>
+                </a:ext>
+              </a:extLst>
+            </p:cNvPr>
+            <p:cNvPicPr>
+              <a:picLocks noChangeAspect="1"/>
+            </p:cNvPicPr>
+            <p:nvPr/>
+          </p:nvPicPr>
+          <p:blipFill>
+            <a:blip r:embed="rId41">
+              <a:extLst>
+                <a:ext uri="{96DAC541-7B7A-43D3-8B79-37D633B846F1}">
+                  <asvg:svgBlip xmlns:asvg="http://schemas.microsoft.com/office/drawing/2016/SVG/main" r:embed="rId42"/>
+                </a:ext>
+              </a:extLst>
+            </a:blip>
+            <a:stretch>
+              <a:fillRect/>
+            </a:stretch>
+          </p:blipFill>
+          <p:spPr>
+            <a:xfrm>
+              <a:off x="6893509" y="9050160"/>
+              <a:ext cx="914400" cy="914400"/>
+            </a:xfrm>
+            <a:prstGeom prst="rect">
+              <a:avLst/>
+            </a:prstGeom>
+          </p:spPr>
+        </p:pic>
+        <p:pic>
+          <p:nvPicPr>
+            <p:cNvPr id="59" name="Graphic 58" descr="Transfer outline">
+              <a:extLst>
+                <a:ext uri="{FF2B5EF4-FFF2-40B4-BE49-F238E27FC236}">
+                  <a16:creationId xmlns:a16="http://schemas.microsoft.com/office/drawing/2014/main" id="{83D0834B-E096-87AB-5587-0DADC3937587}"/>
+                </a:ext>
+              </a:extLst>
+            </p:cNvPr>
+            <p:cNvPicPr>
+              <a:picLocks noChangeAspect="1"/>
+            </p:cNvPicPr>
+            <p:nvPr/>
+          </p:nvPicPr>
+          <p:blipFill>
+            <a:blip r:embed="rId41">
+              <a:extLst>
+                <a:ext uri="{96DAC541-7B7A-43D3-8B79-37D633B846F1}">
+                  <asvg:svgBlip xmlns:asvg="http://schemas.microsoft.com/office/drawing/2016/SVG/main" r:embed="rId42"/>
+                </a:ext>
+              </a:extLst>
+            </a:blip>
+            <a:stretch>
+              <a:fillRect/>
+            </a:stretch>
+          </p:blipFill>
+          <p:spPr>
+            <a:xfrm>
+              <a:off x="4933002" y="8992826"/>
+              <a:ext cx="914400" cy="914400"/>
+            </a:xfrm>
+            <a:prstGeom prst="rect">
+              <a:avLst/>
+            </a:prstGeom>
+          </p:spPr>
+        </p:pic>
+        <p:pic>
+          <p:nvPicPr>
+            <p:cNvPr id="60" name="Graphic 59" descr="Arrow Right with solid fill">
+              <a:extLst>
+                <a:ext uri="{FF2B5EF4-FFF2-40B4-BE49-F238E27FC236}">
+                  <a16:creationId xmlns:a16="http://schemas.microsoft.com/office/drawing/2014/main" id="{876D21F7-3231-3C8B-F490-E76E74A8D10D}"/>
+                </a:ext>
+              </a:extLst>
+            </p:cNvPr>
+            <p:cNvPicPr>
+              <a:picLocks noChangeAspect="1"/>
+            </p:cNvPicPr>
+            <p:nvPr/>
+          </p:nvPicPr>
+          <p:blipFill>
+            <a:blip r:embed="rId43">
+              <a:extLst>
+                <a:ext uri="{96DAC541-7B7A-43D3-8B79-37D633B846F1}">
+                  <asvg:svgBlip xmlns:asvg="http://schemas.microsoft.com/office/drawing/2016/SVG/main" r:embed="rId44"/>
+                </a:ext>
+              </a:extLst>
+            </a:blip>
+            <a:stretch>
+              <a:fillRect/>
+            </a:stretch>
+          </p:blipFill>
+          <p:spPr>
+            <a:xfrm rot="13039938">
+              <a:off x="5646828" y="8284763"/>
+              <a:ext cx="914400" cy="914400"/>
+            </a:xfrm>
+            <a:prstGeom prst="rect">
+              <a:avLst/>
+            </a:prstGeom>
+          </p:spPr>
+        </p:pic>
+        <p:pic>
+          <p:nvPicPr>
+            <p:cNvPr id="61" name="Graphic 60" descr="Arrow Right with solid fill">
+              <a:extLst>
+                <a:ext uri="{FF2B5EF4-FFF2-40B4-BE49-F238E27FC236}">
+                  <a16:creationId xmlns:a16="http://schemas.microsoft.com/office/drawing/2014/main" id="{E83C3A90-9030-A429-AA8D-3FB84E0C1607}"/>
+                </a:ext>
+              </a:extLst>
+            </p:cNvPr>
+            <p:cNvPicPr>
+              <a:picLocks noChangeAspect="1"/>
+            </p:cNvPicPr>
+            <p:nvPr/>
+          </p:nvPicPr>
+          <p:blipFill>
+            <a:blip r:embed="rId43">
+              <a:extLst>
+                <a:ext uri="{96DAC541-7B7A-43D3-8B79-37D633B846F1}">
+                  <asvg:svgBlip xmlns:asvg="http://schemas.microsoft.com/office/drawing/2016/SVG/main" r:embed="rId44"/>
+                </a:ext>
+              </a:extLst>
+            </a:blip>
+            <a:stretch>
+              <a:fillRect/>
+            </a:stretch>
+          </p:blipFill>
+          <p:spPr>
+            <a:xfrm rot="16467366">
+              <a:off x="6011015" y="8130713"/>
+              <a:ext cx="914400" cy="914400"/>
+            </a:xfrm>
+            <a:prstGeom prst="rect">
+              <a:avLst/>
+            </a:prstGeom>
+          </p:spPr>
+        </p:pic>
+        <p:pic>
+          <p:nvPicPr>
+            <p:cNvPr id="62" name="Graphic 61" descr="Arrow Right with solid fill">
+              <a:extLst>
+                <a:ext uri="{FF2B5EF4-FFF2-40B4-BE49-F238E27FC236}">
+                  <a16:creationId xmlns:a16="http://schemas.microsoft.com/office/drawing/2014/main" id="{74580E44-CDDA-DA23-3560-789CD4A78A9D}"/>
+                </a:ext>
+              </a:extLst>
+            </p:cNvPr>
+            <p:cNvPicPr>
+              <a:picLocks noChangeAspect="1"/>
+            </p:cNvPicPr>
+            <p:nvPr/>
+          </p:nvPicPr>
+          <p:blipFill>
+            <a:blip r:embed="rId43">
+              <a:extLst>
+                <a:ext uri="{96DAC541-7B7A-43D3-8B79-37D633B846F1}">
+                  <asvg:svgBlip xmlns:asvg="http://schemas.microsoft.com/office/drawing/2016/SVG/main" r:embed="rId44"/>
+                </a:ext>
+              </a:extLst>
+            </a:blip>
+            <a:stretch>
+              <a:fillRect/>
+            </a:stretch>
+          </p:blipFill>
+          <p:spPr>
+            <a:xfrm rot="19253648">
+              <a:off x="6276785" y="8261338"/>
+              <a:ext cx="914400" cy="914400"/>
+            </a:xfrm>
+            <a:prstGeom prst="rect">
+              <a:avLst/>
+            </a:prstGeom>
+          </p:spPr>
+        </p:pic>
+        <p:pic>
+          <p:nvPicPr>
+            <p:cNvPr id="63" name="Graphic 62" descr="Arrow Right with solid fill">
+              <a:extLst>
+                <a:ext uri="{FF2B5EF4-FFF2-40B4-BE49-F238E27FC236}">
+                  <a16:creationId xmlns:a16="http://schemas.microsoft.com/office/drawing/2014/main" id="{FDF42755-7521-8C75-4E2E-815714CF130E}"/>
+                </a:ext>
+              </a:extLst>
+            </p:cNvPr>
+            <p:cNvPicPr>
+              <a:picLocks noChangeAspect="1"/>
+            </p:cNvPicPr>
+            <p:nvPr/>
+          </p:nvPicPr>
+          <p:blipFill>
+            <a:blip r:embed="rId43">
+              <a:extLst>
+                <a:ext uri="{96DAC541-7B7A-43D3-8B79-37D633B846F1}">
+                  <asvg:svgBlip xmlns:asvg="http://schemas.microsoft.com/office/drawing/2016/SVG/main" r:embed="rId44"/>
+                </a:ext>
+              </a:extLst>
+            </a:blip>
+            <a:stretch>
+              <a:fillRect/>
+            </a:stretch>
+          </p:blipFill>
+          <p:spPr>
+            <a:xfrm rot="9397180">
+              <a:off x="5581109" y="9651076"/>
+              <a:ext cx="914400" cy="914400"/>
+            </a:xfrm>
+            <a:prstGeom prst="rect">
+              <a:avLst/>
+            </a:prstGeom>
+          </p:spPr>
+        </p:pic>
+        <p:pic>
+          <p:nvPicPr>
+            <p:cNvPr id="1024" name="Graphic 1023" descr="Arrow Right with solid fill">
+              <a:extLst>
+                <a:ext uri="{FF2B5EF4-FFF2-40B4-BE49-F238E27FC236}">
+                  <a16:creationId xmlns:a16="http://schemas.microsoft.com/office/drawing/2014/main" id="{B74B2F83-41A3-0C71-9349-73E4DDB0F062}"/>
+                </a:ext>
+              </a:extLst>
+            </p:cNvPr>
+            <p:cNvPicPr>
+              <a:picLocks noChangeAspect="1"/>
+            </p:cNvPicPr>
+            <p:nvPr/>
+          </p:nvPicPr>
+          <p:blipFill>
+            <a:blip r:embed="rId43">
+              <a:extLst>
+                <a:ext uri="{96DAC541-7B7A-43D3-8B79-37D633B846F1}">
+                  <asvg:svgBlip xmlns:asvg="http://schemas.microsoft.com/office/drawing/2016/SVG/main" r:embed="rId44"/>
+                </a:ext>
+              </a:extLst>
+            </a:blip>
+            <a:stretch>
+              <a:fillRect/>
+            </a:stretch>
+          </p:blipFill>
+          <p:spPr>
+            <a:xfrm rot="7248496">
+              <a:off x="5742098" y="9853318"/>
+              <a:ext cx="914400" cy="914400"/>
+            </a:xfrm>
+            <a:prstGeom prst="rect">
+              <a:avLst/>
+            </a:prstGeom>
+          </p:spPr>
+        </p:pic>
+        <p:pic>
+          <p:nvPicPr>
+            <p:cNvPr id="1025" name="Graphic 1024" descr="Arrow Right with solid fill">
+              <a:extLst>
+                <a:ext uri="{FF2B5EF4-FFF2-40B4-BE49-F238E27FC236}">
+                  <a16:creationId xmlns:a16="http://schemas.microsoft.com/office/drawing/2014/main" id="{55F34A16-8A41-886A-F008-23AB7BA55436}"/>
+                </a:ext>
+              </a:extLst>
+            </p:cNvPr>
+            <p:cNvPicPr>
+              <a:picLocks noChangeAspect="1"/>
+            </p:cNvPicPr>
+            <p:nvPr/>
+          </p:nvPicPr>
+          <p:blipFill>
+            <a:blip r:embed="rId43">
+              <a:extLst>
+                <a:ext uri="{96DAC541-7B7A-43D3-8B79-37D633B846F1}">
+                  <asvg:svgBlip xmlns:asvg="http://schemas.microsoft.com/office/drawing/2016/SVG/main" r:embed="rId44"/>
+                </a:ext>
+              </a:extLst>
+            </a:blip>
+            <a:stretch>
+              <a:fillRect/>
+            </a:stretch>
+          </p:blipFill>
+          <p:spPr>
+            <a:xfrm rot="5400000">
+              <a:off x="5961656" y="9883037"/>
+              <a:ext cx="914400" cy="914400"/>
+            </a:xfrm>
+            <a:prstGeom prst="rect">
+              <a:avLst/>
+            </a:prstGeom>
+          </p:spPr>
+        </p:pic>
+        <p:pic>
+          <p:nvPicPr>
+            <p:cNvPr id="1027" name="Graphic 1026" descr="Arrow Right with solid fill">
+              <a:extLst>
+                <a:ext uri="{FF2B5EF4-FFF2-40B4-BE49-F238E27FC236}">
+                  <a16:creationId xmlns:a16="http://schemas.microsoft.com/office/drawing/2014/main" id="{723DC9FF-36B1-0F84-1B27-F32AEA556623}"/>
+                </a:ext>
+              </a:extLst>
+            </p:cNvPr>
+            <p:cNvPicPr>
+              <a:picLocks noChangeAspect="1"/>
+            </p:cNvPicPr>
+            <p:nvPr/>
+          </p:nvPicPr>
+          <p:blipFill>
+            <a:blip r:embed="rId43">
+              <a:extLst>
+                <a:ext uri="{96DAC541-7B7A-43D3-8B79-37D633B846F1}">
+                  <asvg:svgBlip xmlns:asvg="http://schemas.microsoft.com/office/drawing/2016/SVG/main" r:embed="rId44"/>
+                </a:ext>
+              </a:extLst>
+            </a:blip>
+            <a:stretch>
+              <a:fillRect/>
+            </a:stretch>
+          </p:blipFill>
+          <p:spPr>
+            <a:xfrm rot="2880042">
+              <a:off x="6209257" y="9821625"/>
+              <a:ext cx="1046910" cy="914400"/>
+            </a:xfrm>
+            <a:prstGeom prst="rect">
+              <a:avLst/>
+            </a:prstGeom>
+          </p:spPr>
+        </p:pic>
+        <p:pic>
+          <p:nvPicPr>
+            <p:cNvPr id="1029" name="Graphic 1028" descr="Arrow Right with solid fill">
+              <a:extLst>
+                <a:ext uri="{FF2B5EF4-FFF2-40B4-BE49-F238E27FC236}">
+                  <a16:creationId xmlns:a16="http://schemas.microsoft.com/office/drawing/2014/main" id="{AD4CF525-5624-1879-0E12-2C9C96118205}"/>
+                </a:ext>
+              </a:extLst>
+            </p:cNvPr>
+            <p:cNvPicPr>
+              <a:picLocks noChangeAspect="1"/>
+            </p:cNvPicPr>
+            <p:nvPr/>
+          </p:nvPicPr>
+          <p:blipFill>
+            <a:blip r:embed="rId43">
+              <a:extLst>
+                <a:ext uri="{96DAC541-7B7A-43D3-8B79-37D633B846F1}">
+                  <asvg:svgBlip xmlns:asvg="http://schemas.microsoft.com/office/drawing/2016/SVG/main" r:embed="rId44"/>
+                </a:ext>
+              </a:extLst>
+            </a:blip>
+            <a:stretch>
+              <a:fillRect/>
+            </a:stretch>
+          </p:blipFill>
+          <p:spPr>
+            <a:xfrm rot="951398">
+              <a:off x="6374260" y="9615103"/>
+              <a:ext cx="1028332" cy="914400"/>
+            </a:xfrm>
+            <a:prstGeom prst="rect">
+              <a:avLst/>
+            </a:prstGeom>
+          </p:spPr>
+        </p:pic>
+        <p:pic>
+          <p:nvPicPr>
+            <p:cNvPr id="1031" name="Graphic 1030" descr="Transfer outline">
+              <a:extLst>
+                <a:ext uri="{FF2B5EF4-FFF2-40B4-BE49-F238E27FC236}">
+                  <a16:creationId xmlns:a16="http://schemas.microsoft.com/office/drawing/2014/main" id="{CC45DE35-D966-0112-C490-EA3446E59551}"/>
+                </a:ext>
+              </a:extLst>
+            </p:cNvPr>
+            <p:cNvPicPr>
+              <a:picLocks noChangeAspect="1"/>
+            </p:cNvPicPr>
+            <p:nvPr/>
+          </p:nvPicPr>
+          <p:blipFill>
+            <a:blip r:embed="rId41">
+              <a:extLst>
+                <a:ext uri="{96DAC541-7B7A-43D3-8B79-37D633B846F1}">
+                  <asvg:svgBlip xmlns:asvg="http://schemas.microsoft.com/office/drawing/2016/SVG/main" r:embed="rId42"/>
+                </a:ext>
+              </a:extLst>
+            </a:blip>
+            <a:stretch>
+              <a:fillRect/>
+            </a:stretch>
+          </p:blipFill>
+          <p:spPr>
+            <a:xfrm>
+              <a:off x="2878607" y="9000411"/>
+              <a:ext cx="914400" cy="914400"/>
+            </a:xfrm>
+            <a:prstGeom prst="rect">
+              <a:avLst/>
+            </a:prstGeom>
+          </p:spPr>
+        </p:pic>
+        <p:pic>
+          <p:nvPicPr>
+            <p:cNvPr id="1033" name="Picture 1032">
+              <a:extLst>
+                <a:ext uri="{FF2B5EF4-FFF2-40B4-BE49-F238E27FC236}">
+                  <a16:creationId xmlns:a16="http://schemas.microsoft.com/office/drawing/2014/main" id="{B9B2F113-4B3C-363B-D71A-FDDAA24DFB8B}"/>
+                </a:ext>
+              </a:extLst>
+            </p:cNvPr>
+            <p:cNvPicPr>
+              <a:picLocks noChangeAspect="1"/>
+            </p:cNvPicPr>
+            <p:nvPr/>
+          </p:nvPicPr>
+          <p:blipFill>
+            <a:blip r:embed="rId45"/>
+            <a:stretch>
+              <a:fillRect/>
+            </a:stretch>
+          </p:blipFill>
+          <p:spPr>
+            <a:xfrm>
+              <a:off x="4053933" y="9195514"/>
+              <a:ext cx="664339" cy="419454"/>
+            </a:xfrm>
+            <a:prstGeom prst="rect">
+              <a:avLst/>
+            </a:prstGeom>
+            <a:ln>
+              <a:solidFill>
+                <a:srgbClr val="046A88"/>
+              </a:solidFill>
+            </a:ln>
+          </p:spPr>
+        </p:pic>
+      </p:grpSp>
       <p:pic>
         <p:nvPicPr>
-          <p:cNvPr id="47" name="Graphic 46" descr="Male profile with solid fill">
-            <a:extLst>
-              <a:ext uri="{FF2B5EF4-FFF2-40B4-BE49-F238E27FC236}">
-                <a16:creationId xmlns:a16="http://schemas.microsoft.com/office/drawing/2014/main" id="{1A2B5869-C2F5-0967-EBF9-A02DE36250B8}"/>
-              </a:ext>
-            </a:extLst>
-          </p:cNvPr>
-          <p:cNvPicPr>
-            <a:picLocks noChangeAspect="1"/>
-          </p:cNvPicPr>
-          <p:nvPr/>
-        </p:nvPicPr>
-        <p:blipFill>
-          <a:blip r:embed="rId20">
-            <a:extLst>
-              <a:ext uri="{96DAC541-7B7A-43D3-8B79-37D633B846F1}">
-                <asvg:svgBlip xmlns:asvg="http://schemas.microsoft.com/office/drawing/2016/SVG/main" r:embed="rId21"/>
-              </a:ext>
-            </a:extLst>
-          </a:blip>
-          <a:stretch>
-            <a:fillRect/>
-          </a:stretch>
-        </p:blipFill>
-        <p:spPr>
-          <a:xfrm>
-            <a:off x="1964207" y="9000411"/>
-            <a:ext cx="914400" cy="914400"/>
-          </a:xfrm>
-          <a:prstGeom prst="rect">
-            <a:avLst/>
-          </a:prstGeom>
-        </p:spPr>
-      </p:pic>
-      <p:pic>
-        <p:nvPicPr>
-          <p:cNvPr id="48" name="Graphic 47" descr="Monitor with solid fill">
-            <a:extLst>
-              <a:ext uri="{FF2B5EF4-FFF2-40B4-BE49-F238E27FC236}">
-                <a16:creationId xmlns:a16="http://schemas.microsoft.com/office/drawing/2014/main" id="{5500CCAE-8DD6-43DB-50DE-8DDF67BB18DA}"/>
-              </a:ext>
-            </a:extLst>
-          </p:cNvPr>
-          <p:cNvPicPr>
-            <a:picLocks noChangeAspect="1"/>
-          </p:cNvPicPr>
-          <p:nvPr/>
-        </p:nvPicPr>
-        <p:blipFill>
-          <a:blip r:embed="rId22">
-            <a:extLst>
-              <a:ext uri="{96DAC541-7B7A-43D3-8B79-37D633B846F1}">
-                <asvg:svgBlip xmlns:asvg="http://schemas.microsoft.com/office/drawing/2016/SVG/main" r:embed="rId23"/>
-              </a:ext>
-            </a:extLst>
-          </a:blip>
-          <a:stretch>
-            <a:fillRect/>
-          </a:stretch>
-        </p:blipFill>
-        <p:spPr>
-          <a:xfrm>
-            <a:off x="3929121" y="9005332"/>
-            <a:ext cx="914400" cy="914400"/>
-          </a:xfrm>
-          <a:prstGeom prst="rect">
-            <a:avLst/>
-          </a:prstGeom>
-        </p:spPr>
-      </p:pic>
-      <p:pic>
-        <p:nvPicPr>
-          <p:cNvPr id="49" name="Graphic 48" descr="Database with solid fill">
-            <a:extLst>
-              <a:ext uri="{FF2B5EF4-FFF2-40B4-BE49-F238E27FC236}">
-                <a16:creationId xmlns:a16="http://schemas.microsoft.com/office/drawing/2014/main" id="{BFA81AA1-7414-267F-FBED-ABD300E8EFA0}"/>
-              </a:ext>
-            </a:extLst>
-          </p:cNvPr>
-          <p:cNvPicPr>
-            <a:picLocks noChangeAspect="1"/>
-          </p:cNvPicPr>
-          <p:nvPr/>
-        </p:nvPicPr>
-        <p:blipFill>
-          <a:blip r:embed="rId24">
-            <a:extLst>
-              <a:ext uri="{96DAC541-7B7A-43D3-8B79-37D633B846F1}">
-                <asvg:svgBlip xmlns:asvg="http://schemas.microsoft.com/office/drawing/2016/SVG/main" r:embed="rId25"/>
-              </a:ext>
-            </a:extLst>
-          </a:blip>
-          <a:stretch>
-            <a:fillRect/>
-          </a:stretch>
-        </p:blipFill>
-        <p:spPr>
-          <a:xfrm>
-            <a:off x="7831295" y="9000411"/>
-            <a:ext cx="914400" cy="914400"/>
-          </a:xfrm>
-          <a:prstGeom prst="rect">
-            <a:avLst/>
-          </a:prstGeom>
-        </p:spPr>
-      </p:pic>
-      <p:pic>
-        <p:nvPicPr>
-          <p:cNvPr id="50" name="Graphic 49" descr="Disk with solid fill">
-            <a:extLst>
-              <a:ext uri="{FF2B5EF4-FFF2-40B4-BE49-F238E27FC236}">
-                <a16:creationId xmlns:a16="http://schemas.microsoft.com/office/drawing/2014/main" id="{E1D9F614-0457-4E82-C82D-338CCF7BE497}"/>
-              </a:ext>
-            </a:extLst>
-          </p:cNvPr>
-          <p:cNvPicPr>
-            <a:picLocks noChangeAspect="1"/>
-          </p:cNvPicPr>
-          <p:nvPr/>
-        </p:nvPicPr>
-        <p:blipFill>
-          <a:blip r:embed="rId26">
-            <a:extLst>
-              <a:ext uri="{96DAC541-7B7A-43D3-8B79-37D633B846F1}">
-                <asvg:svgBlip xmlns:asvg="http://schemas.microsoft.com/office/drawing/2016/SVG/main" r:embed="rId27"/>
-              </a:ext>
-            </a:extLst>
-          </a:blip>
-          <a:stretch>
-            <a:fillRect/>
-          </a:stretch>
-        </p:blipFill>
-        <p:spPr>
-          <a:xfrm>
-            <a:off x="4576246" y="9914811"/>
-            <a:ext cx="910903" cy="910903"/>
-          </a:xfrm>
-          <a:prstGeom prst="rect">
-            <a:avLst/>
-          </a:prstGeom>
-        </p:spPr>
-      </p:pic>
-      <p:pic>
-        <p:nvPicPr>
-          <p:cNvPr id="51" name="Graphic 50" descr="Statistics with solid fill">
-            <a:extLst>
-              <a:ext uri="{FF2B5EF4-FFF2-40B4-BE49-F238E27FC236}">
-                <a16:creationId xmlns:a16="http://schemas.microsoft.com/office/drawing/2014/main" id="{9330931A-0336-D47A-9AEF-AA32F1061C59}"/>
-              </a:ext>
-            </a:extLst>
-          </p:cNvPr>
-          <p:cNvPicPr>
-            <a:picLocks noChangeAspect="1"/>
-          </p:cNvPicPr>
-          <p:nvPr/>
-        </p:nvPicPr>
-        <p:blipFill>
-          <a:blip r:embed="rId28">
-            <a:extLst>
-              <a:ext uri="{96DAC541-7B7A-43D3-8B79-37D633B846F1}">
-                <asvg:svgBlip xmlns:asvg="http://schemas.microsoft.com/office/drawing/2016/SVG/main" r:embed="rId29"/>
-              </a:ext>
-            </a:extLst>
-          </a:blip>
-          <a:stretch>
-            <a:fillRect/>
-          </a:stretch>
-        </p:blipFill>
-        <p:spPr>
-          <a:xfrm>
-            <a:off x="4794749" y="7470878"/>
-            <a:ext cx="910903" cy="910903"/>
-          </a:xfrm>
-          <a:prstGeom prst="rect">
-            <a:avLst/>
-          </a:prstGeom>
-        </p:spPr>
-      </p:pic>
-      <p:pic>
-        <p:nvPicPr>
-          <p:cNvPr id="52" name="Graphic 51" descr="Research with solid fill">
-            <a:extLst>
-              <a:ext uri="{FF2B5EF4-FFF2-40B4-BE49-F238E27FC236}">
-                <a16:creationId xmlns:a16="http://schemas.microsoft.com/office/drawing/2014/main" id="{4B9D6F8B-B2BD-3674-0891-798D4CDA372F}"/>
-              </a:ext>
-            </a:extLst>
-          </p:cNvPr>
-          <p:cNvPicPr>
-            <a:picLocks noChangeAspect="1"/>
-          </p:cNvPicPr>
-          <p:nvPr/>
-        </p:nvPicPr>
-        <p:blipFill>
-          <a:blip r:embed="rId30">
-            <a:extLst>
-              <a:ext uri="{96DAC541-7B7A-43D3-8B79-37D633B846F1}">
-                <asvg:svgBlip xmlns:asvg="http://schemas.microsoft.com/office/drawing/2016/SVG/main" r:embed="rId31"/>
-              </a:ext>
-            </a:extLst>
-          </a:blip>
-          <a:stretch>
-            <a:fillRect/>
-          </a:stretch>
-        </p:blipFill>
-        <p:spPr>
-          <a:xfrm>
-            <a:off x="7616197" y="10096180"/>
-            <a:ext cx="910903" cy="910903"/>
-          </a:xfrm>
-          <a:prstGeom prst="rect">
-            <a:avLst/>
-          </a:prstGeom>
-        </p:spPr>
-      </p:pic>
-      <p:pic>
-        <p:nvPicPr>
-          <p:cNvPr id="53" name="Graphic 52" descr="Cloud with solid fill">
-            <a:extLst>
-              <a:ext uri="{FF2B5EF4-FFF2-40B4-BE49-F238E27FC236}">
-                <a16:creationId xmlns:a16="http://schemas.microsoft.com/office/drawing/2014/main" id="{FCB1CC9C-9052-0043-625E-D5ED2A08D260}"/>
-              </a:ext>
-            </a:extLst>
-          </p:cNvPr>
-          <p:cNvPicPr>
-            <a:picLocks noChangeAspect="1"/>
-          </p:cNvPicPr>
-          <p:nvPr/>
-        </p:nvPicPr>
-        <p:blipFill>
-          <a:blip r:embed="rId32">
-            <a:extLst>
-              <a:ext uri="{96DAC541-7B7A-43D3-8B79-37D633B846F1}">
-                <asvg:svgBlip xmlns:asvg="http://schemas.microsoft.com/office/drawing/2016/SVG/main" r:embed="rId33"/>
-              </a:ext>
-            </a:extLst>
-          </a:blip>
-          <a:stretch>
-            <a:fillRect/>
-          </a:stretch>
-        </p:blipFill>
-        <p:spPr>
-          <a:xfrm>
-            <a:off x="4976238" y="10632590"/>
-            <a:ext cx="910903" cy="910903"/>
-          </a:xfrm>
-          <a:prstGeom prst="rect">
-            <a:avLst/>
-          </a:prstGeom>
-        </p:spPr>
-      </p:pic>
-      <p:pic>
-        <p:nvPicPr>
-          <p:cNvPr id="54" name="Graphic 53" descr="Usb Stick with solid fill">
-            <a:extLst>
-              <a:ext uri="{FF2B5EF4-FFF2-40B4-BE49-F238E27FC236}">
-                <a16:creationId xmlns:a16="http://schemas.microsoft.com/office/drawing/2014/main" id="{9A8F6C3D-F28A-6704-2209-4DE498A94E7D}"/>
-              </a:ext>
-            </a:extLst>
-          </p:cNvPr>
-          <p:cNvPicPr>
-            <a:picLocks noChangeAspect="1"/>
-          </p:cNvPicPr>
-          <p:nvPr/>
-        </p:nvPicPr>
-        <p:blipFill>
-          <a:blip r:embed="rId34">
-            <a:extLst>
-              <a:ext uri="{96DAC541-7B7A-43D3-8B79-37D633B846F1}">
-                <asvg:svgBlip xmlns:asvg="http://schemas.microsoft.com/office/drawing/2016/SVG/main" r:embed="rId35"/>
-              </a:ext>
-            </a:extLst>
-          </a:blip>
-          <a:stretch>
-            <a:fillRect/>
-          </a:stretch>
-        </p:blipFill>
-        <p:spPr>
-          <a:xfrm>
-            <a:off x="6890612" y="10739807"/>
-            <a:ext cx="910903" cy="910903"/>
-          </a:xfrm>
-          <a:prstGeom prst="rect">
-            <a:avLst/>
-          </a:prstGeom>
-        </p:spPr>
-      </p:pic>
-      <p:pic>
-        <p:nvPicPr>
-          <p:cNvPr id="55" name="Graphic 54" descr="Bar chart with solid fill">
-            <a:extLst>
-              <a:ext uri="{FF2B5EF4-FFF2-40B4-BE49-F238E27FC236}">
-                <a16:creationId xmlns:a16="http://schemas.microsoft.com/office/drawing/2014/main" id="{DDF56B9C-1FF0-EE93-5662-05B44440A69F}"/>
-              </a:ext>
-            </a:extLst>
-          </p:cNvPr>
-          <p:cNvPicPr>
-            <a:picLocks noChangeAspect="1"/>
-          </p:cNvPicPr>
-          <p:nvPr/>
-        </p:nvPicPr>
-        <p:blipFill>
-          <a:blip r:embed="rId36">
-            <a:extLst>
-              <a:ext uri="{96DAC541-7B7A-43D3-8B79-37D633B846F1}">
-                <asvg:svgBlip xmlns:asvg="http://schemas.microsoft.com/office/drawing/2016/SVG/main" r:embed="rId37"/>
-              </a:ext>
-            </a:extLst>
-          </a:blip>
-          <a:stretch>
-            <a:fillRect/>
-          </a:stretch>
-        </p:blipFill>
-        <p:spPr>
-          <a:xfrm>
-            <a:off x="6048651" y="10940943"/>
-            <a:ext cx="910903" cy="910903"/>
-          </a:xfrm>
-          <a:prstGeom prst="rect">
-            <a:avLst/>
-          </a:prstGeom>
-        </p:spPr>
-      </p:pic>
-      <p:pic>
-        <p:nvPicPr>
-          <p:cNvPr id="56" name="Graphic 55" descr="Pie chart with solid fill">
-            <a:extLst>
-              <a:ext uri="{FF2B5EF4-FFF2-40B4-BE49-F238E27FC236}">
-                <a16:creationId xmlns:a16="http://schemas.microsoft.com/office/drawing/2014/main" id="{042DF211-061E-3534-8E26-755B0FC72E54}"/>
-              </a:ext>
-            </a:extLst>
-          </p:cNvPr>
-          <p:cNvPicPr>
-            <a:picLocks noChangeAspect="1"/>
-          </p:cNvPicPr>
-          <p:nvPr/>
-        </p:nvPicPr>
-        <p:blipFill>
-          <a:blip r:embed="rId38">
-            <a:extLst>
-              <a:ext uri="{96DAC541-7B7A-43D3-8B79-37D633B846F1}">
-                <asvg:svgBlip xmlns:asvg="http://schemas.microsoft.com/office/drawing/2016/SVG/main" r:embed="rId39"/>
-              </a:ext>
-            </a:extLst>
-          </a:blip>
-          <a:stretch>
-            <a:fillRect/>
-          </a:stretch>
-        </p:blipFill>
-        <p:spPr>
-          <a:xfrm>
-            <a:off x="6199299" y="7096384"/>
-            <a:ext cx="910903" cy="910903"/>
-          </a:xfrm>
-          <a:prstGeom prst="rect">
-            <a:avLst/>
-          </a:prstGeom>
-        </p:spPr>
-      </p:pic>
-      <p:pic>
-        <p:nvPicPr>
-          <p:cNvPr id="57" name="Graphic 56" descr="Document with solid fill">
-            <a:extLst>
-              <a:ext uri="{FF2B5EF4-FFF2-40B4-BE49-F238E27FC236}">
-                <a16:creationId xmlns:a16="http://schemas.microsoft.com/office/drawing/2014/main" id="{E8FE4F72-3ACB-321B-C402-3A65A9107B22}"/>
-              </a:ext>
-            </a:extLst>
-          </p:cNvPr>
-          <p:cNvPicPr>
-            <a:picLocks noChangeAspect="1"/>
-          </p:cNvPicPr>
-          <p:nvPr/>
-        </p:nvPicPr>
-        <p:blipFill>
-          <a:blip r:embed="rId40">
-            <a:extLst>
-              <a:ext uri="{96DAC541-7B7A-43D3-8B79-37D633B846F1}">
-                <asvg:svgBlip xmlns:asvg="http://schemas.microsoft.com/office/drawing/2016/SVG/main" r:embed="rId41"/>
-              </a:ext>
-            </a:extLst>
-          </a:blip>
-          <a:stretch>
-            <a:fillRect/>
-          </a:stretch>
-        </p:blipFill>
-        <p:spPr>
-          <a:xfrm>
-            <a:off x="7248783" y="7806340"/>
-            <a:ext cx="910903" cy="910903"/>
-          </a:xfrm>
-          <a:prstGeom prst="rect">
-            <a:avLst/>
-          </a:prstGeom>
-        </p:spPr>
-      </p:pic>
-      <p:pic>
-        <p:nvPicPr>
-          <p:cNvPr id="58" name="Graphic 57" descr="Transfer outline">
-            <a:extLst>
-              <a:ext uri="{FF2B5EF4-FFF2-40B4-BE49-F238E27FC236}">
-                <a16:creationId xmlns:a16="http://schemas.microsoft.com/office/drawing/2014/main" id="{86F3DA6C-3CD7-0203-D7CC-6899DF099570}"/>
-              </a:ext>
-            </a:extLst>
-          </p:cNvPr>
-          <p:cNvPicPr>
-            <a:picLocks noChangeAspect="1"/>
-          </p:cNvPicPr>
-          <p:nvPr/>
-        </p:nvPicPr>
-        <p:blipFill>
-          <a:blip r:embed="rId42">
-            <a:extLst>
-              <a:ext uri="{96DAC541-7B7A-43D3-8B79-37D633B846F1}">
-                <asvg:svgBlip xmlns:asvg="http://schemas.microsoft.com/office/drawing/2016/SVG/main" r:embed="rId43"/>
-              </a:ext>
-            </a:extLst>
-          </a:blip>
-          <a:stretch>
-            <a:fillRect/>
-          </a:stretch>
-        </p:blipFill>
-        <p:spPr>
-          <a:xfrm>
-            <a:off x="6893509" y="9050160"/>
-            <a:ext cx="914400" cy="914400"/>
-          </a:xfrm>
-          <a:prstGeom prst="rect">
-            <a:avLst/>
-          </a:prstGeom>
-        </p:spPr>
-      </p:pic>
-      <p:pic>
-        <p:nvPicPr>
-          <p:cNvPr id="59" name="Graphic 58" descr="Transfer outline">
-            <a:extLst>
-              <a:ext uri="{FF2B5EF4-FFF2-40B4-BE49-F238E27FC236}">
-                <a16:creationId xmlns:a16="http://schemas.microsoft.com/office/drawing/2014/main" id="{83D0834B-E096-87AB-5587-0DADC3937587}"/>
-              </a:ext>
-            </a:extLst>
-          </p:cNvPr>
-          <p:cNvPicPr>
-            <a:picLocks noChangeAspect="1"/>
-          </p:cNvPicPr>
-          <p:nvPr/>
-        </p:nvPicPr>
-        <p:blipFill>
-          <a:blip r:embed="rId42">
-            <a:extLst>
-              <a:ext uri="{96DAC541-7B7A-43D3-8B79-37D633B846F1}">
-                <asvg:svgBlip xmlns:asvg="http://schemas.microsoft.com/office/drawing/2016/SVG/main" r:embed="rId43"/>
-              </a:ext>
-            </a:extLst>
-          </a:blip>
-          <a:stretch>
-            <a:fillRect/>
-          </a:stretch>
-        </p:blipFill>
-        <p:spPr>
-          <a:xfrm>
-            <a:off x="4933002" y="8992826"/>
-            <a:ext cx="914400" cy="914400"/>
-          </a:xfrm>
-          <a:prstGeom prst="rect">
-            <a:avLst/>
-          </a:prstGeom>
-        </p:spPr>
-      </p:pic>
-      <p:pic>
-        <p:nvPicPr>
-          <p:cNvPr id="60" name="Graphic 59" descr="Arrow Right with solid fill">
-            <a:extLst>
-              <a:ext uri="{FF2B5EF4-FFF2-40B4-BE49-F238E27FC236}">
-                <a16:creationId xmlns:a16="http://schemas.microsoft.com/office/drawing/2014/main" id="{876D21F7-3231-3C8B-F490-E76E74A8D10D}"/>
-              </a:ext>
-            </a:extLst>
-          </p:cNvPr>
-          <p:cNvPicPr>
-            <a:picLocks noChangeAspect="1"/>
-          </p:cNvPicPr>
-          <p:nvPr/>
-        </p:nvPicPr>
-        <p:blipFill>
-          <a:blip r:embed="rId44">
-            <a:extLst>
-              <a:ext uri="{96DAC541-7B7A-43D3-8B79-37D633B846F1}">
-                <asvg:svgBlip xmlns:asvg="http://schemas.microsoft.com/office/drawing/2016/SVG/main" r:embed="rId45"/>
-              </a:ext>
-            </a:extLst>
-          </a:blip>
-          <a:stretch>
-            <a:fillRect/>
-          </a:stretch>
-        </p:blipFill>
-        <p:spPr>
-          <a:xfrm rot="13039938">
-            <a:off x="5646828" y="8284763"/>
-            <a:ext cx="914400" cy="914400"/>
-          </a:xfrm>
-          <a:prstGeom prst="rect">
-            <a:avLst/>
-          </a:prstGeom>
-        </p:spPr>
-      </p:pic>
-      <p:pic>
-        <p:nvPicPr>
-          <p:cNvPr id="61" name="Graphic 60" descr="Arrow Right with solid fill">
-            <a:extLst>
-              <a:ext uri="{FF2B5EF4-FFF2-40B4-BE49-F238E27FC236}">
-                <a16:creationId xmlns:a16="http://schemas.microsoft.com/office/drawing/2014/main" id="{E83C3A90-9030-A429-AA8D-3FB84E0C1607}"/>
-              </a:ext>
-            </a:extLst>
-          </p:cNvPr>
-          <p:cNvPicPr>
-            <a:picLocks noChangeAspect="1"/>
-          </p:cNvPicPr>
-          <p:nvPr/>
-        </p:nvPicPr>
-        <p:blipFill>
-          <a:blip r:embed="rId44">
-            <a:extLst>
-              <a:ext uri="{96DAC541-7B7A-43D3-8B79-37D633B846F1}">
-                <asvg:svgBlip xmlns:asvg="http://schemas.microsoft.com/office/drawing/2016/SVG/main" r:embed="rId45"/>
-              </a:ext>
-            </a:extLst>
-          </a:blip>
-          <a:stretch>
-            <a:fillRect/>
-          </a:stretch>
-        </p:blipFill>
-        <p:spPr>
-          <a:xfrm rot="16467366">
-            <a:off x="6011015" y="8130713"/>
-            <a:ext cx="914400" cy="914400"/>
-          </a:xfrm>
-          <a:prstGeom prst="rect">
-            <a:avLst/>
-          </a:prstGeom>
-        </p:spPr>
-      </p:pic>
-      <p:pic>
-        <p:nvPicPr>
-          <p:cNvPr id="62" name="Graphic 61" descr="Arrow Right with solid fill">
-            <a:extLst>
-              <a:ext uri="{FF2B5EF4-FFF2-40B4-BE49-F238E27FC236}">
-                <a16:creationId xmlns:a16="http://schemas.microsoft.com/office/drawing/2014/main" id="{74580E44-CDDA-DA23-3560-789CD4A78A9D}"/>
-              </a:ext>
-            </a:extLst>
-          </p:cNvPr>
-          <p:cNvPicPr>
-            <a:picLocks noChangeAspect="1"/>
-          </p:cNvPicPr>
-          <p:nvPr/>
-        </p:nvPicPr>
-        <p:blipFill>
-          <a:blip r:embed="rId44">
-            <a:extLst>
-              <a:ext uri="{96DAC541-7B7A-43D3-8B79-37D633B846F1}">
-                <asvg:svgBlip xmlns:asvg="http://schemas.microsoft.com/office/drawing/2016/SVG/main" r:embed="rId45"/>
-              </a:ext>
-            </a:extLst>
-          </a:blip>
-          <a:stretch>
-            <a:fillRect/>
-          </a:stretch>
-        </p:blipFill>
-        <p:spPr>
-          <a:xfrm rot="19253648">
-            <a:off x="6276785" y="8261338"/>
-            <a:ext cx="914400" cy="914400"/>
-          </a:xfrm>
-          <a:prstGeom prst="rect">
-            <a:avLst/>
-          </a:prstGeom>
-        </p:spPr>
-      </p:pic>
-      <p:pic>
-        <p:nvPicPr>
-          <p:cNvPr id="63" name="Graphic 62" descr="Arrow Right with solid fill">
-            <a:extLst>
-              <a:ext uri="{FF2B5EF4-FFF2-40B4-BE49-F238E27FC236}">
-                <a16:creationId xmlns:a16="http://schemas.microsoft.com/office/drawing/2014/main" id="{FDF42755-7521-8C75-4E2E-815714CF130E}"/>
-              </a:ext>
-            </a:extLst>
-          </p:cNvPr>
-          <p:cNvPicPr>
-            <a:picLocks noChangeAspect="1"/>
-          </p:cNvPicPr>
-          <p:nvPr/>
-        </p:nvPicPr>
-        <p:blipFill>
-          <a:blip r:embed="rId44">
-            <a:extLst>
-              <a:ext uri="{96DAC541-7B7A-43D3-8B79-37D633B846F1}">
-                <asvg:svgBlip xmlns:asvg="http://schemas.microsoft.com/office/drawing/2016/SVG/main" r:embed="rId45"/>
-              </a:ext>
-            </a:extLst>
-          </a:blip>
-          <a:stretch>
-            <a:fillRect/>
-          </a:stretch>
-        </p:blipFill>
-        <p:spPr>
-          <a:xfrm rot="9397180">
-            <a:off x="5581109" y="9651076"/>
-            <a:ext cx="914400" cy="914400"/>
-          </a:xfrm>
-          <a:prstGeom prst="rect">
-            <a:avLst/>
-          </a:prstGeom>
-        </p:spPr>
-      </p:pic>
-      <p:pic>
-        <p:nvPicPr>
-          <p:cNvPr id="1024" name="Graphic 1023" descr="Arrow Right with solid fill">
-            <a:extLst>
-              <a:ext uri="{FF2B5EF4-FFF2-40B4-BE49-F238E27FC236}">
-                <a16:creationId xmlns:a16="http://schemas.microsoft.com/office/drawing/2014/main" id="{B74B2F83-41A3-0C71-9349-73E4DDB0F062}"/>
-              </a:ext>
-            </a:extLst>
-          </p:cNvPr>
-          <p:cNvPicPr>
-            <a:picLocks noChangeAspect="1"/>
-          </p:cNvPicPr>
-          <p:nvPr/>
-        </p:nvPicPr>
-        <p:blipFill>
-          <a:blip r:embed="rId44">
-            <a:extLst>
-              <a:ext uri="{96DAC541-7B7A-43D3-8B79-37D633B846F1}">
-                <asvg:svgBlip xmlns:asvg="http://schemas.microsoft.com/office/drawing/2016/SVG/main" r:embed="rId45"/>
-              </a:ext>
-            </a:extLst>
-          </a:blip>
-          <a:stretch>
-            <a:fillRect/>
-          </a:stretch>
-        </p:blipFill>
-        <p:spPr>
-          <a:xfrm rot="7248496">
-            <a:off x="5742098" y="9853318"/>
-            <a:ext cx="914400" cy="914400"/>
-          </a:xfrm>
-          <a:prstGeom prst="rect">
-            <a:avLst/>
-          </a:prstGeom>
-        </p:spPr>
-      </p:pic>
-      <p:pic>
-        <p:nvPicPr>
-          <p:cNvPr id="1025" name="Graphic 1024" descr="Arrow Right with solid fill">
-            <a:extLst>
-              <a:ext uri="{FF2B5EF4-FFF2-40B4-BE49-F238E27FC236}">
-                <a16:creationId xmlns:a16="http://schemas.microsoft.com/office/drawing/2014/main" id="{55F34A16-8A41-886A-F008-23AB7BA55436}"/>
-              </a:ext>
-            </a:extLst>
-          </p:cNvPr>
-          <p:cNvPicPr>
-            <a:picLocks noChangeAspect="1"/>
-          </p:cNvPicPr>
-          <p:nvPr/>
-        </p:nvPicPr>
-        <p:blipFill>
-          <a:blip r:embed="rId44">
-            <a:extLst>
-              <a:ext uri="{96DAC541-7B7A-43D3-8B79-37D633B846F1}">
-                <asvg:svgBlip xmlns:asvg="http://schemas.microsoft.com/office/drawing/2016/SVG/main" r:embed="rId45"/>
-              </a:ext>
-            </a:extLst>
-          </a:blip>
-          <a:stretch>
-            <a:fillRect/>
-          </a:stretch>
-        </p:blipFill>
-        <p:spPr>
-          <a:xfrm rot="5400000">
-            <a:off x="5961656" y="9883037"/>
-            <a:ext cx="914400" cy="914400"/>
-          </a:xfrm>
-          <a:prstGeom prst="rect">
-            <a:avLst/>
-          </a:prstGeom>
-        </p:spPr>
-      </p:pic>
-      <p:pic>
-        <p:nvPicPr>
-          <p:cNvPr id="1027" name="Graphic 1026" descr="Arrow Right with solid fill">
-            <a:extLst>
-              <a:ext uri="{FF2B5EF4-FFF2-40B4-BE49-F238E27FC236}">
-                <a16:creationId xmlns:a16="http://schemas.microsoft.com/office/drawing/2014/main" id="{723DC9FF-36B1-0F84-1B27-F32AEA556623}"/>
-              </a:ext>
-            </a:extLst>
-          </p:cNvPr>
-          <p:cNvPicPr>
-            <a:picLocks noChangeAspect="1"/>
-          </p:cNvPicPr>
-          <p:nvPr/>
-        </p:nvPicPr>
-        <p:blipFill>
-          <a:blip r:embed="rId44">
-            <a:extLst>
-              <a:ext uri="{96DAC541-7B7A-43D3-8B79-37D633B846F1}">
-                <asvg:svgBlip xmlns:asvg="http://schemas.microsoft.com/office/drawing/2016/SVG/main" r:embed="rId45"/>
-              </a:ext>
-            </a:extLst>
-          </a:blip>
-          <a:stretch>
-            <a:fillRect/>
-          </a:stretch>
-        </p:blipFill>
-        <p:spPr>
-          <a:xfrm rot="2880042">
-            <a:off x="6209257" y="9821625"/>
-            <a:ext cx="1046910" cy="914400"/>
-          </a:xfrm>
-          <a:prstGeom prst="rect">
-            <a:avLst/>
-          </a:prstGeom>
-        </p:spPr>
-      </p:pic>
-      <p:pic>
-        <p:nvPicPr>
-          <p:cNvPr id="1029" name="Graphic 1028" descr="Arrow Right with solid fill">
-            <a:extLst>
-              <a:ext uri="{FF2B5EF4-FFF2-40B4-BE49-F238E27FC236}">
-                <a16:creationId xmlns:a16="http://schemas.microsoft.com/office/drawing/2014/main" id="{AD4CF525-5624-1879-0E12-2C9C96118205}"/>
-              </a:ext>
-            </a:extLst>
-          </p:cNvPr>
-          <p:cNvPicPr>
-            <a:picLocks noChangeAspect="1"/>
-          </p:cNvPicPr>
-          <p:nvPr/>
-        </p:nvPicPr>
-        <p:blipFill>
-          <a:blip r:embed="rId44">
-            <a:extLst>
-              <a:ext uri="{96DAC541-7B7A-43D3-8B79-37D633B846F1}">
-                <asvg:svgBlip xmlns:asvg="http://schemas.microsoft.com/office/drawing/2016/SVG/main" r:embed="rId45"/>
-              </a:ext>
-            </a:extLst>
-          </a:blip>
-          <a:stretch>
-            <a:fillRect/>
-          </a:stretch>
-        </p:blipFill>
-        <p:spPr>
-          <a:xfrm rot="951398">
-            <a:off x="6374260" y="9615103"/>
-            <a:ext cx="1028332" cy="914400"/>
-          </a:xfrm>
-          <a:prstGeom prst="rect">
-            <a:avLst/>
-          </a:prstGeom>
-        </p:spPr>
-      </p:pic>
-      <p:pic>
-        <p:nvPicPr>
-          <p:cNvPr id="1031" name="Graphic 1030" descr="Transfer outline">
-            <a:extLst>
-              <a:ext uri="{FF2B5EF4-FFF2-40B4-BE49-F238E27FC236}">
-                <a16:creationId xmlns:a16="http://schemas.microsoft.com/office/drawing/2014/main" id="{CC45DE35-D966-0112-C490-EA3446E59551}"/>
-              </a:ext>
-            </a:extLst>
-          </p:cNvPr>
-          <p:cNvPicPr>
-            <a:picLocks noChangeAspect="1"/>
-          </p:cNvPicPr>
-          <p:nvPr/>
-        </p:nvPicPr>
-        <p:blipFill>
-          <a:blip r:embed="rId42">
-            <a:extLst>
-              <a:ext uri="{96DAC541-7B7A-43D3-8B79-37D633B846F1}">
-                <asvg:svgBlip xmlns:asvg="http://schemas.microsoft.com/office/drawing/2016/SVG/main" r:embed="rId43"/>
-              </a:ext>
-            </a:extLst>
-          </a:blip>
-          <a:stretch>
-            <a:fillRect/>
-          </a:stretch>
-        </p:blipFill>
-        <p:spPr>
-          <a:xfrm>
-            <a:off x="2878607" y="9000411"/>
-            <a:ext cx="914400" cy="914400"/>
-          </a:xfrm>
-          <a:prstGeom prst="rect">
-            <a:avLst/>
-          </a:prstGeom>
-        </p:spPr>
-      </p:pic>
-      <p:pic>
-        <p:nvPicPr>
-          <p:cNvPr id="1033" name="Picture 1032">
-            <a:extLst>
-              <a:ext uri="{FF2B5EF4-FFF2-40B4-BE49-F238E27FC236}">
-                <a16:creationId xmlns:a16="http://schemas.microsoft.com/office/drawing/2014/main" id="{B9B2F113-4B3C-363B-D71A-FDDAA24DFB8B}"/>
-              </a:ext>
-            </a:extLst>
-          </p:cNvPr>
-          <p:cNvPicPr>
-            <a:picLocks noChangeAspect="1"/>
-          </p:cNvPicPr>
-          <p:nvPr/>
-        </p:nvPicPr>
-        <p:blipFill>
-          <a:blip r:embed="rId4"/>
-          <a:stretch>
-            <a:fillRect/>
-          </a:stretch>
-        </p:blipFill>
-        <p:spPr>
-          <a:xfrm>
-            <a:off x="4053933" y="9195514"/>
-            <a:ext cx="664339" cy="419454"/>
-          </a:xfrm>
-          <a:prstGeom prst="rect">
-            <a:avLst/>
-          </a:prstGeom>
-          <a:ln>
-            <a:solidFill>
-              <a:srgbClr val="046A88"/>
-            </a:solidFill>
-          </a:ln>
-        </p:spPr>
-      </p:pic>
-      <p:pic>
-        <p:nvPicPr>
-          <p:cNvPr id="1036" name="Picture 1035">
+          <p:cNvPr id="3" name="Picture 2">
             <a:extLst>
               <a:ext uri="{FF2B5EF4-FFF2-40B4-BE49-F238E27FC236}">
                 <a16:creationId xmlns:a16="http://schemas.microsoft.com/office/drawing/2014/main" id="{C0B3E529-67C8-F926-D066-873EEF160CD3}"/>
@@ -5524,8 +5518,139 @@
         </p:blipFill>
         <p:spPr>
           <a:xfrm>
-            <a:off x="24432140" y="16054968"/>
-            <a:ext cx="3574698" cy="3531629"/>
+            <a:off x="437292" y="6877297"/>
+            <a:ext cx="6304254" cy="6228299"/>
+          </a:xfrm>
+          <a:prstGeom prst="rect">
+            <a:avLst/>
+          </a:prstGeom>
+        </p:spPr>
+      </p:pic>
+      <p:pic>
+        <p:nvPicPr>
+          <p:cNvPr id="15" name="Picture 14">
+            <a:extLst>
+              <a:ext uri="{FF2B5EF4-FFF2-40B4-BE49-F238E27FC236}">
+                <a16:creationId xmlns:a16="http://schemas.microsoft.com/office/drawing/2014/main" id="{F1E9A373-143B-AEFA-A8CF-EBD1B9F9F56E}"/>
+              </a:ext>
+            </a:extLst>
+          </p:cNvPr>
+          <p:cNvPicPr>
+            <a:picLocks noChangeAspect="1"/>
+          </p:cNvPicPr>
+          <p:nvPr/>
+        </p:nvPicPr>
+        <p:blipFill>
+          <a:blip r:embed="rId47"/>
+          <a:srcRect l="1198" r="1169"/>
+          <a:stretch/>
+        </p:blipFill>
+        <p:spPr>
+          <a:xfrm>
+            <a:off x="17452240" y="6528984"/>
+            <a:ext cx="12415468" cy="6924929"/>
+          </a:xfrm>
+          <a:prstGeom prst="rect">
+            <a:avLst/>
+          </a:prstGeom>
+        </p:spPr>
+      </p:pic>
+      <p:pic>
+        <p:nvPicPr>
+          <p:cNvPr id="23" name="Picture 22">
+            <a:extLst>
+              <a:ext uri="{FF2B5EF4-FFF2-40B4-BE49-F238E27FC236}">
+                <a16:creationId xmlns:a16="http://schemas.microsoft.com/office/drawing/2014/main" id="{DEA81DDE-4BBB-3F61-A3F6-57D19139506E}"/>
+              </a:ext>
+            </a:extLst>
+          </p:cNvPr>
+          <p:cNvPicPr>
+            <a:picLocks noChangeAspect="1"/>
+          </p:cNvPicPr>
+          <p:nvPr/>
+        </p:nvPicPr>
+        <p:blipFill>
+          <a:blip r:embed="rId48"/>
+          <a:stretch>
+            <a:fillRect/>
+          </a:stretch>
+        </p:blipFill>
+        <p:spPr>
+          <a:xfrm>
+            <a:off x="8073558" y="6888663"/>
+            <a:ext cx="7859997" cy="6221831"/>
+          </a:xfrm>
+          <a:prstGeom prst="rect">
+            <a:avLst/>
+          </a:prstGeom>
+        </p:spPr>
+      </p:pic>
+      <p:pic>
+        <p:nvPicPr>
+          <p:cNvPr id="27" name="Graphic 26" descr="Arrow Right with solid fill">
+            <a:extLst>
+              <a:ext uri="{FF2B5EF4-FFF2-40B4-BE49-F238E27FC236}">
+                <a16:creationId xmlns:a16="http://schemas.microsoft.com/office/drawing/2014/main" id="{8E699718-31EA-ECE5-DB76-3FAD53F43E5E}"/>
+              </a:ext>
+            </a:extLst>
+          </p:cNvPr>
+          <p:cNvPicPr>
+            <a:picLocks noChangeAspect="1"/>
+          </p:cNvPicPr>
+          <p:nvPr/>
+        </p:nvPicPr>
+        <p:blipFill>
+          <a:blip r:embed="rId43">
+            <a:extLst>
+              <a:ext uri="{96DAC541-7B7A-43D3-8B79-37D633B846F1}">
+                <asvg:svgBlip xmlns:asvg="http://schemas.microsoft.com/office/drawing/2016/SVG/main" r:embed="rId44"/>
+              </a:ext>
+            </a:extLst>
+          </a:blip>
+          <a:stretch>
+            <a:fillRect/>
+          </a:stretch>
+        </p:blipFill>
+        <p:spPr>
+          <a:xfrm>
+            <a:off x="6826273" y="9342670"/>
+            <a:ext cx="1297551" cy="1297551"/>
+          </a:xfrm>
+          <a:prstGeom prst="rect">
+            <a:avLst/>
+          </a:prstGeom>
+        </p:spPr>
+      </p:pic>
+      <p:pic>
+        <p:nvPicPr>
+          <p:cNvPr id="29" name="Graphic 28" descr="Arrow Right with solid fill">
+            <a:extLst>
+              <a:ext uri="{FF2B5EF4-FFF2-40B4-BE49-F238E27FC236}">
+                <a16:creationId xmlns:a16="http://schemas.microsoft.com/office/drawing/2014/main" id="{89B247FC-57AE-C8C5-A0CC-21FF4F6D7950}"/>
+              </a:ext>
+            </a:extLst>
+          </p:cNvPr>
+          <p:cNvPicPr>
+            <a:picLocks noChangeAspect="1"/>
+          </p:cNvPicPr>
+          <p:nvPr/>
+        </p:nvPicPr>
+        <p:blipFill>
+          <a:blip r:embed="rId43">
+            <a:extLst>
+              <a:ext uri="{96DAC541-7B7A-43D3-8B79-37D633B846F1}">
+                <asvg:svgBlip xmlns:asvg="http://schemas.microsoft.com/office/drawing/2016/SVG/main" r:embed="rId44"/>
+              </a:ext>
+            </a:extLst>
+          </a:blip>
+          <a:stretch>
+            <a:fillRect/>
+          </a:stretch>
+        </p:blipFill>
+        <p:spPr>
+          <a:xfrm>
+            <a:off x="16000946" y="9350802"/>
+            <a:ext cx="1297551" cy="1297551"/>
           </a:xfrm>
           <a:prstGeom prst="rect">
             <a:avLst/>

</xml_diff>